<commit_message>
Modifying architecture diagram file
</commit_message>
<xml_diff>
--- a/docs/diagrams/Architecture.pptx
+++ b/docs/diagrams/Architecture.pptx
@@ -5,7 +5,7 @@
     <p:sldMasterId id="2147483648" r:id="rId1"/>
   </p:sldMasterIdLst>
   <p:sldIdLst>
-    <p:sldId id="259" r:id="rId2"/>
+    <p:sldId id="261" r:id="rId2"/>
   </p:sldIdLst>
   <p:sldSz cx="12192000" cy="6858000"/>
   <p:notesSz cx="6858000" cy="9144000"/>
@@ -273,7 +273,7 @@
           <a:p>
             <a:fld id="{5218AD6D-F957-46F1-971B-3863E78F7EC4}" type="datetimeFigureOut">
               <a:rPr lang="en-CA" smtClean="0"/>
-              <a:t>2020-12-06</a:t>
+              <a:t>2020-12-07</a:t>
             </a:fld>
             <a:endParaRPr lang="en-CA" dirty="0"/>
           </a:p>
@@ -473,7 +473,7 @@
           <a:p>
             <a:fld id="{5218AD6D-F957-46F1-971B-3863E78F7EC4}" type="datetimeFigureOut">
               <a:rPr lang="en-CA" smtClean="0"/>
-              <a:t>2020-12-06</a:t>
+              <a:t>2020-12-07</a:t>
             </a:fld>
             <a:endParaRPr lang="en-CA" dirty="0"/>
           </a:p>
@@ -683,7 +683,7 @@
           <a:p>
             <a:fld id="{5218AD6D-F957-46F1-971B-3863E78F7EC4}" type="datetimeFigureOut">
               <a:rPr lang="en-CA" smtClean="0"/>
-              <a:t>2020-12-06</a:t>
+              <a:t>2020-12-07</a:t>
             </a:fld>
             <a:endParaRPr lang="en-CA" dirty="0"/>
           </a:p>
@@ -883,7 +883,7 @@
           <a:p>
             <a:fld id="{5218AD6D-F957-46F1-971B-3863E78F7EC4}" type="datetimeFigureOut">
               <a:rPr lang="en-CA" smtClean="0"/>
-              <a:t>2020-12-06</a:t>
+              <a:t>2020-12-07</a:t>
             </a:fld>
             <a:endParaRPr lang="en-CA" dirty="0"/>
           </a:p>
@@ -1159,7 +1159,7 @@
           <a:p>
             <a:fld id="{5218AD6D-F957-46F1-971B-3863E78F7EC4}" type="datetimeFigureOut">
               <a:rPr lang="en-CA" smtClean="0"/>
-              <a:t>2020-12-06</a:t>
+              <a:t>2020-12-07</a:t>
             </a:fld>
             <a:endParaRPr lang="en-CA" dirty="0"/>
           </a:p>
@@ -1427,7 +1427,7 @@
           <a:p>
             <a:fld id="{5218AD6D-F957-46F1-971B-3863E78F7EC4}" type="datetimeFigureOut">
               <a:rPr lang="en-CA" smtClean="0"/>
-              <a:t>2020-12-06</a:t>
+              <a:t>2020-12-07</a:t>
             </a:fld>
             <a:endParaRPr lang="en-CA" dirty="0"/>
           </a:p>
@@ -1842,7 +1842,7 @@
           <a:p>
             <a:fld id="{5218AD6D-F957-46F1-971B-3863E78F7EC4}" type="datetimeFigureOut">
               <a:rPr lang="en-CA" smtClean="0"/>
-              <a:t>2020-12-06</a:t>
+              <a:t>2020-12-07</a:t>
             </a:fld>
             <a:endParaRPr lang="en-CA" dirty="0"/>
           </a:p>
@@ -1984,7 +1984,7 @@
           <a:p>
             <a:fld id="{5218AD6D-F957-46F1-971B-3863E78F7EC4}" type="datetimeFigureOut">
               <a:rPr lang="en-CA" smtClean="0"/>
-              <a:t>2020-12-06</a:t>
+              <a:t>2020-12-07</a:t>
             </a:fld>
             <a:endParaRPr lang="en-CA" dirty="0"/>
           </a:p>
@@ -2097,7 +2097,7 @@
           <a:p>
             <a:fld id="{5218AD6D-F957-46F1-971B-3863E78F7EC4}" type="datetimeFigureOut">
               <a:rPr lang="en-CA" smtClean="0"/>
-              <a:t>2020-12-06</a:t>
+              <a:t>2020-12-07</a:t>
             </a:fld>
             <a:endParaRPr lang="en-CA" dirty="0"/>
           </a:p>
@@ -2410,7 +2410,7 @@
           <a:p>
             <a:fld id="{5218AD6D-F957-46F1-971B-3863E78F7EC4}" type="datetimeFigureOut">
               <a:rPr lang="en-CA" smtClean="0"/>
-              <a:t>2020-12-06</a:t>
+              <a:t>2020-12-07</a:t>
             </a:fld>
             <a:endParaRPr lang="en-CA" dirty="0"/>
           </a:p>
@@ -2699,7 +2699,7 @@
           <a:p>
             <a:fld id="{5218AD6D-F957-46F1-971B-3863E78F7EC4}" type="datetimeFigureOut">
               <a:rPr lang="en-CA" smtClean="0"/>
-              <a:t>2020-12-06</a:t>
+              <a:t>2020-12-07</a:t>
             </a:fld>
             <a:endParaRPr lang="en-CA" dirty="0"/>
           </a:p>
@@ -2942,7 +2942,7 @@
           <a:p>
             <a:fld id="{5218AD6D-F957-46F1-971B-3863E78F7EC4}" type="datetimeFigureOut">
               <a:rPr lang="en-CA" smtClean="0"/>
-              <a:t>2020-12-06</a:t>
+              <a:t>2020-12-07</a:t>
             </a:fld>
             <a:endParaRPr lang="en-CA" dirty="0"/>
           </a:p>
@@ -3630,8 +3630,8 @@
         </p:nvSpPr>
         <p:spPr>
           <a:xfrm>
-            <a:off x="3510280" y="1241453"/>
-            <a:ext cx="924965" cy="820456"/>
+            <a:off x="1995989" y="295020"/>
+            <a:ext cx="746349" cy="390894"/>
           </a:xfrm>
           <a:prstGeom prst="rect">
             <a:avLst/>
@@ -3768,8 +3768,8 @@
         </p:nvSpPr>
         <p:spPr>
           <a:xfrm>
-            <a:off x="7325010" y="1211818"/>
-            <a:ext cx="3706778" cy="2538405"/>
+            <a:off x="7325010" y="1211819"/>
+            <a:ext cx="3706778" cy="1103542"/>
           </a:xfrm>
           <a:prstGeom prst="rect">
             <a:avLst/>
@@ -3807,7 +3807,7 @@
                   <a:schemeClr val="tx1"/>
                 </a:solidFill>
               </a:rPr>
-              <a:t>NODE</a:t>
+              <a:t>NODE 1</a:t>
             </a:r>
             <a:endParaRPr lang="en-CA" sz="1200" u="sng" dirty="0">
               <a:solidFill>
@@ -3831,7 +3831,7 @@
         </p:nvSpPr>
         <p:spPr>
           <a:xfrm>
-            <a:off x="1995990" y="1225314"/>
+            <a:off x="1995990" y="1216925"/>
             <a:ext cx="746349" cy="850090"/>
           </a:xfrm>
           <a:prstGeom prst="rect">
@@ -3964,8 +3964,8 @@
         </p:nvSpPr>
         <p:spPr>
           <a:xfrm>
-            <a:off x="7730851" y="1617537"/>
-            <a:ext cx="1296145" cy="407338"/>
+            <a:off x="7426818" y="2823049"/>
+            <a:ext cx="767940" cy="326675"/>
           </a:xfrm>
           <a:prstGeom prst="rect">
             <a:avLst/>
@@ -3999,14 +3999,25 @@
           <a:p>
             <a:pPr algn="ctr"/>
             <a:r>
-              <a:rPr lang="es-CO" sz="1200" b="1" dirty="0">
+              <a:rPr lang="es-CO" sz="1000" b="1" dirty="0">
                 <a:solidFill>
                   <a:schemeClr val="tx1"/>
                 </a:solidFill>
               </a:rPr>
-              <a:t>Bill container</a:t>
-            </a:r>
-            <a:endParaRPr lang="en-CA" sz="1200" b="1" dirty="0">
+              <a:t>Bill </a:t>
+            </a:r>
+          </a:p>
+          <a:p>
+            <a:pPr algn="ctr"/>
+            <a:r>
+              <a:rPr lang="es-CO" sz="1000" b="1" dirty="0">
+                <a:solidFill>
+                  <a:schemeClr val="tx1"/>
+                </a:solidFill>
+              </a:rPr>
+              <a:t>container</a:t>
+            </a:r>
+            <a:endParaRPr lang="en-CA" sz="1000" b="1" dirty="0">
               <a:solidFill>
                 <a:schemeClr val="tx1"/>
               </a:solidFill>
@@ -4363,68 +4374,24 @@
       </p:cxnSp>
       <p:cxnSp>
         <p:nvCxnSpPr>
-          <p:cNvPr id="55" name="Straight Arrow Connector 54">
-            <a:extLst>
-              <a:ext uri="{FF2B5EF4-FFF2-40B4-BE49-F238E27FC236}">
-                <a16:creationId xmlns:a16="http://schemas.microsoft.com/office/drawing/2014/main" id="{9450E424-59F6-49F5-B967-E1C0C301668E}"/>
+          <p:cNvPr id="57" name="Straight Arrow Connector 56">
+            <a:extLst>
+              <a:ext uri="{FF2B5EF4-FFF2-40B4-BE49-F238E27FC236}">
+                <a16:creationId xmlns:a16="http://schemas.microsoft.com/office/drawing/2014/main" id="{36DE3E0F-4AD9-455D-8435-0805A6CEE7BE}"/>
               </a:ext>
             </a:extLst>
           </p:cNvPr>
           <p:cNvCxnSpPr>
             <a:cxnSpLocks/>
             <a:stCxn id="31" idx="3"/>
-            <a:endCxn id="14" idx="1"/>
-          </p:cNvCxnSpPr>
-          <p:nvPr/>
-        </p:nvCxnSpPr>
-        <p:spPr>
-          <a:xfrm>
-            <a:off x="2742339" y="1650359"/>
-            <a:ext cx="767941" cy="1322"/>
-          </a:xfrm>
-          <a:prstGeom prst="straightConnector1">
-            <a:avLst/>
-          </a:prstGeom>
-          <a:ln>
-            <a:headEnd type="triangle"/>
-            <a:tailEnd type="triangle"/>
-          </a:ln>
-        </p:spPr>
-        <p:style>
-          <a:lnRef idx="1">
-            <a:schemeClr val="accent1"/>
-          </a:lnRef>
-          <a:fillRef idx="0">
-            <a:schemeClr val="accent1"/>
-          </a:fillRef>
-          <a:effectRef idx="0">
-            <a:schemeClr val="accent1"/>
-          </a:effectRef>
-          <a:fontRef idx="minor">
-            <a:schemeClr val="tx1"/>
-          </a:fontRef>
-        </p:style>
-      </p:cxnSp>
-      <p:cxnSp>
-        <p:nvCxnSpPr>
-          <p:cNvPr id="57" name="Straight Arrow Connector 56">
-            <a:extLst>
-              <a:ext uri="{FF2B5EF4-FFF2-40B4-BE49-F238E27FC236}">
-                <a16:creationId xmlns:a16="http://schemas.microsoft.com/office/drawing/2014/main" id="{36DE3E0F-4AD9-455D-8435-0805A6CEE7BE}"/>
-              </a:ext>
-            </a:extLst>
-          </p:cNvPr>
-          <p:cNvCxnSpPr>
-            <a:cxnSpLocks/>
-            <a:stCxn id="14" idx="3"/>
             <a:endCxn id="39" idx="1"/>
           </p:cNvCxnSpPr>
           <p:nvPr/>
         </p:nvCxnSpPr>
         <p:spPr>
           <a:xfrm flipV="1">
-            <a:off x="4435245" y="1640747"/>
-            <a:ext cx="1296146" cy="10934"/>
+            <a:off x="2742339" y="1640747"/>
+            <a:ext cx="2989052" cy="1223"/>
           </a:xfrm>
           <a:prstGeom prst="straightConnector1">
             <a:avLst/>
@@ -4507,8 +4474,8 @@
         </p:nvSpPr>
         <p:spPr>
           <a:xfrm>
-            <a:off x="9298864" y="1617537"/>
-            <a:ext cx="1514289" cy="407338"/>
+            <a:off x="7426818" y="3282365"/>
+            <a:ext cx="767940" cy="307756"/>
           </a:xfrm>
           <a:prstGeom prst="rect">
             <a:avLst/>
@@ -4547,38 +4514,30 @@
           <a:p>
             <a:pPr algn="ctr"/>
             <a:r>
-              <a:rPr lang="es-CO" sz="1200" b="1" dirty="0">
+              <a:rPr lang="es-CO" sz="1000" b="1" dirty="0" err="1">
                 <a:solidFill>
                   <a:schemeClr val="tx1"/>
                 </a:solidFill>
               </a:rPr>
-              <a:t>istio-proxy </a:t>
-            </a:r>
-          </a:p>
-          <a:p>
-            <a:pPr algn="ctr"/>
-            <a:r>
-              <a:rPr lang="es-CO" sz="1200" dirty="0">
+              <a:t>istio</a:t>
+            </a:r>
+            <a:r>
+              <a:rPr lang="es-CO" sz="1000" b="1" dirty="0">
                 <a:solidFill>
                   <a:schemeClr val="tx1"/>
                 </a:solidFill>
               </a:rPr>
-              <a:t>(sidecar container)</a:t>
-            </a:r>
-            <a:endParaRPr lang="en-CA" sz="1200" dirty="0">
-              <a:solidFill>
-                <a:schemeClr val="tx1"/>
-              </a:solidFill>
-            </a:endParaRPr>
-          </a:p>
-        </p:txBody>
-      </p:sp>
-      <p:sp>
-        <p:nvSpPr>
-          <p:cNvPr id="109" name="Rectangle 108">
-            <a:extLst>
-              <a:ext uri="{FF2B5EF4-FFF2-40B4-BE49-F238E27FC236}">
-                <a16:creationId xmlns:a16="http://schemas.microsoft.com/office/drawing/2014/main" id="{82476675-CF9A-4EA4-A413-67CC1EBC7F25}"/>
+              <a:t>-proxy </a:t>
+            </a:r>
+          </a:p>
+        </p:txBody>
+      </p:sp>
+      <p:sp>
+        <p:nvSpPr>
+          <p:cNvPr id="121" name="Flowchart: Magnetic Disk 120">
+            <a:extLst>
+              <a:ext uri="{FF2B5EF4-FFF2-40B4-BE49-F238E27FC236}">
+                <a16:creationId xmlns:a16="http://schemas.microsoft.com/office/drawing/2014/main" id="{41FF734B-146B-4B68-BA9E-6EA34601A827}"/>
               </a:ext>
             </a:extLst>
           </p:cNvPr>
@@ -4587,8 +4546,552 @@
         </p:nvSpPr>
         <p:spPr>
           <a:xfrm>
-            <a:off x="7741373" y="2144316"/>
-            <a:ext cx="1296145" cy="407338"/>
+            <a:off x="7810788" y="5757333"/>
+            <a:ext cx="1050990" cy="766227"/>
+          </a:xfrm>
+          <a:prstGeom prst="flowChartMagneticDisk">
+            <a:avLst/>
+          </a:prstGeom>
+          <a:noFill/>
+          <a:ln>
+            <a:solidFill>
+              <a:schemeClr val="tx1"/>
+            </a:solidFill>
+          </a:ln>
+        </p:spPr>
+        <p:style>
+          <a:lnRef idx="2">
+            <a:schemeClr val="accent1">
+              <a:shade val="50000"/>
+            </a:schemeClr>
+          </a:lnRef>
+          <a:fillRef idx="1">
+            <a:schemeClr val="accent1"/>
+          </a:fillRef>
+          <a:effectRef idx="0">
+            <a:schemeClr val="accent1"/>
+          </a:effectRef>
+          <a:fontRef idx="minor">
+            <a:schemeClr val="lt1"/>
+          </a:fontRef>
+        </p:style>
+        <p:txBody>
+          <a:bodyPr rtlCol="0" anchor="ctr"/>
+          <a:lstStyle/>
+          <a:p>
+            <a:pPr algn="ctr"/>
+            <a:r>
+              <a:rPr lang="en-CA" sz="1400" dirty="0">
+                <a:solidFill>
+                  <a:schemeClr val="tx1"/>
+                </a:solidFill>
+              </a:rPr>
+              <a:t>DynamoDB</a:t>
+            </a:r>
+          </a:p>
+        </p:txBody>
+      </p:sp>
+      <p:pic>
+        <p:nvPicPr>
+          <p:cNvPr id="123" name="Graphic 122" descr="Users">
+            <a:extLst>
+              <a:ext uri="{FF2B5EF4-FFF2-40B4-BE49-F238E27FC236}">
+                <a16:creationId xmlns:a16="http://schemas.microsoft.com/office/drawing/2014/main" id="{1756A35F-981D-4229-B646-7747D1D186AB}"/>
+              </a:ext>
+            </a:extLst>
+          </p:cNvPr>
+          <p:cNvPicPr>
+            <a:picLocks noChangeAspect="1"/>
+          </p:cNvPicPr>
+          <p:nvPr/>
+        </p:nvPicPr>
+        <p:blipFill>
+          <a:blip r:embed="rId2">
+            <a:extLst>
+              <a:ext uri="{28A0092B-C50C-407E-A947-70E740481C1C}">
+                <a14:useLocalDpi xmlns:a14="http://schemas.microsoft.com/office/drawing/2010/main" val="0"/>
+              </a:ext>
+              <a:ext uri="{96DAC541-7B7A-43D3-8B79-37D633B846F1}">
+                <asvg:svgBlip xmlns:asvg="http://schemas.microsoft.com/office/drawing/2016/SVG/main" r:embed="rId3"/>
+              </a:ext>
+            </a:extLst>
+          </a:blip>
+          <a:stretch>
+            <a:fillRect/>
+          </a:stretch>
+        </p:blipFill>
+        <p:spPr>
+          <a:xfrm>
+            <a:off x="313651" y="2094454"/>
+            <a:ext cx="914400" cy="914400"/>
+          </a:xfrm>
+          <a:prstGeom prst="rect">
+            <a:avLst/>
+          </a:prstGeom>
+        </p:spPr>
+      </p:pic>
+      <p:cxnSp>
+        <p:nvCxnSpPr>
+          <p:cNvPr id="125" name="Straight Arrow Connector 124">
+            <a:extLst>
+              <a:ext uri="{FF2B5EF4-FFF2-40B4-BE49-F238E27FC236}">
+                <a16:creationId xmlns:a16="http://schemas.microsoft.com/office/drawing/2014/main" id="{18D22E3C-7BDE-4D04-AEF3-6F1274AAED87}"/>
+              </a:ext>
+            </a:extLst>
+          </p:cNvPr>
+          <p:cNvCxnSpPr>
+            <a:cxnSpLocks/>
+            <a:stCxn id="123" idx="3"/>
+            <a:endCxn id="50" idx="1"/>
+          </p:cNvCxnSpPr>
+          <p:nvPr/>
+        </p:nvCxnSpPr>
+        <p:spPr>
+          <a:xfrm>
+            <a:off x="1228051" y="2551654"/>
+            <a:ext cx="767940" cy="844103"/>
+          </a:xfrm>
+          <a:prstGeom prst="straightConnector1">
+            <a:avLst/>
+          </a:prstGeom>
+          <a:ln>
+            <a:tailEnd type="triangle"/>
+          </a:ln>
+        </p:spPr>
+        <p:style>
+          <a:lnRef idx="1">
+            <a:schemeClr val="accent1"/>
+          </a:lnRef>
+          <a:fillRef idx="0">
+            <a:schemeClr val="accent1"/>
+          </a:fillRef>
+          <a:effectRef idx="0">
+            <a:schemeClr val="accent1"/>
+          </a:effectRef>
+          <a:fontRef idx="minor">
+            <a:schemeClr val="tx1"/>
+          </a:fontRef>
+        </p:style>
+      </p:cxnSp>
+      <p:cxnSp>
+        <p:nvCxnSpPr>
+          <p:cNvPr id="128" name="Straight Connector 127">
+            <a:extLst>
+              <a:ext uri="{FF2B5EF4-FFF2-40B4-BE49-F238E27FC236}">
+                <a16:creationId xmlns:a16="http://schemas.microsoft.com/office/drawing/2014/main" id="{440B4903-F280-43A8-B046-DDD3ACE3475E}"/>
+              </a:ext>
+            </a:extLst>
+          </p:cNvPr>
+          <p:cNvCxnSpPr>
+            <a:cxnSpLocks/>
+            <a:stCxn id="45" idx="2"/>
+            <a:endCxn id="108" idx="0"/>
+          </p:cNvCxnSpPr>
+          <p:nvPr/>
+        </p:nvCxnSpPr>
+        <p:spPr>
+          <a:xfrm>
+            <a:off x="7810788" y="3149724"/>
+            <a:ext cx="0" cy="132641"/>
+          </a:xfrm>
+          <a:prstGeom prst="line">
+            <a:avLst/>
+          </a:prstGeom>
+          <a:ln>
+            <a:prstDash val="dash"/>
+          </a:ln>
+        </p:spPr>
+        <p:style>
+          <a:lnRef idx="1">
+            <a:schemeClr val="accent1"/>
+          </a:lnRef>
+          <a:fillRef idx="0">
+            <a:schemeClr val="accent1"/>
+          </a:fillRef>
+          <a:effectRef idx="0">
+            <a:schemeClr val="accent1"/>
+          </a:effectRef>
+          <a:fontRef idx="minor">
+            <a:schemeClr val="tx1"/>
+          </a:fontRef>
+        </p:style>
+      </p:cxnSp>
+      <p:cxnSp>
+        <p:nvCxnSpPr>
+          <p:cNvPr id="162" name="Straight Arrow Connector 161">
+            <a:extLst>
+              <a:ext uri="{FF2B5EF4-FFF2-40B4-BE49-F238E27FC236}">
+                <a16:creationId xmlns:a16="http://schemas.microsoft.com/office/drawing/2014/main" id="{E8CF5385-BEF0-4C42-983C-EDE3DEC90CB9}"/>
+              </a:ext>
+            </a:extLst>
+          </p:cNvPr>
+          <p:cNvCxnSpPr>
+            <a:stCxn id="123" idx="3"/>
+            <a:endCxn id="31" idx="1"/>
+          </p:cNvCxnSpPr>
+          <p:nvPr/>
+        </p:nvCxnSpPr>
+        <p:spPr>
+          <a:xfrm flipV="1">
+            <a:off x="1228051" y="1641970"/>
+            <a:ext cx="767939" cy="909684"/>
+          </a:xfrm>
+          <a:prstGeom prst="straightConnector1">
+            <a:avLst/>
+          </a:prstGeom>
+          <a:ln>
+            <a:tailEnd type="triangle"/>
+          </a:ln>
+        </p:spPr>
+        <p:style>
+          <a:lnRef idx="1">
+            <a:schemeClr val="accent1"/>
+          </a:lnRef>
+          <a:fillRef idx="0">
+            <a:schemeClr val="accent1"/>
+          </a:fillRef>
+          <a:effectRef idx="0">
+            <a:schemeClr val="accent1"/>
+          </a:effectRef>
+          <a:fontRef idx="minor">
+            <a:schemeClr val="tx1"/>
+          </a:fontRef>
+        </p:style>
+      </p:cxnSp>
+      <p:cxnSp>
+        <p:nvCxnSpPr>
+          <p:cNvPr id="165" name="Connector: Elbow 164">
+            <a:extLst>
+              <a:ext uri="{FF2B5EF4-FFF2-40B4-BE49-F238E27FC236}">
+                <a16:creationId xmlns:a16="http://schemas.microsoft.com/office/drawing/2014/main" id="{6073BC5C-633A-481D-AFB0-3510071F587C}"/>
+              </a:ext>
+            </a:extLst>
+          </p:cNvPr>
+          <p:cNvCxnSpPr>
+            <a:cxnSpLocks/>
+            <a:stCxn id="50" idx="0"/>
+            <a:endCxn id="6" idx="1"/>
+          </p:cNvCxnSpPr>
+          <p:nvPr/>
+        </p:nvCxnSpPr>
+        <p:spPr>
+          <a:xfrm rot="5400000" flipH="1" flipV="1">
+            <a:off x="2793262" y="2363949"/>
+            <a:ext cx="292921" cy="1141113"/>
+          </a:xfrm>
+          <a:prstGeom prst="bentConnector2">
+            <a:avLst/>
+          </a:prstGeom>
+          <a:ln>
+            <a:tailEnd type="triangle"/>
+          </a:ln>
+        </p:spPr>
+        <p:style>
+          <a:lnRef idx="1">
+            <a:schemeClr val="accent1"/>
+          </a:lnRef>
+          <a:fillRef idx="0">
+            <a:schemeClr val="accent1"/>
+          </a:fillRef>
+          <a:effectRef idx="0">
+            <a:schemeClr val="accent1"/>
+          </a:effectRef>
+          <a:fontRef idx="minor">
+            <a:schemeClr val="tx1"/>
+          </a:fontRef>
+        </p:style>
+      </p:cxnSp>
+      <p:sp>
+        <p:nvSpPr>
+          <p:cNvPr id="195" name="TextBox 194">
+            <a:extLst>
+              <a:ext uri="{FF2B5EF4-FFF2-40B4-BE49-F238E27FC236}">
+                <a16:creationId xmlns:a16="http://schemas.microsoft.com/office/drawing/2014/main" id="{7DF6215B-1ECD-45F0-A34F-7B63F3576D2F}"/>
+              </a:ext>
+            </a:extLst>
+          </p:cNvPr>
+          <p:cNvSpPr txBox="1"/>
+          <p:nvPr/>
+        </p:nvSpPr>
+        <p:spPr>
+          <a:xfrm>
+            <a:off x="2606265" y="2582414"/>
+            <a:ext cx="768159" cy="230832"/>
+          </a:xfrm>
+          <a:prstGeom prst="rect">
+            <a:avLst/>
+          </a:prstGeom>
+          <a:noFill/>
+        </p:spPr>
+        <p:txBody>
+          <a:bodyPr wrap="none" rtlCol="0">
+            <a:spAutoFit/>
+          </a:bodyPr>
+          <a:lstStyle/>
+          <a:p>
+            <a:r>
+              <a:rPr lang="en-CA" sz="900" dirty="0"/>
+              <a:t>Docker push</a:t>
+            </a:r>
+          </a:p>
+        </p:txBody>
+      </p:sp>
+      <p:sp>
+        <p:nvSpPr>
+          <p:cNvPr id="196" name="TextBox 195">
+            <a:extLst>
+              <a:ext uri="{FF2B5EF4-FFF2-40B4-BE49-F238E27FC236}">
+                <a16:creationId xmlns:a16="http://schemas.microsoft.com/office/drawing/2014/main" id="{6F03F7E0-D395-45A1-9BC2-2F86B701012A}"/>
+              </a:ext>
+            </a:extLst>
+          </p:cNvPr>
+          <p:cNvSpPr txBox="1"/>
+          <p:nvPr/>
+        </p:nvSpPr>
+        <p:spPr>
+          <a:xfrm>
+            <a:off x="4594357" y="2539336"/>
+            <a:ext cx="716863" cy="230832"/>
+          </a:xfrm>
+          <a:prstGeom prst="rect">
+            <a:avLst/>
+          </a:prstGeom>
+          <a:solidFill>
+            <a:schemeClr val="bg1"/>
+          </a:solidFill>
+        </p:spPr>
+        <p:txBody>
+          <a:bodyPr wrap="none" rtlCol="0">
+            <a:spAutoFit/>
+          </a:bodyPr>
+          <a:lstStyle/>
+          <a:p>
+            <a:r>
+              <a:rPr lang="en-CA" sz="900" dirty="0"/>
+              <a:t>Docker pull</a:t>
+            </a:r>
+          </a:p>
+        </p:txBody>
+      </p:sp>
+      <p:sp>
+        <p:nvSpPr>
+          <p:cNvPr id="199" name="TextBox 198">
+            <a:extLst>
+              <a:ext uri="{FF2B5EF4-FFF2-40B4-BE49-F238E27FC236}">
+                <a16:creationId xmlns:a16="http://schemas.microsoft.com/office/drawing/2014/main" id="{AE6CC085-83D5-4BB1-B9F3-E1A5F84DA80E}"/>
+              </a:ext>
+            </a:extLst>
+          </p:cNvPr>
+          <p:cNvSpPr txBox="1"/>
+          <p:nvPr/>
+        </p:nvSpPr>
+        <p:spPr>
+          <a:xfrm>
+            <a:off x="3691410" y="1390043"/>
+            <a:ext cx="428322" cy="230832"/>
+          </a:xfrm>
+          <a:prstGeom prst="rect">
+            <a:avLst/>
+          </a:prstGeom>
+          <a:solidFill>
+            <a:schemeClr val="bg1"/>
+          </a:solidFill>
+        </p:spPr>
+        <p:txBody>
+          <a:bodyPr wrap="none" rtlCol="0">
+            <a:spAutoFit/>
+          </a:bodyPr>
+          <a:lstStyle/>
+          <a:p>
+            <a:r>
+              <a:rPr lang="en-CA" sz="900" dirty="0"/>
+              <a:t>HTTP</a:t>
+            </a:r>
+          </a:p>
+        </p:txBody>
+      </p:sp>
+      <p:sp>
+        <p:nvSpPr>
+          <p:cNvPr id="200" name="TextBox 199">
+            <a:extLst>
+              <a:ext uri="{FF2B5EF4-FFF2-40B4-BE49-F238E27FC236}">
+                <a16:creationId xmlns:a16="http://schemas.microsoft.com/office/drawing/2014/main" id="{0D354B8D-4B83-4231-A901-2E2D1BD14F18}"/>
+              </a:ext>
+            </a:extLst>
+          </p:cNvPr>
+          <p:cNvSpPr txBox="1"/>
+          <p:nvPr/>
+        </p:nvSpPr>
+        <p:spPr>
+          <a:xfrm>
+            <a:off x="3758600" y="3454727"/>
+            <a:ext cx="569387" cy="230832"/>
+          </a:xfrm>
+          <a:prstGeom prst="rect">
+            <a:avLst/>
+          </a:prstGeom>
+          <a:solidFill>
+            <a:schemeClr val="bg1"/>
+          </a:solidFill>
+        </p:spPr>
+        <p:txBody>
+          <a:bodyPr wrap="none" rtlCol="0">
+            <a:spAutoFit/>
+          </a:bodyPr>
+          <a:lstStyle/>
+          <a:p>
+            <a:r>
+              <a:rPr lang="en-CA" sz="900" dirty="0"/>
+              <a:t>Push src</a:t>
+            </a:r>
+          </a:p>
+        </p:txBody>
+      </p:sp>
+      <p:sp>
+        <p:nvSpPr>
+          <p:cNvPr id="201" name="TextBox 200">
+            <a:extLst>
+              <a:ext uri="{FF2B5EF4-FFF2-40B4-BE49-F238E27FC236}">
+                <a16:creationId xmlns:a16="http://schemas.microsoft.com/office/drawing/2014/main" id="{4103E5F5-A896-4729-BC0C-0822808DC57A}"/>
+              </a:ext>
+            </a:extLst>
+          </p:cNvPr>
+          <p:cNvSpPr txBox="1"/>
+          <p:nvPr/>
+        </p:nvSpPr>
+        <p:spPr>
+          <a:xfrm>
+            <a:off x="1019936" y="1490642"/>
+            <a:ext cx="829073" cy="507831"/>
+          </a:xfrm>
+          <a:prstGeom prst="rect">
+            <a:avLst/>
+          </a:prstGeom>
+          <a:noFill/>
+        </p:spPr>
+        <p:txBody>
+          <a:bodyPr wrap="none" rtlCol="0">
+            <a:spAutoFit/>
+          </a:bodyPr>
+          <a:lstStyle/>
+          <a:p>
+            <a:pPr algn="ctr"/>
+            <a:r>
+              <a:rPr lang="en-CA" sz="900" dirty="0"/>
+              <a:t>Load test</a:t>
+            </a:r>
+          </a:p>
+          <a:p>
+            <a:pPr algn="ctr"/>
+            <a:r>
+              <a:rPr lang="en-CA" sz="900" dirty="0"/>
+              <a:t>/</a:t>
+            </a:r>
+          </a:p>
+          <a:p>
+            <a:pPr algn="ctr"/>
+            <a:r>
+              <a:rPr lang="en-CA" sz="900" dirty="0"/>
+              <a:t>Coverage test</a:t>
+            </a:r>
+          </a:p>
+        </p:txBody>
+      </p:sp>
+      <p:cxnSp>
+        <p:nvCxnSpPr>
+          <p:cNvPr id="12" name="Straight Arrow Connector 11">
+            <a:extLst>
+              <a:ext uri="{FF2B5EF4-FFF2-40B4-BE49-F238E27FC236}">
+                <a16:creationId xmlns:a16="http://schemas.microsoft.com/office/drawing/2014/main" id="{2E91B355-991C-4E1D-B391-BAD68E7F6A53}"/>
+              </a:ext>
+            </a:extLst>
+          </p:cNvPr>
+          <p:cNvCxnSpPr>
+            <a:stCxn id="31" idx="0"/>
+            <a:endCxn id="14" idx="2"/>
+          </p:cNvCxnSpPr>
+          <p:nvPr/>
+        </p:nvCxnSpPr>
+        <p:spPr>
+          <a:xfrm flipH="1" flipV="1">
+            <a:off x="2369164" y="685914"/>
+            <a:ext cx="1" cy="531011"/>
+          </a:xfrm>
+          <a:prstGeom prst="straightConnector1">
+            <a:avLst/>
+          </a:prstGeom>
+          <a:ln>
+            <a:tailEnd type="triangle"/>
+          </a:ln>
+        </p:spPr>
+        <p:style>
+          <a:lnRef idx="1">
+            <a:schemeClr val="accent1"/>
+          </a:lnRef>
+          <a:fillRef idx="0">
+            <a:schemeClr val="accent1"/>
+          </a:fillRef>
+          <a:effectRef idx="0">
+            <a:schemeClr val="accent1"/>
+          </a:effectRef>
+          <a:fontRef idx="minor">
+            <a:schemeClr val="tx1"/>
+          </a:fontRef>
+        </p:style>
+      </p:cxnSp>
+      <p:sp>
+        <p:nvSpPr>
+          <p:cNvPr id="49" name="TextBox 48">
+            <a:extLst>
+              <a:ext uri="{FF2B5EF4-FFF2-40B4-BE49-F238E27FC236}">
+                <a16:creationId xmlns:a16="http://schemas.microsoft.com/office/drawing/2014/main" id="{115BB779-781C-4E35-884C-9A8275A2AAF2}"/>
+              </a:ext>
+            </a:extLst>
+          </p:cNvPr>
+          <p:cNvSpPr txBox="1"/>
+          <p:nvPr/>
+        </p:nvSpPr>
+        <p:spPr>
+          <a:xfrm>
+            <a:off x="2392104" y="886986"/>
+            <a:ext cx="405880" cy="230832"/>
+          </a:xfrm>
+          <a:prstGeom prst="rect">
+            <a:avLst/>
+          </a:prstGeom>
+          <a:solidFill>
+            <a:schemeClr val="bg1"/>
+          </a:solidFill>
+        </p:spPr>
+        <p:txBody>
+          <a:bodyPr wrap="none" rtlCol="0">
+            <a:spAutoFit/>
+          </a:bodyPr>
+          <a:lstStyle/>
+          <a:p>
+            <a:r>
+              <a:rPr lang="en-CA" sz="900" dirty="0"/>
+              <a:t>Uses</a:t>
+            </a:r>
+          </a:p>
+        </p:txBody>
+      </p:sp>
+      <p:sp>
+        <p:nvSpPr>
+          <p:cNvPr id="43" name="Rectangle 42">
+            <a:extLst>
+              <a:ext uri="{FF2B5EF4-FFF2-40B4-BE49-F238E27FC236}">
+                <a16:creationId xmlns:a16="http://schemas.microsoft.com/office/drawing/2014/main" id="{8D810F9C-1904-45F9-8846-BFD890FB3242}"/>
+              </a:ext>
+            </a:extLst>
+          </p:cNvPr>
+          <p:cNvSpPr/>
+          <p:nvPr/>
+        </p:nvSpPr>
+        <p:spPr>
+          <a:xfrm>
+            <a:off x="7325010" y="2529194"/>
+            <a:ext cx="3706778" cy="1103542"/>
           </a:xfrm>
           <a:prstGeom prst="rect">
             <a:avLst/>
@@ -4617,19 +5120,18 @@
           </a:fontRef>
         </p:style>
         <p:txBody>
-          <a:bodyPr rtlCol="0" anchor="ctr" anchorCtr="0"/>
-          <a:lstStyle/>
-          <a:p>
-            <a:pPr algn="ctr"/>
-            <a:r>
-              <a:rPr lang="es-CO" sz="1200" b="1" dirty="0">
+          <a:bodyPr rtlCol="0" anchor="t" anchorCtr="0"/>
+          <a:lstStyle/>
+          <a:p>
+            <a:r>
+              <a:rPr lang="es-CO" sz="1200" u="sng" dirty="0">
                 <a:solidFill>
                   <a:schemeClr val="tx1"/>
                 </a:solidFill>
               </a:rPr>
-              <a:t>Biller container</a:t>
-            </a:r>
-            <a:endParaRPr lang="en-CA" sz="1200" b="1" dirty="0">
+              <a:t>NODE 2</a:t>
+            </a:r>
+            <a:endParaRPr lang="en-CA" sz="1200" u="sng" dirty="0">
               <a:solidFill>
                 <a:schemeClr val="tx1"/>
               </a:solidFill>
@@ -4639,10 +5141,10 @@
       </p:sp>
       <p:sp>
         <p:nvSpPr>
-          <p:cNvPr id="110" name="Rectangle 109">
-            <a:extLst>
-              <a:ext uri="{FF2B5EF4-FFF2-40B4-BE49-F238E27FC236}">
-                <a16:creationId xmlns:a16="http://schemas.microsoft.com/office/drawing/2014/main" id="{8B27DF39-3A57-4C2B-8E2C-D189435F0013}"/>
+          <p:cNvPr id="67" name="Rectangle 66">
+            <a:extLst>
+              <a:ext uri="{FF2B5EF4-FFF2-40B4-BE49-F238E27FC236}">
+                <a16:creationId xmlns:a16="http://schemas.microsoft.com/office/drawing/2014/main" id="{82AB7A12-2D1E-43B4-B152-F90C39FB7162}"/>
               </a:ext>
             </a:extLst>
           </p:cNvPr>
@@ -4651,8 +5153,8 @@
         </p:nvSpPr>
         <p:spPr>
           <a:xfrm>
-            <a:off x="9309386" y="2144316"/>
-            <a:ext cx="1514289" cy="407338"/>
+            <a:off x="8363135" y="2813246"/>
+            <a:ext cx="767940" cy="326675"/>
           </a:xfrm>
           <a:prstGeom prst="rect">
             <a:avLst/>
@@ -4681,32 +5183,48 @@
           </a:fontRef>
         </p:style>
         <p:txBody>
-          <a:bodyPr rot="0" spcFirstLastPara="0" vertOverflow="overflow" horzOverflow="overflow" vert="horz" wrap="square" lIns="91440" tIns="45720" rIns="91440" bIns="45720" numCol="1" spcCol="0" rtlCol="0" fromWordArt="0" anchor="ctr" anchorCtr="0" forceAA="0" compatLnSpc="1">
-            <a:prstTxWarp prst="textNoShape">
-              <a:avLst/>
-            </a:prstTxWarp>
-            <a:noAutofit/>
-          </a:bodyPr>
+          <a:bodyPr rtlCol="0" anchor="ctr" anchorCtr="0"/>
           <a:lstStyle/>
           <a:p>
             <a:pPr algn="ctr"/>
             <a:r>
-              <a:rPr lang="es-CO" sz="1200" b="1" dirty="0">
+              <a:rPr lang="es-CO" sz="1000" b="1" dirty="0" err="1">
                 <a:solidFill>
                   <a:schemeClr val="tx1"/>
                 </a:solidFill>
               </a:rPr>
-              <a:t>istio-proxy </a:t>
-            </a:r>
-          </a:p>
-        </p:txBody>
-      </p:sp>
-      <p:sp>
-        <p:nvSpPr>
-          <p:cNvPr id="111" name="Rectangle 110">
-            <a:extLst>
-              <a:ext uri="{FF2B5EF4-FFF2-40B4-BE49-F238E27FC236}">
-                <a16:creationId xmlns:a16="http://schemas.microsoft.com/office/drawing/2014/main" id="{6843C1C8-1D4E-46D7-80C5-A61684BD34A7}"/>
+              <a:t>Biller</a:t>
+            </a:r>
+            <a:endParaRPr lang="es-CO" sz="1000" b="1" dirty="0">
+              <a:solidFill>
+                <a:schemeClr val="tx1"/>
+              </a:solidFill>
+            </a:endParaRPr>
+          </a:p>
+          <a:p>
+            <a:pPr algn="ctr"/>
+            <a:r>
+              <a:rPr lang="es-CO" sz="1000" b="1" dirty="0">
+                <a:solidFill>
+                  <a:schemeClr val="tx1"/>
+                </a:solidFill>
+              </a:rPr>
+              <a:t>container</a:t>
+            </a:r>
+            <a:endParaRPr lang="en-CA" sz="1000" b="1" dirty="0">
+              <a:solidFill>
+                <a:schemeClr val="tx1"/>
+              </a:solidFill>
+            </a:endParaRPr>
+          </a:p>
+        </p:txBody>
+      </p:sp>
+      <p:sp>
+        <p:nvSpPr>
+          <p:cNvPr id="68" name="Rectangle 67">
+            <a:extLst>
+              <a:ext uri="{FF2B5EF4-FFF2-40B4-BE49-F238E27FC236}">
+                <a16:creationId xmlns:a16="http://schemas.microsoft.com/office/drawing/2014/main" id="{F96F24B0-9FD5-4260-907B-F212C7F054B1}"/>
               </a:ext>
             </a:extLst>
           </p:cNvPr>
@@ -4715,8 +5233,8 @@
         </p:nvSpPr>
         <p:spPr>
           <a:xfrm>
-            <a:off x="7747680" y="2673627"/>
-            <a:ext cx="1296145" cy="407338"/>
+            <a:off x="8363135" y="3272562"/>
+            <a:ext cx="767940" cy="307756"/>
           </a:xfrm>
           <a:prstGeom prst="rect">
             <a:avLst/>
@@ -4745,32 +5263,83 @@
           </a:fontRef>
         </p:style>
         <p:txBody>
-          <a:bodyPr rtlCol="0" anchor="ctr" anchorCtr="0"/>
+          <a:bodyPr rot="0" spcFirstLastPara="0" vertOverflow="overflow" horzOverflow="overflow" vert="horz" wrap="square" lIns="91440" tIns="45720" rIns="91440" bIns="45720" numCol="1" spcCol="0" rtlCol="0" fromWordArt="0" anchor="ctr" anchorCtr="0" forceAA="0" compatLnSpc="1">
+            <a:prstTxWarp prst="textNoShape">
+              <a:avLst/>
+            </a:prstTxWarp>
+            <a:noAutofit/>
+          </a:bodyPr>
           <a:lstStyle/>
           <a:p>
             <a:pPr algn="ctr"/>
             <a:r>
-              <a:rPr lang="es-CO" sz="1200" b="1" dirty="0">
+              <a:rPr lang="es-CO" sz="1000" b="1" dirty="0" err="1">
                 <a:solidFill>
                   <a:schemeClr val="tx1"/>
                 </a:solidFill>
               </a:rPr>
-              <a:t>User container</a:t>
-            </a:r>
-            <a:endParaRPr lang="en-CA" sz="1200" b="1" dirty="0">
-              <a:solidFill>
-                <a:schemeClr val="tx1"/>
-              </a:solidFill>
-            </a:endParaRPr>
-          </a:p>
-        </p:txBody>
-      </p:sp>
-      <p:sp>
-        <p:nvSpPr>
-          <p:cNvPr id="112" name="Rectangle 111">
-            <a:extLst>
-              <a:ext uri="{FF2B5EF4-FFF2-40B4-BE49-F238E27FC236}">
-                <a16:creationId xmlns:a16="http://schemas.microsoft.com/office/drawing/2014/main" id="{4ADF0154-321B-4D13-808D-EDCA43DDF381}"/>
+              <a:t>istio</a:t>
+            </a:r>
+            <a:r>
+              <a:rPr lang="es-CO" sz="1000" b="1" dirty="0">
+                <a:solidFill>
+                  <a:schemeClr val="tx1"/>
+                </a:solidFill>
+              </a:rPr>
+              <a:t>-proxy </a:t>
+            </a:r>
+          </a:p>
+        </p:txBody>
+      </p:sp>
+      <p:cxnSp>
+        <p:nvCxnSpPr>
+          <p:cNvPr id="69" name="Straight Connector 68">
+            <a:extLst>
+              <a:ext uri="{FF2B5EF4-FFF2-40B4-BE49-F238E27FC236}">
+                <a16:creationId xmlns:a16="http://schemas.microsoft.com/office/drawing/2014/main" id="{D99DB0F2-6A33-4059-A523-0F0E362D3432}"/>
+              </a:ext>
+            </a:extLst>
+          </p:cNvPr>
+          <p:cNvCxnSpPr>
+            <a:cxnSpLocks/>
+            <a:stCxn id="67" idx="2"/>
+            <a:endCxn id="68" idx="0"/>
+          </p:cNvCxnSpPr>
+          <p:nvPr/>
+        </p:nvCxnSpPr>
+        <p:spPr>
+          <a:xfrm>
+            <a:off x="8747105" y="3139921"/>
+            <a:ext cx="0" cy="132641"/>
+          </a:xfrm>
+          <a:prstGeom prst="line">
+            <a:avLst/>
+          </a:prstGeom>
+          <a:ln>
+            <a:prstDash val="dash"/>
+          </a:ln>
+        </p:spPr>
+        <p:style>
+          <a:lnRef idx="1">
+            <a:schemeClr val="accent1"/>
+          </a:lnRef>
+          <a:fillRef idx="0">
+            <a:schemeClr val="accent1"/>
+          </a:fillRef>
+          <a:effectRef idx="0">
+            <a:schemeClr val="accent1"/>
+          </a:effectRef>
+          <a:fontRef idx="minor">
+            <a:schemeClr val="tx1"/>
+          </a:fontRef>
+        </p:style>
+      </p:cxnSp>
+      <p:sp>
+        <p:nvSpPr>
+          <p:cNvPr id="70" name="Rectangle 69">
+            <a:extLst>
+              <a:ext uri="{FF2B5EF4-FFF2-40B4-BE49-F238E27FC236}">
+                <a16:creationId xmlns:a16="http://schemas.microsoft.com/office/drawing/2014/main" id="{BFC1072A-34B0-42EA-88CB-8E0BBBA84CEB}"/>
               </a:ext>
             </a:extLst>
           </p:cNvPr>
@@ -4779,8 +5348,8 @@
         </p:nvSpPr>
         <p:spPr>
           <a:xfrm>
-            <a:off x="9315693" y="2673627"/>
-            <a:ext cx="1514289" cy="407338"/>
+            <a:off x="9294274" y="2813246"/>
+            <a:ext cx="767940" cy="326675"/>
           </a:xfrm>
           <a:prstGeom prst="rect">
             <a:avLst/>
@@ -4809,40 +5378,48 @@
           </a:fontRef>
         </p:style>
         <p:txBody>
-          <a:bodyPr rot="0" spcFirstLastPara="0" vertOverflow="overflow" horzOverflow="overflow" vert="horz" wrap="square" lIns="91440" tIns="45720" rIns="91440" bIns="45720" numCol="1" spcCol="0" rtlCol="0" fromWordArt="0" anchor="ctr" anchorCtr="0" forceAA="0" compatLnSpc="1">
-            <a:prstTxWarp prst="textNoShape">
-              <a:avLst/>
-            </a:prstTxWarp>
-            <a:noAutofit/>
-          </a:bodyPr>
+          <a:bodyPr rtlCol="0" anchor="ctr" anchorCtr="0"/>
           <a:lstStyle/>
           <a:p>
             <a:pPr algn="ctr"/>
             <a:r>
-              <a:rPr lang="es-CO" sz="1200" b="1" dirty="0">
+              <a:rPr lang="es-CO" sz="1000" b="1" dirty="0" err="1">
                 <a:solidFill>
                   <a:schemeClr val="tx1"/>
                 </a:solidFill>
               </a:rPr>
-              <a:t>istio-proxy</a:t>
-            </a:r>
-            <a:r>
-              <a:rPr lang="es-CO" sz="1200" dirty="0">
+              <a:t>User</a:t>
+            </a:r>
+            <a:endParaRPr lang="es-CO" sz="1000" b="1" dirty="0">
+              <a:solidFill>
+                <a:schemeClr val="tx1"/>
+              </a:solidFill>
+            </a:endParaRPr>
+          </a:p>
+          <a:p>
+            <a:pPr algn="ctr"/>
+            <a:r>
+              <a:rPr lang="es-CO" sz="1000" b="1" dirty="0">
                 <a:solidFill>
                   <a:schemeClr val="tx1"/>
                 </a:solidFill>
               </a:rPr>
-              <a:t> </a:t>
-            </a:r>
-          </a:p>
-        </p:txBody>
-      </p:sp>
-      <p:sp>
-        <p:nvSpPr>
-          <p:cNvPr id="113" name="Rectangle 112">
-            <a:extLst>
-              <a:ext uri="{FF2B5EF4-FFF2-40B4-BE49-F238E27FC236}">
-                <a16:creationId xmlns:a16="http://schemas.microsoft.com/office/drawing/2014/main" id="{03ABD167-D2AF-48B8-B0CE-997AB2D8633D}"/>
+              <a:t>container</a:t>
+            </a:r>
+            <a:endParaRPr lang="en-CA" sz="1000" b="1" dirty="0">
+              <a:solidFill>
+                <a:schemeClr val="tx1"/>
+              </a:solidFill>
+            </a:endParaRPr>
+          </a:p>
+        </p:txBody>
+      </p:sp>
+      <p:sp>
+        <p:nvSpPr>
+          <p:cNvPr id="71" name="Rectangle 70">
+            <a:extLst>
+              <a:ext uri="{FF2B5EF4-FFF2-40B4-BE49-F238E27FC236}">
+                <a16:creationId xmlns:a16="http://schemas.microsoft.com/office/drawing/2014/main" id="{E7FF7030-1CB4-4951-B89B-EA4520E2C289}"/>
               </a:ext>
             </a:extLst>
           </p:cNvPr>
@@ -4851,8 +5428,8 @@
         </p:nvSpPr>
         <p:spPr>
           <a:xfrm>
-            <a:off x="7741373" y="3228558"/>
-            <a:ext cx="1296145" cy="407338"/>
+            <a:off x="9294274" y="3272562"/>
+            <a:ext cx="767940" cy="307756"/>
           </a:xfrm>
           <a:prstGeom prst="rect">
             <a:avLst/>
@@ -4881,32 +5458,83 @@
           </a:fontRef>
         </p:style>
         <p:txBody>
-          <a:bodyPr rtlCol="0" anchor="ctr" anchorCtr="0"/>
+          <a:bodyPr rot="0" spcFirstLastPara="0" vertOverflow="overflow" horzOverflow="overflow" vert="horz" wrap="square" lIns="91440" tIns="45720" rIns="91440" bIns="45720" numCol="1" spcCol="0" rtlCol="0" fromWordArt="0" anchor="ctr" anchorCtr="0" forceAA="0" compatLnSpc="1">
+            <a:prstTxWarp prst="textNoShape">
+              <a:avLst/>
+            </a:prstTxWarp>
+            <a:noAutofit/>
+          </a:bodyPr>
           <a:lstStyle/>
           <a:p>
             <a:pPr algn="ctr"/>
             <a:r>
-              <a:rPr lang="es-CO" sz="1200" b="1" dirty="0">
+              <a:rPr lang="es-CO" sz="1000" b="1" dirty="0" err="1">
                 <a:solidFill>
                   <a:schemeClr val="tx1"/>
                 </a:solidFill>
               </a:rPr>
-              <a:t>DB container</a:t>
-            </a:r>
-            <a:endParaRPr lang="en-CA" sz="1200" b="1" dirty="0">
-              <a:solidFill>
-                <a:schemeClr val="tx1"/>
-              </a:solidFill>
-            </a:endParaRPr>
-          </a:p>
-        </p:txBody>
-      </p:sp>
-      <p:sp>
-        <p:nvSpPr>
-          <p:cNvPr id="114" name="Rectangle 113">
-            <a:extLst>
-              <a:ext uri="{FF2B5EF4-FFF2-40B4-BE49-F238E27FC236}">
-                <a16:creationId xmlns:a16="http://schemas.microsoft.com/office/drawing/2014/main" id="{14FEE8B4-F6BE-4666-B206-49EB60103A91}"/>
+              <a:t>istio</a:t>
+            </a:r>
+            <a:r>
+              <a:rPr lang="es-CO" sz="1000" b="1" dirty="0">
+                <a:solidFill>
+                  <a:schemeClr val="tx1"/>
+                </a:solidFill>
+              </a:rPr>
+              <a:t>-proxy </a:t>
+            </a:r>
+          </a:p>
+        </p:txBody>
+      </p:sp>
+      <p:cxnSp>
+        <p:nvCxnSpPr>
+          <p:cNvPr id="72" name="Straight Connector 71">
+            <a:extLst>
+              <a:ext uri="{FF2B5EF4-FFF2-40B4-BE49-F238E27FC236}">
+                <a16:creationId xmlns:a16="http://schemas.microsoft.com/office/drawing/2014/main" id="{69631590-2DA4-421B-BC65-1B1BBC13EA6B}"/>
+              </a:ext>
+            </a:extLst>
+          </p:cNvPr>
+          <p:cNvCxnSpPr>
+            <a:cxnSpLocks/>
+            <a:stCxn id="70" idx="2"/>
+            <a:endCxn id="71" idx="0"/>
+          </p:cNvCxnSpPr>
+          <p:nvPr/>
+        </p:nvCxnSpPr>
+        <p:spPr>
+          <a:xfrm>
+            <a:off x="9678244" y="3139921"/>
+            <a:ext cx="0" cy="132641"/>
+          </a:xfrm>
+          <a:prstGeom prst="line">
+            <a:avLst/>
+          </a:prstGeom>
+          <a:ln>
+            <a:prstDash val="dash"/>
+          </a:ln>
+        </p:spPr>
+        <p:style>
+          <a:lnRef idx="1">
+            <a:schemeClr val="accent1"/>
+          </a:lnRef>
+          <a:fillRef idx="0">
+            <a:schemeClr val="accent1"/>
+          </a:fillRef>
+          <a:effectRef idx="0">
+            <a:schemeClr val="accent1"/>
+          </a:effectRef>
+          <a:fontRef idx="minor">
+            <a:schemeClr val="tx1"/>
+          </a:fontRef>
+        </p:style>
+      </p:cxnSp>
+      <p:sp>
+        <p:nvSpPr>
+          <p:cNvPr id="73" name="Rectangle 72">
+            <a:extLst>
+              <a:ext uri="{FF2B5EF4-FFF2-40B4-BE49-F238E27FC236}">
+                <a16:creationId xmlns:a16="http://schemas.microsoft.com/office/drawing/2014/main" id="{62970A1B-36FE-4CA1-95FD-C6C664576FCA}"/>
               </a:ext>
             </a:extLst>
           </p:cNvPr>
@@ -4915,8 +5543,8 @@
         </p:nvSpPr>
         <p:spPr>
           <a:xfrm>
-            <a:off x="9309386" y="3228558"/>
-            <a:ext cx="1514289" cy="407338"/>
+            <a:off x="10175514" y="2813246"/>
+            <a:ext cx="767940" cy="326675"/>
           </a:xfrm>
           <a:prstGeom prst="rect">
             <a:avLst/>
@@ -4945,32 +5573,43 @@
           </a:fontRef>
         </p:style>
         <p:txBody>
-          <a:bodyPr rot="0" spcFirstLastPara="0" vertOverflow="overflow" horzOverflow="overflow" vert="horz" wrap="square" lIns="91440" tIns="45720" rIns="91440" bIns="45720" numCol="1" spcCol="0" rtlCol="0" fromWordArt="0" anchor="ctr" anchorCtr="0" forceAA="0" compatLnSpc="1">
-            <a:prstTxWarp prst="textNoShape">
-              <a:avLst/>
-            </a:prstTxWarp>
-            <a:noAutofit/>
-          </a:bodyPr>
+          <a:bodyPr rtlCol="0" anchor="ctr" anchorCtr="0"/>
           <a:lstStyle/>
           <a:p>
             <a:pPr algn="ctr"/>
             <a:r>
-              <a:rPr lang="es-CO" sz="1200" b="1" dirty="0">
+              <a:rPr lang="es-CO" sz="1000" b="1" dirty="0">
                 <a:solidFill>
                   <a:schemeClr val="tx1"/>
                 </a:solidFill>
               </a:rPr>
-              <a:t>istio-proxy </a:t>
-            </a:r>
-          </a:p>
-        </p:txBody>
-      </p:sp>
-      <p:sp>
-        <p:nvSpPr>
-          <p:cNvPr id="121" name="Flowchart: Magnetic Disk 120">
-            <a:extLst>
-              <a:ext uri="{FF2B5EF4-FFF2-40B4-BE49-F238E27FC236}">
-                <a16:creationId xmlns:a16="http://schemas.microsoft.com/office/drawing/2014/main" id="{41FF734B-146B-4B68-BA9E-6EA34601A827}"/>
+              <a:t>DB </a:t>
+            </a:r>
+          </a:p>
+          <a:p>
+            <a:pPr algn="ctr"/>
+            <a:r>
+              <a:rPr lang="es-CO" sz="1000" b="1" dirty="0">
+                <a:solidFill>
+                  <a:schemeClr val="tx1"/>
+                </a:solidFill>
+              </a:rPr>
+              <a:t>container</a:t>
+            </a:r>
+            <a:endParaRPr lang="en-CA" sz="1000" b="1" dirty="0">
+              <a:solidFill>
+                <a:schemeClr val="tx1"/>
+              </a:solidFill>
+            </a:endParaRPr>
+          </a:p>
+        </p:txBody>
+      </p:sp>
+      <p:sp>
+        <p:nvSpPr>
+          <p:cNvPr id="74" name="Rectangle 73">
+            <a:extLst>
+              <a:ext uri="{FF2B5EF4-FFF2-40B4-BE49-F238E27FC236}">
+                <a16:creationId xmlns:a16="http://schemas.microsoft.com/office/drawing/2014/main" id="{077D8E34-C5C2-455F-8184-E1AA72D6797F}"/>
               </a:ext>
             </a:extLst>
           </p:cNvPr>
@@ -4979,10 +5618,10 @@
         </p:nvSpPr>
         <p:spPr>
           <a:xfrm>
-            <a:off x="7810788" y="5757333"/>
-            <a:ext cx="1050990" cy="766227"/>
-          </a:xfrm>
-          <a:prstGeom prst="flowChartMagneticDisk">
+            <a:off x="10175514" y="3272562"/>
+            <a:ext cx="767940" cy="307756"/>
+          </a:xfrm>
+          <a:prstGeom prst="rect">
             <a:avLst/>
           </a:prstGeom>
           <a:noFill/>
@@ -5009,86 +5648,830 @@
           </a:fontRef>
         </p:style>
         <p:txBody>
-          <a:bodyPr rtlCol="0" anchor="ctr"/>
+          <a:bodyPr rot="0" spcFirstLastPara="0" vertOverflow="overflow" horzOverflow="overflow" vert="horz" wrap="square" lIns="91440" tIns="45720" rIns="91440" bIns="45720" numCol="1" spcCol="0" rtlCol="0" fromWordArt="0" anchor="ctr" anchorCtr="0" forceAA="0" compatLnSpc="1">
+            <a:prstTxWarp prst="textNoShape">
+              <a:avLst/>
+            </a:prstTxWarp>
+            <a:noAutofit/>
+          </a:bodyPr>
           <a:lstStyle/>
           <a:p>
             <a:pPr algn="ctr"/>
             <a:r>
-              <a:rPr lang="en-CA" sz="1400" dirty="0">
+              <a:rPr lang="es-CO" sz="1000" b="1" dirty="0" err="1">
                 <a:solidFill>
                   <a:schemeClr val="tx1"/>
                 </a:solidFill>
               </a:rPr>
-              <a:t>DynamoDB</a:t>
-            </a:r>
-          </a:p>
-        </p:txBody>
-      </p:sp>
-      <p:pic>
-        <p:nvPicPr>
-          <p:cNvPr id="123" name="Graphic 122" descr="Users">
-            <a:extLst>
-              <a:ext uri="{FF2B5EF4-FFF2-40B4-BE49-F238E27FC236}">
-                <a16:creationId xmlns:a16="http://schemas.microsoft.com/office/drawing/2014/main" id="{1756A35F-981D-4229-B646-7747D1D186AB}"/>
-              </a:ext>
-            </a:extLst>
-          </p:cNvPr>
-          <p:cNvPicPr>
-            <a:picLocks noChangeAspect="1"/>
-          </p:cNvPicPr>
+              <a:t>istio</a:t>
+            </a:r>
+            <a:r>
+              <a:rPr lang="es-CO" sz="1000" b="1" dirty="0">
+                <a:solidFill>
+                  <a:schemeClr val="tx1"/>
+                </a:solidFill>
+              </a:rPr>
+              <a:t>-proxy </a:t>
+            </a:r>
+          </a:p>
+        </p:txBody>
+      </p:sp>
+      <p:cxnSp>
+        <p:nvCxnSpPr>
+          <p:cNvPr id="75" name="Straight Connector 74">
+            <a:extLst>
+              <a:ext uri="{FF2B5EF4-FFF2-40B4-BE49-F238E27FC236}">
+                <a16:creationId xmlns:a16="http://schemas.microsoft.com/office/drawing/2014/main" id="{61C1983B-6315-482B-8969-7503FEF94CFB}"/>
+              </a:ext>
+            </a:extLst>
+          </p:cNvPr>
+          <p:cNvCxnSpPr>
+            <a:cxnSpLocks/>
+            <a:stCxn id="73" idx="2"/>
+            <a:endCxn id="74" idx="0"/>
+          </p:cNvCxnSpPr>
           <p:nvPr/>
-        </p:nvPicPr>
-        <p:blipFill>
-          <a:blip r:embed="rId2">
-            <a:extLst>
-              <a:ext uri="{28A0092B-C50C-407E-A947-70E740481C1C}">
-                <a14:useLocalDpi xmlns:a14="http://schemas.microsoft.com/office/drawing/2010/main" val="0"/>
-              </a:ext>
-              <a:ext uri="{96DAC541-7B7A-43D3-8B79-37D633B846F1}">
-                <asvg:svgBlip xmlns:asvg="http://schemas.microsoft.com/office/drawing/2016/SVG/main" r:embed="rId3"/>
-              </a:ext>
-            </a:extLst>
-          </a:blip>
-          <a:stretch>
-            <a:fillRect/>
-          </a:stretch>
-        </p:blipFill>
-        <p:spPr>
-          <a:xfrm>
-            <a:off x="313651" y="2094454"/>
-            <a:ext cx="914400" cy="914400"/>
+        </p:nvCxnSpPr>
+        <p:spPr>
+          <a:xfrm>
+            <a:off x="10559484" y="3139921"/>
+            <a:ext cx="0" cy="132641"/>
+          </a:xfrm>
+          <a:prstGeom prst="line">
+            <a:avLst/>
+          </a:prstGeom>
+          <a:ln>
+            <a:prstDash val="dash"/>
+          </a:ln>
+        </p:spPr>
+        <p:style>
+          <a:lnRef idx="1">
+            <a:schemeClr val="accent1"/>
+          </a:lnRef>
+          <a:fillRef idx="0">
+            <a:schemeClr val="accent1"/>
+          </a:fillRef>
+          <a:effectRef idx="0">
+            <a:schemeClr val="accent1"/>
+          </a:effectRef>
+          <a:fontRef idx="minor">
+            <a:schemeClr val="tx1"/>
+          </a:fontRef>
+        </p:style>
+      </p:cxnSp>
+      <p:sp>
+        <p:nvSpPr>
+          <p:cNvPr id="76" name="Rectangle 75">
+            <a:extLst>
+              <a:ext uri="{FF2B5EF4-FFF2-40B4-BE49-F238E27FC236}">
+                <a16:creationId xmlns:a16="http://schemas.microsoft.com/office/drawing/2014/main" id="{6E9F0B61-B86E-46DB-9737-78E3B42C2C98}"/>
+              </a:ext>
+            </a:extLst>
+          </p:cNvPr>
+          <p:cNvSpPr/>
+          <p:nvPr/>
+        </p:nvSpPr>
+        <p:spPr>
+          <a:xfrm>
+            <a:off x="7421069" y="1500445"/>
+            <a:ext cx="767940" cy="326675"/>
           </a:xfrm>
           <a:prstGeom prst="rect">
             <a:avLst/>
           </a:prstGeom>
-        </p:spPr>
-      </p:pic>
+          <a:noFill/>
+          <a:ln>
+            <a:solidFill>
+              <a:schemeClr val="tx1"/>
+            </a:solidFill>
+          </a:ln>
+        </p:spPr>
+        <p:style>
+          <a:lnRef idx="2">
+            <a:schemeClr val="accent1">
+              <a:shade val="50000"/>
+            </a:schemeClr>
+          </a:lnRef>
+          <a:fillRef idx="1">
+            <a:schemeClr val="accent1"/>
+          </a:fillRef>
+          <a:effectRef idx="0">
+            <a:schemeClr val="accent1"/>
+          </a:effectRef>
+          <a:fontRef idx="minor">
+            <a:schemeClr val="lt1"/>
+          </a:fontRef>
+        </p:style>
+        <p:txBody>
+          <a:bodyPr rtlCol="0" anchor="ctr" anchorCtr="0"/>
+          <a:lstStyle/>
+          <a:p>
+            <a:pPr algn="ctr"/>
+            <a:r>
+              <a:rPr lang="es-CO" sz="1000" b="1" dirty="0">
+                <a:solidFill>
+                  <a:schemeClr val="tx1"/>
+                </a:solidFill>
+              </a:rPr>
+              <a:t>Bill </a:t>
+            </a:r>
+          </a:p>
+          <a:p>
+            <a:pPr algn="ctr"/>
+            <a:r>
+              <a:rPr lang="es-CO" sz="1000" b="1" dirty="0">
+                <a:solidFill>
+                  <a:schemeClr val="tx1"/>
+                </a:solidFill>
+              </a:rPr>
+              <a:t>container</a:t>
+            </a:r>
+            <a:endParaRPr lang="en-CA" sz="1000" b="1" dirty="0">
+              <a:solidFill>
+                <a:schemeClr val="tx1"/>
+              </a:solidFill>
+            </a:endParaRPr>
+          </a:p>
+        </p:txBody>
+      </p:sp>
+      <p:sp>
+        <p:nvSpPr>
+          <p:cNvPr id="77" name="Rectangle 76">
+            <a:extLst>
+              <a:ext uri="{FF2B5EF4-FFF2-40B4-BE49-F238E27FC236}">
+                <a16:creationId xmlns:a16="http://schemas.microsoft.com/office/drawing/2014/main" id="{7D87CCEC-2FAD-40F5-BAFE-896560BD2599}"/>
+              </a:ext>
+            </a:extLst>
+          </p:cNvPr>
+          <p:cNvSpPr/>
+          <p:nvPr/>
+        </p:nvSpPr>
+        <p:spPr>
+          <a:xfrm>
+            <a:off x="7421069" y="1959761"/>
+            <a:ext cx="767940" cy="307756"/>
+          </a:xfrm>
+          <a:prstGeom prst="rect">
+            <a:avLst/>
+          </a:prstGeom>
+          <a:noFill/>
+          <a:ln>
+            <a:solidFill>
+              <a:schemeClr val="tx1"/>
+            </a:solidFill>
+          </a:ln>
+        </p:spPr>
+        <p:style>
+          <a:lnRef idx="2">
+            <a:schemeClr val="accent1">
+              <a:shade val="50000"/>
+            </a:schemeClr>
+          </a:lnRef>
+          <a:fillRef idx="1">
+            <a:schemeClr val="accent1"/>
+          </a:fillRef>
+          <a:effectRef idx="0">
+            <a:schemeClr val="accent1"/>
+          </a:effectRef>
+          <a:fontRef idx="minor">
+            <a:schemeClr val="lt1"/>
+          </a:fontRef>
+        </p:style>
+        <p:txBody>
+          <a:bodyPr rot="0" spcFirstLastPara="0" vertOverflow="overflow" horzOverflow="overflow" vert="horz" wrap="square" lIns="91440" tIns="45720" rIns="91440" bIns="45720" numCol="1" spcCol="0" rtlCol="0" fromWordArt="0" anchor="ctr" anchorCtr="0" forceAA="0" compatLnSpc="1">
+            <a:prstTxWarp prst="textNoShape">
+              <a:avLst/>
+            </a:prstTxWarp>
+            <a:noAutofit/>
+          </a:bodyPr>
+          <a:lstStyle/>
+          <a:p>
+            <a:pPr algn="ctr"/>
+            <a:r>
+              <a:rPr lang="es-CO" sz="1000" b="1" dirty="0" err="1">
+                <a:solidFill>
+                  <a:schemeClr val="tx1"/>
+                </a:solidFill>
+              </a:rPr>
+              <a:t>istio</a:t>
+            </a:r>
+            <a:r>
+              <a:rPr lang="es-CO" sz="1000" b="1" dirty="0">
+                <a:solidFill>
+                  <a:schemeClr val="tx1"/>
+                </a:solidFill>
+              </a:rPr>
+              <a:t>-proxy </a:t>
+            </a:r>
+          </a:p>
+        </p:txBody>
+      </p:sp>
       <p:cxnSp>
         <p:nvCxnSpPr>
-          <p:cNvPr id="125" name="Straight Arrow Connector 124">
-            <a:extLst>
-              <a:ext uri="{FF2B5EF4-FFF2-40B4-BE49-F238E27FC236}">
-                <a16:creationId xmlns:a16="http://schemas.microsoft.com/office/drawing/2014/main" id="{18D22E3C-7BDE-4D04-AEF3-6F1274AAED87}"/>
+          <p:cNvPr id="78" name="Straight Connector 77">
+            <a:extLst>
+              <a:ext uri="{FF2B5EF4-FFF2-40B4-BE49-F238E27FC236}">
+                <a16:creationId xmlns:a16="http://schemas.microsoft.com/office/drawing/2014/main" id="{BECA2162-A0A5-440D-B195-9DC78AE31EAB}"/>
               </a:ext>
             </a:extLst>
           </p:cNvPr>
           <p:cNvCxnSpPr>
             <a:cxnSpLocks/>
-            <a:stCxn id="123" idx="3"/>
-            <a:endCxn id="50" idx="1"/>
+            <a:stCxn id="76" idx="2"/>
+            <a:endCxn id="77" idx="0"/>
           </p:cNvCxnSpPr>
           <p:nvPr/>
         </p:nvCxnSpPr>
         <p:spPr>
           <a:xfrm>
-            <a:off x="1228051" y="2551654"/>
-            <a:ext cx="767940" cy="844103"/>
-          </a:xfrm>
-          <a:prstGeom prst="straightConnector1">
+            <a:off x="7805039" y="1827120"/>
+            <a:ext cx="0" cy="132641"/>
+          </a:xfrm>
+          <a:prstGeom prst="line">
             <a:avLst/>
           </a:prstGeom>
           <a:ln>
-            <a:tailEnd type="triangle"/>
+            <a:prstDash val="dash"/>
+          </a:ln>
+        </p:spPr>
+        <p:style>
+          <a:lnRef idx="1">
+            <a:schemeClr val="accent1"/>
+          </a:lnRef>
+          <a:fillRef idx="0">
+            <a:schemeClr val="accent1"/>
+          </a:fillRef>
+          <a:effectRef idx="0">
+            <a:schemeClr val="accent1"/>
+          </a:effectRef>
+          <a:fontRef idx="minor">
+            <a:schemeClr val="tx1"/>
+          </a:fontRef>
+        </p:style>
+      </p:cxnSp>
+      <p:sp>
+        <p:nvSpPr>
+          <p:cNvPr id="79" name="Rectangle 78">
+            <a:extLst>
+              <a:ext uri="{FF2B5EF4-FFF2-40B4-BE49-F238E27FC236}">
+                <a16:creationId xmlns:a16="http://schemas.microsoft.com/office/drawing/2014/main" id="{D59615F5-C238-4FE9-BE66-58E276541CD0}"/>
+              </a:ext>
+            </a:extLst>
+          </p:cNvPr>
+          <p:cNvSpPr/>
+          <p:nvPr/>
+        </p:nvSpPr>
+        <p:spPr>
+          <a:xfrm>
+            <a:off x="8357386" y="1490642"/>
+            <a:ext cx="767940" cy="326675"/>
+          </a:xfrm>
+          <a:prstGeom prst="rect">
+            <a:avLst/>
+          </a:prstGeom>
+          <a:noFill/>
+          <a:ln>
+            <a:solidFill>
+              <a:schemeClr val="tx1"/>
+            </a:solidFill>
+          </a:ln>
+        </p:spPr>
+        <p:style>
+          <a:lnRef idx="2">
+            <a:schemeClr val="accent1">
+              <a:shade val="50000"/>
+            </a:schemeClr>
+          </a:lnRef>
+          <a:fillRef idx="1">
+            <a:schemeClr val="accent1"/>
+          </a:fillRef>
+          <a:effectRef idx="0">
+            <a:schemeClr val="accent1"/>
+          </a:effectRef>
+          <a:fontRef idx="minor">
+            <a:schemeClr val="lt1"/>
+          </a:fontRef>
+        </p:style>
+        <p:txBody>
+          <a:bodyPr rtlCol="0" anchor="ctr" anchorCtr="0"/>
+          <a:lstStyle/>
+          <a:p>
+            <a:pPr algn="ctr"/>
+            <a:r>
+              <a:rPr lang="es-CO" sz="1000" b="1" dirty="0" err="1">
+                <a:solidFill>
+                  <a:schemeClr val="tx1"/>
+                </a:solidFill>
+              </a:rPr>
+              <a:t>Biller</a:t>
+            </a:r>
+            <a:endParaRPr lang="es-CO" sz="1000" b="1" dirty="0">
+              <a:solidFill>
+                <a:schemeClr val="tx1"/>
+              </a:solidFill>
+            </a:endParaRPr>
+          </a:p>
+          <a:p>
+            <a:pPr algn="ctr"/>
+            <a:r>
+              <a:rPr lang="es-CO" sz="1000" b="1" dirty="0">
+                <a:solidFill>
+                  <a:schemeClr val="tx1"/>
+                </a:solidFill>
+              </a:rPr>
+              <a:t>container</a:t>
+            </a:r>
+            <a:endParaRPr lang="en-CA" sz="1000" b="1" dirty="0">
+              <a:solidFill>
+                <a:schemeClr val="tx1"/>
+              </a:solidFill>
+            </a:endParaRPr>
+          </a:p>
+        </p:txBody>
+      </p:sp>
+      <p:sp>
+        <p:nvSpPr>
+          <p:cNvPr id="80" name="Rectangle 79">
+            <a:extLst>
+              <a:ext uri="{FF2B5EF4-FFF2-40B4-BE49-F238E27FC236}">
+                <a16:creationId xmlns:a16="http://schemas.microsoft.com/office/drawing/2014/main" id="{6E45DEB7-9AEC-45F0-860A-B4EC82FE1DB4}"/>
+              </a:ext>
+            </a:extLst>
+          </p:cNvPr>
+          <p:cNvSpPr/>
+          <p:nvPr/>
+        </p:nvSpPr>
+        <p:spPr>
+          <a:xfrm>
+            <a:off x="8357386" y="1949958"/>
+            <a:ext cx="767940" cy="307756"/>
+          </a:xfrm>
+          <a:prstGeom prst="rect">
+            <a:avLst/>
+          </a:prstGeom>
+          <a:noFill/>
+          <a:ln>
+            <a:solidFill>
+              <a:schemeClr val="tx1"/>
+            </a:solidFill>
+          </a:ln>
+        </p:spPr>
+        <p:style>
+          <a:lnRef idx="2">
+            <a:schemeClr val="accent1">
+              <a:shade val="50000"/>
+            </a:schemeClr>
+          </a:lnRef>
+          <a:fillRef idx="1">
+            <a:schemeClr val="accent1"/>
+          </a:fillRef>
+          <a:effectRef idx="0">
+            <a:schemeClr val="accent1"/>
+          </a:effectRef>
+          <a:fontRef idx="minor">
+            <a:schemeClr val="lt1"/>
+          </a:fontRef>
+        </p:style>
+        <p:txBody>
+          <a:bodyPr rot="0" spcFirstLastPara="0" vertOverflow="overflow" horzOverflow="overflow" vert="horz" wrap="square" lIns="91440" tIns="45720" rIns="91440" bIns="45720" numCol="1" spcCol="0" rtlCol="0" fromWordArt="0" anchor="ctr" anchorCtr="0" forceAA="0" compatLnSpc="1">
+            <a:prstTxWarp prst="textNoShape">
+              <a:avLst/>
+            </a:prstTxWarp>
+            <a:noAutofit/>
+          </a:bodyPr>
+          <a:lstStyle/>
+          <a:p>
+            <a:pPr algn="ctr"/>
+            <a:r>
+              <a:rPr lang="es-CO" sz="1000" b="1" dirty="0" err="1">
+                <a:solidFill>
+                  <a:schemeClr val="tx1"/>
+                </a:solidFill>
+              </a:rPr>
+              <a:t>istio</a:t>
+            </a:r>
+            <a:r>
+              <a:rPr lang="es-CO" sz="1000" b="1" dirty="0">
+                <a:solidFill>
+                  <a:schemeClr val="tx1"/>
+                </a:solidFill>
+              </a:rPr>
+              <a:t>-proxy </a:t>
+            </a:r>
+          </a:p>
+        </p:txBody>
+      </p:sp>
+      <p:cxnSp>
+        <p:nvCxnSpPr>
+          <p:cNvPr id="81" name="Straight Connector 80">
+            <a:extLst>
+              <a:ext uri="{FF2B5EF4-FFF2-40B4-BE49-F238E27FC236}">
+                <a16:creationId xmlns:a16="http://schemas.microsoft.com/office/drawing/2014/main" id="{B56FFCCB-545E-4104-86CA-1AE618CABB53}"/>
+              </a:ext>
+            </a:extLst>
+          </p:cNvPr>
+          <p:cNvCxnSpPr>
+            <a:cxnSpLocks/>
+            <a:stCxn id="79" idx="2"/>
+            <a:endCxn id="80" idx="0"/>
+          </p:cNvCxnSpPr>
+          <p:nvPr/>
+        </p:nvCxnSpPr>
+        <p:spPr>
+          <a:xfrm>
+            <a:off x="8741356" y="1817317"/>
+            <a:ext cx="0" cy="132641"/>
+          </a:xfrm>
+          <a:prstGeom prst="line">
+            <a:avLst/>
+          </a:prstGeom>
+          <a:ln>
+            <a:prstDash val="dash"/>
+          </a:ln>
+        </p:spPr>
+        <p:style>
+          <a:lnRef idx="1">
+            <a:schemeClr val="accent1"/>
+          </a:lnRef>
+          <a:fillRef idx="0">
+            <a:schemeClr val="accent1"/>
+          </a:fillRef>
+          <a:effectRef idx="0">
+            <a:schemeClr val="accent1"/>
+          </a:effectRef>
+          <a:fontRef idx="minor">
+            <a:schemeClr val="tx1"/>
+          </a:fontRef>
+        </p:style>
+      </p:cxnSp>
+      <p:sp>
+        <p:nvSpPr>
+          <p:cNvPr id="82" name="Rectangle 81">
+            <a:extLst>
+              <a:ext uri="{FF2B5EF4-FFF2-40B4-BE49-F238E27FC236}">
+                <a16:creationId xmlns:a16="http://schemas.microsoft.com/office/drawing/2014/main" id="{7221EC60-186B-4B37-885B-D4F46F260BB8}"/>
+              </a:ext>
+            </a:extLst>
+          </p:cNvPr>
+          <p:cNvSpPr/>
+          <p:nvPr/>
+        </p:nvSpPr>
+        <p:spPr>
+          <a:xfrm>
+            <a:off x="9288525" y="1490642"/>
+            <a:ext cx="767940" cy="326675"/>
+          </a:xfrm>
+          <a:prstGeom prst="rect">
+            <a:avLst/>
+          </a:prstGeom>
+          <a:noFill/>
+          <a:ln>
+            <a:solidFill>
+              <a:schemeClr val="tx1"/>
+            </a:solidFill>
+          </a:ln>
+        </p:spPr>
+        <p:style>
+          <a:lnRef idx="2">
+            <a:schemeClr val="accent1">
+              <a:shade val="50000"/>
+            </a:schemeClr>
+          </a:lnRef>
+          <a:fillRef idx="1">
+            <a:schemeClr val="accent1"/>
+          </a:fillRef>
+          <a:effectRef idx="0">
+            <a:schemeClr val="accent1"/>
+          </a:effectRef>
+          <a:fontRef idx="minor">
+            <a:schemeClr val="lt1"/>
+          </a:fontRef>
+        </p:style>
+        <p:txBody>
+          <a:bodyPr rtlCol="0" anchor="ctr" anchorCtr="0"/>
+          <a:lstStyle/>
+          <a:p>
+            <a:pPr algn="ctr"/>
+            <a:r>
+              <a:rPr lang="es-CO" sz="1000" b="1" dirty="0" err="1">
+                <a:solidFill>
+                  <a:schemeClr val="tx1"/>
+                </a:solidFill>
+              </a:rPr>
+              <a:t>User</a:t>
+            </a:r>
+            <a:endParaRPr lang="es-CO" sz="1000" b="1" dirty="0">
+              <a:solidFill>
+                <a:schemeClr val="tx1"/>
+              </a:solidFill>
+            </a:endParaRPr>
+          </a:p>
+          <a:p>
+            <a:pPr algn="ctr"/>
+            <a:r>
+              <a:rPr lang="es-CO" sz="1000" b="1" dirty="0">
+                <a:solidFill>
+                  <a:schemeClr val="tx1"/>
+                </a:solidFill>
+              </a:rPr>
+              <a:t>container</a:t>
+            </a:r>
+            <a:endParaRPr lang="en-CA" sz="1000" b="1" dirty="0">
+              <a:solidFill>
+                <a:schemeClr val="tx1"/>
+              </a:solidFill>
+            </a:endParaRPr>
+          </a:p>
+        </p:txBody>
+      </p:sp>
+      <p:sp>
+        <p:nvSpPr>
+          <p:cNvPr id="83" name="Rectangle 82">
+            <a:extLst>
+              <a:ext uri="{FF2B5EF4-FFF2-40B4-BE49-F238E27FC236}">
+                <a16:creationId xmlns:a16="http://schemas.microsoft.com/office/drawing/2014/main" id="{FF565496-EF3A-4BC7-85CA-C6BA82BBA229}"/>
+              </a:ext>
+            </a:extLst>
+          </p:cNvPr>
+          <p:cNvSpPr/>
+          <p:nvPr/>
+        </p:nvSpPr>
+        <p:spPr>
+          <a:xfrm>
+            <a:off x="9288525" y="1949958"/>
+            <a:ext cx="767940" cy="307756"/>
+          </a:xfrm>
+          <a:prstGeom prst="rect">
+            <a:avLst/>
+          </a:prstGeom>
+          <a:noFill/>
+          <a:ln>
+            <a:solidFill>
+              <a:schemeClr val="tx1"/>
+            </a:solidFill>
+          </a:ln>
+        </p:spPr>
+        <p:style>
+          <a:lnRef idx="2">
+            <a:schemeClr val="accent1">
+              <a:shade val="50000"/>
+            </a:schemeClr>
+          </a:lnRef>
+          <a:fillRef idx="1">
+            <a:schemeClr val="accent1"/>
+          </a:fillRef>
+          <a:effectRef idx="0">
+            <a:schemeClr val="accent1"/>
+          </a:effectRef>
+          <a:fontRef idx="minor">
+            <a:schemeClr val="lt1"/>
+          </a:fontRef>
+        </p:style>
+        <p:txBody>
+          <a:bodyPr rot="0" spcFirstLastPara="0" vertOverflow="overflow" horzOverflow="overflow" vert="horz" wrap="square" lIns="91440" tIns="45720" rIns="91440" bIns="45720" numCol="1" spcCol="0" rtlCol="0" fromWordArt="0" anchor="ctr" anchorCtr="0" forceAA="0" compatLnSpc="1">
+            <a:prstTxWarp prst="textNoShape">
+              <a:avLst/>
+            </a:prstTxWarp>
+            <a:noAutofit/>
+          </a:bodyPr>
+          <a:lstStyle/>
+          <a:p>
+            <a:pPr algn="ctr"/>
+            <a:r>
+              <a:rPr lang="es-CO" sz="1000" b="1" dirty="0" err="1">
+                <a:solidFill>
+                  <a:schemeClr val="tx1"/>
+                </a:solidFill>
+              </a:rPr>
+              <a:t>istio</a:t>
+            </a:r>
+            <a:r>
+              <a:rPr lang="es-CO" sz="1000" b="1" dirty="0">
+                <a:solidFill>
+                  <a:schemeClr val="tx1"/>
+                </a:solidFill>
+              </a:rPr>
+              <a:t>-proxy </a:t>
+            </a:r>
+          </a:p>
+        </p:txBody>
+      </p:sp>
+      <p:cxnSp>
+        <p:nvCxnSpPr>
+          <p:cNvPr id="84" name="Straight Connector 83">
+            <a:extLst>
+              <a:ext uri="{FF2B5EF4-FFF2-40B4-BE49-F238E27FC236}">
+                <a16:creationId xmlns:a16="http://schemas.microsoft.com/office/drawing/2014/main" id="{5FEE30E0-503A-4FEE-B881-FDD32D8CEB8F}"/>
+              </a:ext>
+            </a:extLst>
+          </p:cNvPr>
+          <p:cNvCxnSpPr>
+            <a:cxnSpLocks/>
+            <a:stCxn id="82" idx="2"/>
+            <a:endCxn id="83" idx="0"/>
+          </p:cNvCxnSpPr>
+          <p:nvPr/>
+        </p:nvCxnSpPr>
+        <p:spPr>
+          <a:xfrm>
+            <a:off x="9672495" y="1817317"/>
+            <a:ext cx="0" cy="132641"/>
+          </a:xfrm>
+          <a:prstGeom prst="line">
+            <a:avLst/>
+          </a:prstGeom>
+          <a:ln>
+            <a:prstDash val="dash"/>
+          </a:ln>
+        </p:spPr>
+        <p:style>
+          <a:lnRef idx="1">
+            <a:schemeClr val="accent1"/>
+          </a:lnRef>
+          <a:fillRef idx="0">
+            <a:schemeClr val="accent1"/>
+          </a:fillRef>
+          <a:effectRef idx="0">
+            <a:schemeClr val="accent1"/>
+          </a:effectRef>
+          <a:fontRef idx="minor">
+            <a:schemeClr val="tx1"/>
+          </a:fontRef>
+        </p:style>
+      </p:cxnSp>
+      <p:sp>
+        <p:nvSpPr>
+          <p:cNvPr id="85" name="Rectangle 84">
+            <a:extLst>
+              <a:ext uri="{FF2B5EF4-FFF2-40B4-BE49-F238E27FC236}">
+                <a16:creationId xmlns:a16="http://schemas.microsoft.com/office/drawing/2014/main" id="{96B1DF93-4F7A-4742-AFA8-B5BB237621AA}"/>
+              </a:ext>
+            </a:extLst>
+          </p:cNvPr>
+          <p:cNvSpPr/>
+          <p:nvPr/>
+        </p:nvSpPr>
+        <p:spPr>
+          <a:xfrm>
+            <a:off x="10169765" y="1490642"/>
+            <a:ext cx="767940" cy="326675"/>
+          </a:xfrm>
+          <a:prstGeom prst="rect">
+            <a:avLst/>
+          </a:prstGeom>
+          <a:noFill/>
+          <a:ln>
+            <a:solidFill>
+              <a:schemeClr val="tx1"/>
+            </a:solidFill>
+          </a:ln>
+        </p:spPr>
+        <p:style>
+          <a:lnRef idx="2">
+            <a:schemeClr val="accent1">
+              <a:shade val="50000"/>
+            </a:schemeClr>
+          </a:lnRef>
+          <a:fillRef idx="1">
+            <a:schemeClr val="accent1"/>
+          </a:fillRef>
+          <a:effectRef idx="0">
+            <a:schemeClr val="accent1"/>
+          </a:effectRef>
+          <a:fontRef idx="minor">
+            <a:schemeClr val="lt1"/>
+          </a:fontRef>
+        </p:style>
+        <p:txBody>
+          <a:bodyPr rtlCol="0" anchor="ctr" anchorCtr="0"/>
+          <a:lstStyle/>
+          <a:p>
+            <a:pPr algn="ctr"/>
+            <a:r>
+              <a:rPr lang="es-CO" sz="1000" b="1" dirty="0">
+                <a:solidFill>
+                  <a:schemeClr val="tx1"/>
+                </a:solidFill>
+              </a:rPr>
+              <a:t>DB </a:t>
+            </a:r>
+          </a:p>
+          <a:p>
+            <a:pPr algn="ctr"/>
+            <a:r>
+              <a:rPr lang="es-CO" sz="1000" b="1" dirty="0">
+                <a:solidFill>
+                  <a:schemeClr val="tx1"/>
+                </a:solidFill>
+              </a:rPr>
+              <a:t>container</a:t>
+            </a:r>
+            <a:endParaRPr lang="en-CA" sz="1000" b="1" dirty="0">
+              <a:solidFill>
+                <a:schemeClr val="tx1"/>
+              </a:solidFill>
+            </a:endParaRPr>
+          </a:p>
+        </p:txBody>
+      </p:sp>
+      <p:sp>
+        <p:nvSpPr>
+          <p:cNvPr id="86" name="Rectangle 85">
+            <a:extLst>
+              <a:ext uri="{FF2B5EF4-FFF2-40B4-BE49-F238E27FC236}">
+                <a16:creationId xmlns:a16="http://schemas.microsoft.com/office/drawing/2014/main" id="{F597B869-34A1-4E7D-8CA7-7EC6FE106C37}"/>
+              </a:ext>
+            </a:extLst>
+          </p:cNvPr>
+          <p:cNvSpPr/>
+          <p:nvPr/>
+        </p:nvSpPr>
+        <p:spPr>
+          <a:xfrm>
+            <a:off x="10169765" y="1949958"/>
+            <a:ext cx="767940" cy="307756"/>
+          </a:xfrm>
+          <a:prstGeom prst="rect">
+            <a:avLst/>
+          </a:prstGeom>
+          <a:noFill/>
+          <a:ln>
+            <a:solidFill>
+              <a:schemeClr val="tx1"/>
+            </a:solidFill>
+          </a:ln>
+        </p:spPr>
+        <p:style>
+          <a:lnRef idx="2">
+            <a:schemeClr val="accent1">
+              <a:shade val="50000"/>
+            </a:schemeClr>
+          </a:lnRef>
+          <a:fillRef idx="1">
+            <a:schemeClr val="accent1"/>
+          </a:fillRef>
+          <a:effectRef idx="0">
+            <a:schemeClr val="accent1"/>
+          </a:effectRef>
+          <a:fontRef idx="minor">
+            <a:schemeClr val="lt1"/>
+          </a:fontRef>
+        </p:style>
+        <p:txBody>
+          <a:bodyPr rot="0" spcFirstLastPara="0" vertOverflow="overflow" horzOverflow="overflow" vert="horz" wrap="square" lIns="91440" tIns="45720" rIns="91440" bIns="45720" numCol="1" spcCol="0" rtlCol="0" fromWordArt="0" anchor="ctr" anchorCtr="0" forceAA="0" compatLnSpc="1">
+            <a:prstTxWarp prst="textNoShape">
+              <a:avLst/>
+            </a:prstTxWarp>
+            <a:noAutofit/>
+          </a:bodyPr>
+          <a:lstStyle/>
+          <a:p>
+            <a:pPr algn="ctr"/>
+            <a:r>
+              <a:rPr lang="es-CO" sz="1000" b="1" dirty="0" err="1">
+                <a:solidFill>
+                  <a:schemeClr val="tx1"/>
+                </a:solidFill>
+              </a:rPr>
+              <a:t>istio</a:t>
+            </a:r>
+            <a:r>
+              <a:rPr lang="es-CO" sz="1000" b="1" dirty="0">
+                <a:solidFill>
+                  <a:schemeClr val="tx1"/>
+                </a:solidFill>
+              </a:rPr>
+              <a:t>-proxy </a:t>
+            </a:r>
+          </a:p>
+        </p:txBody>
+      </p:sp>
+      <p:cxnSp>
+        <p:nvCxnSpPr>
+          <p:cNvPr id="87" name="Straight Connector 86">
+            <a:extLst>
+              <a:ext uri="{FF2B5EF4-FFF2-40B4-BE49-F238E27FC236}">
+                <a16:creationId xmlns:a16="http://schemas.microsoft.com/office/drawing/2014/main" id="{176C29AA-E006-4D5D-A973-658C423D3EBA}"/>
+              </a:ext>
+            </a:extLst>
+          </p:cNvPr>
+          <p:cNvCxnSpPr>
+            <a:cxnSpLocks/>
+            <a:stCxn id="85" idx="2"/>
+            <a:endCxn id="86" idx="0"/>
+          </p:cNvCxnSpPr>
+          <p:nvPr/>
+        </p:nvCxnSpPr>
+        <p:spPr>
+          <a:xfrm>
+            <a:off x="10553735" y="1817317"/>
+            <a:ext cx="0" cy="132641"/>
+          </a:xfrm>
+          <a:prstGeom prst="line">
+            <a:avLst/>
+          </a:prstGeom>
+          <a:ln>
+            <a:prstDash val="dash"/>
           </a:ln>
         </p:spPr>
         <p:style>
@@ -5108,30 +6491,33 @@
       </p:cxnSp>
       <p:cxnSp>
         <p:nvCxnSpPr>
-          <p:cNvPr id="128" name="Straight Connector 127">
-            <a:extLst>
-              <a:ext uri="{FF2B5EF4-FFF2-40B4-BE49-F238E27FC236}">
-                <a16:creationId xmlns:a16="http://schemas.microsoft.com/office/drawing/2014/main" id="{440B4903-F280-43A8-B046-DDD3ACE3475E}"/>
+          <p:cNvPr id="28" name="Connector: Elbow 27">
+            <a:extLst>
+              <a:ext uri="{FF2B5EF4-FFF2-40B4-BE49-F238E27FC236}">
+                <a16:creationId xmlns:a16="http://schemas.microsoft.com/office/drawing/2014/main" id="{181627F8-4561-4FFB-A430-8F5D9CB4B45D}"/>
               </a:ext>
             </a:extLst>
           </p:cNvPr>
           <p:cNvCxnSpPr>
             <a:cxnSpLocks/>
-            <a:stCxn id="45" idx="3"/>
-            <a:endCxn id="108" idx="1"/>
+            <a:stCxn id="39" idx="3"/>
+            <a:endCxn id="43" idx="1"/>
           </p:cNvCxnSpPr>
           <p:nvPr/>
         </p:nvCxnSpPr>
         <p:spPr>
           <a:xfrm>
-            <a:off x="9026996" y="1821206"/>
-            <a:ext cx="271868" cy="0"/>
-          </a:xfrm>
-          <a:prstGeom prst="line">
-            <a:avLst/>
+            <a:off x="6679621" y="1640747"/>
+            <a:ext cx="645389" cy="1440218"/>
+          </a:xfrm>
+          <a:prstGeom prst="bentConnector3">
+            <a:avLst>
+              <a:gd name="adj1" fmla="val 50000"/>
+            </a:avLst>
           </a:prstGeom>
           <a:ln>
-            <a:prstDash val="dash"/>
+            <a:headEnd type="triangle"/>
+            <a:tailEnd type="triangle"/>
           </a:ln>
         </p:spPr>
         <p:style>
@@ -5149,411 +6535,10 @@
           </a:fontRef>
         </p:style>
       </p:cxnSp>
-      <p:cxnSp>
-        <p:nvCxnSpPr>
-          <p:cNvPr id="129" name="Straight Connector 128">
-            <a:extLst>
-              <a:ext uri="{FF2B5EF4-FFF2-40B4-BE49-F238E27FC236}">
-                <a16:creationId xmlns:a16="http://schemas.microsoft.com/office/drawing/2014/main" id="{A4C158EC-7EC6-4814-96FC-D26709869121}"/>
-              </a:ext>
-            </a:extLst>
-          </p:cNvPr>
-          <p:cNvCxnSpPr>
-            <a:cxnSpLocks/>
-            <a:endCxn id="110" idx="1"/>
-          </p:cNvCxnSpPr>
-          <p:nvPr/>
-        </p:nvCxnSpPr>
-        <p:spPr>
-          <a:xfrm>
-            <a:off x="9026996" y="2347985"/>
-            <a:ext cx="282390" cy="0"/>
-          </a:xfrm>
-          <a:prstGeom prst="line">
-            <a:avLst/>
-          </a:prstGeom>
-          <a:ln>
-            <a:prstDash val="dash"/>
-          </a:ln>
-        </p:spPr>
-        <p:style>
-          <a:lnRef idx="1">
-            <a:schemeClr val="accent1"/>
-          </a:lnRef>
-          <a:fillRef idx="0">
-            <a:schemeClr val="accent1"/>
-          </a:fillRef>
-          <a:effectRef idx="0">
-            <a:schemeClr val="accent1"/>
-          </a:effectRef>
-          <a:fontRef idx="minor">
-            <a:schemeClr val="tx1"/>
-          </a:fontRef>
-        </p:style>
-      </p:cxnSp>
-      <p:cxnSp>
-        <p:nvCxnSpPr>
-          <p:cNvPr id="130" name="Straight Connector 129">
-            <a:extLst>
-              <a:ext uri="{FF2B5EF4-FFF2-40B4-BE49-F238E27FC236}">
-                <a16:creationId xmlns:a16="http://schemas.microsoft.com/office/drawing/2014/main" id="{7B36D3E5-222F-4F3D-B604-C3D79A623BC7}"/>
-              </a:ext>
-            </a:extLst>
-          </p:cNvPr>
-          <p:cNvCxnSpPr/>
-          <p:nvPr/>
-        </p:nvCxnSpPr>
-        <p:spPr>
-          <a:xfrm>
-            <a:off x="9042465" y="2877296"/>
-            <a:ext cx="271868" cy="0"/>
-          </a:xfrm>
-          <a:prstGeom prst="line">
-            <a:avLst/>
-          </a:prstGeom>
-          <a:ln>
-            <a:prstDash val="dash"/>
-          </a:ln>
-        </p:spPr>
-        <p:style>
-          <a:lnRef idx="1">
-            <a:schemeClr val="accent1"/>
-          </a:lnRef>
-          <a:fillRef idx="0">
-            <a:schemeClr val="accent1"/>
-          </a:fillRef>
-          <a:effectRef idx="0">
-            <a:schemeClr val="accent1"/>
-          </a:effectRef>
-          <a:fontRef idx="minor">
-            <a:schemeClr val="tx1"/>
-          </a:fontRef>
-        </p:style>
-      </p:cxnSp>
-      <p:cxnSp>
-        <p:nvCxnSpPr>
-          <p:cNvPr id="131" name="Straight Connector 130">
-            <a:extLst>
-              <a:ext uri="{FF2B5EF4-FFF2-40B4-BE49-F238E27FC236}">
-                <a16:creationId xmlns:a16="http://schemas.microsoft.com/office/drawing/2014/main" id="{ADBA0F6C-B386-4424-9FFA-230EB84BCA32}"/>
-              </a:ext>
-            </a:extLst>
-          </p:cNvPr>
-          <p:cNvCxnSpPr/>
-          <p:nvPr/>
-        </p:nvCxnSpPr>
-        <p:spPr>
-          <a:xfrm>
-            <a:off x="9026996" y="3421406"/>
-            <a:ext cx="271868" cy="0"/>
-          </a:xfrm>
-          <a:prstGeom prst="line">
-            <a:avLst/>
-          </a:prstGeom>
-          <a:ln>
-            <a:prstDash val="dash"/>
-          </a:ln>
-        </p:spPr>
-        <p:style>
-          <a:lnRef idx="1">
-            <a:schemeClr val="accent1"/>
-          </a:lnRef>
-          <a:fillRef idx="0">
-            <a:schemeClr val="accent1"/>
-          </a:fillRef>
-          <a:effectRef idx="0">
-            <a:schemeClr val="accent1"/>
-          </a:effectRef>
-          <a:fontRef idx="minor">
-            <a:schemeClr val="tx1"/>
-          </a:fontRef>
-        </p:style>
-      </p:cxnSp>
-      <p:cxnSp>
-        <p:nvCxnSpPr>
-          <p:cNvPr id="162" name="Straight Arrow Connector 161">
-            <a:extLst>
-              <a:ext uri="{FF2B5EF4-FFF2-40B4-BE49-F238E27FC236}">
-                <a16:creationId xmlns:a16="http://schemas.microsoft.com/office/drawing/2014/main" id="{E8CF5385-BEF0-4C42-983C-EDE3DEC90CB9}"/>
-              </a:ext>
-            </a:extLst>
-          </p:cNvPr>
-          <p:cNvCxnSpPr>
-            <a:stCxn id="123" idx="3"/>
-            <a:endCxn id="31" idx="1"/>
-          </p:cNvCxnSpPr>
-          <p:nvPr/>
-        </p:nvCxnSpPr>
-        <p:spPr>
-          <a:xfrm flipV="1">
-            <a:off x="1228051" y="1650359"/>
-            <a:ext cx="767939" cy="901295"/>
-          </a:xfrm>
-          <a:prstGeom prst="straightConnector1">
-            <a:avLst/>
-          </a:prstGeom>
-          <a:ln>
-            <a:tailEnd type="triangle"/>
-          </a:ln>
-        </p:spPr>
-        <p:style>
-          <a:lnRef idx="1">
-            <a:schemeClr val="accent1"/>
-          </a:lnRef>
-          <a:fillRef idx="0">
-            <a:schemeClr val="accent1"/>
-          </a:fillRef>
-          <a:effectRef idx="0">
-            <a:schemeClr val="accent1"/>
-          </a:effectRef>
-          <a:fontRef idx="minor">
-            <a:schemeClr val="tx1"/>
-          </a:fontRef>
-        </p:style>
-      </p:cxnSp>
-      <p:cxnSp>
-        <p:nvCxnSpPr>
-          <p:cNvPr id="165" name="Connector: Elbow 164">
-            <a:extLst>
-              <a:ext uri="{FF2B5EF4-FFF2-40B4-BE49-F238E27FC236}">
-                <a16:creationId xmlns:a16="http://schemas.microsoft.com/office/drawing/2014/main" id="{6073BC5C-633A-481D-AFB0-3510071F587C}"/>
-              </a:ext>
-            </a:extLst>
-          </p:cNvPr>
-          <p:cNvCxnSpPr>
-            <a:cxnSpLocks/>
-            <a:stCxn id="50" idx="0"/>
-            <a:endCxn id="6" idx="1"/>
-          </p:cNvCxnSpPr>
-          <p:nvPr/>
-        </p:nvCxnSpPr>
-        <p:spPr>
-          <a:xfrm rot="5400000" flipH="1" flipV="1">
-            <a:off x="2793262" y="2363949"/>
-            <a:ext cx="292921" cy="1141113"/>
-          </a:xfrm>
-          <a:prstGeom prst="bentConnector2">
-            <a:avLst/>
-          </a:prstGeom>
-          <a:ln>
-            <a:tailEnd type="triangle"/>
-          </a:ln>
-        </p:spPr>
-        <p:style>
-          <a:lnRef idx="1">
-            <a:schemeClr val="accent1"/>
-          </a:lnRef>
-          <a:fillRef idx="0">
-            <a:schemeClr val="accent1"/>
-          </a:fillRef>
-          <a:effectRef idx="0">
-            <a:schemeClr val="accent1"/>
-          </a:effectRef>
-          <a:fontRef idx="minor">
-            <a:schemeClr val="tx1"/>
-          </a:fontRef>
-        </p:style>
-      </p:cxnSp>
-      <p:sp>
-        <p:nvSpPr>
-          <p:cNvPr id="195" name="TextBox 194">
-            <a:extLst>
-              <a:ext uri="{FF2B5EF4-FFF2-40B4-BE49-F238E27FC236}">
-                <a16:creationId xmlns:a16="http://schemas.microsoft.com/office/drawing/2014/main" id="{7DF6215B-1ECD-45F0-A34F-7B63F3576D2F}"/>
-              </a:ext>
-            </a:extLst>
-          </p:cNvPr>
-          <p:cNvSpPr txBox="1"/>
-          <p:nvPr/>
-        </p:nvSpPr>
-        <p:spPr>
-          <a:xfrm>
-            <a:off x="2606265" y="2582414"/>
-            <a:ext cx="768159" cy="230832"/>
-          </a:xfrm>
-          <a:prstGeom prst="rect">
-            <a:avLst/>
-          </a:prstGeom>
-          <a:noFill/>
-        </p:spPr>
-        <p:txBody>
-          <a:bodyPr wrap="none" rtlCol="0">
-            <a:spAutoFit/>
-          </a:bodyPr>
-          <a:lstStyle/>
-          <a:p>
-            <a:r>
-              <a:rPr lang="en-CA" sz="900" dirty="0"/>
-              <a:t>Docker push</a:t>
-            </a:r>
-          </a:p>
-        </p:txBody>
-      </p:sp>
-      <p:sp>
-        <p:nvSpPr>
-          <p:cNvPr id="196" name="TextBox 195">
-            <a:extLst>
-              <a:ext uri="{FF2B5EF4-FFF2-40B4-BE49-F238E27FC236}">
-                <a16:creationId xmlns:a16="http://schemas.microsoft.com/office/drawing/2014/main" id="{6F03F7E0-D395-45A1-9BC2-2F86B701012A}"/>
-              </a:ext>
-            </a:extLst>
-          </p:cNvPr>
-          <p:cNvSpPr txBox="1"/>
-          <p:nvPr/>
-        </p:nvSpPr>
-        <p:spPr>
-          <a:xfrm>
-            <a:off x="4594357" y="2539336"/>
-            <a:ext cx="716863" cy="230832"/>
-          </a:xfrm>
-          <a:prstGeom prst="rect">
-            <a:avLst/>
-          </a:prstGeom>
-          <a:solidFill>
-            <a:schemeClr val="bg1"/>
-          </a:solidFill>
-        </p:spPr>
-        <p:txBody>
-          <a:bodyPr wrap="none" rtlCol="0">
-            <a:spAutoFit/>
-          </a:bodyPr>
-          <a:lstStyle/>
-          <a:p>
-            <a:r>
-              <a:rPr lang="en-CA" sz="900" dirty="0"/>
-              <a:t>Docker pull</a:t>
-            </a:r>
-          </a:p>
-        </p:txBody>
-      </p:sp>
-      <p:sp>
-        <p:nvSpPr>
-          <p:cNvPr id="199" name="TextBox 198">
-            <a:extLst>
-              <a:ext uri="{FF2B5EF4-FFF2-40B4-BE49-F238E27FC236}">
-                <a16:creationId xmlns:a16="http://schemas.microsoft.com/office/drawing/2014/main" id="{AE6CC085-83D5-4BB1-B9F3-E1A5F84DA80E}"/>
-              </a:ext>
-            </a:extLst>
-          </p:cNvPr>
-          <p:cNvSpPr txBox="1"/>
-          <p:nvPr/>
-        </p:nvSpPr>
-        <p:spPr>
-          <a:xfrm>
-            <a:off x="4776179" y="1385830"/>
-            <a:ext cx="428322" cy="230832"/>
-          </a:xfrm>
-          <a:prstGeom prst="rect">
-            <a:avLst/>
-          </a:prstGeom>
-          <a:solidFill>
-            <a:schemeClr val="bg1"/>
-          </a:solidFill>
-        </p:spPr>
-        <p:txBody>
-          <a:bodyPr wrap="none" rtlCol="0">
-            <a:spAutoFit/>
-          </a:bodyPr>
-          <a:lstStyle/>
-          <a:p>
-            <a:r>
-              <a:rPr lang="en-CA" sz="900" dirty="0"/>
-              <a:t>HTTP</a:t>
-            </a:r>
-          </a:p>
-        </p:txBody>
-      </p:sp>
-      <p:sp>
-        <p:nvSpPr>
-          <p:cNvPr id="200" name="TextBox 199">
-            <a:extLst>
-              <a:ext uri="{FF2B5EF4-FFF2-40B4-BE49-F238E27FC236}">
-                <a16:creationId xmlns:a16="http://schemas.microsoft.com/office/drawing/2014/main" id="{0D354B8D-4B83-4231-A901-2E2D1BD14F18}"/>
-              </a:ext>
-            </a:extLst>
-          </p:cNvPr>
-          <p:cNvSpPr txBox="1"/>
-          <p:nvPr/>
-        </p:nvSpPr>
-        <p:spPr>
-          <a:xfrm>
-            <a:off x="3758600" y="3454727"/>
-            <a:ext cx="569387" cy="230832"/>
-          </a:xfrm>
-          <a:prstGeom prst="rect">
-            <a:avLst/>
-          </a:prstGeom>
-          <a:solidFill>
-            <a:schemeClr val="bg1"/>
-          </a:solidFill>
-        </p:spPr>
-        <p:txBody>
-          <a:bodyPr wrap="none" rtlCol="0">
-            <a:spAutoFit/>
-          </a:bodyPr>
-          <a:lstStyle/>
-          <a:p>
-            <a:r>
-              <a:rPr lang="en-CA" sz="900" dirty="0"/>
-              <a:t>Push src</a:t>
-            </a:r>
-          </a:p>
-        </p:txBody>
-      </p:sp>
-      <p:sp>
-        <p:nvSpPr>
-          <p:cNvPr id="201" name="TextBox 200">
-            <a:extLst>
-              <a:ext uri="{FF2B5EF4-FFF2-40B4-BE49-F238E27FC236}">
-                <a16:creationId xmlns:a16="http://schemas.microsoft.com/office/drawing/2014/main" id="{4103E5F5-A896-4729-BC0C-0822808DC57A}"/>
-              </a:ext>
-            </a:extLst>
-          </p:cNvPr>
-          <p:cNvSpPr txBox="1"/>
-          <p:nvPr/>
-        </p:nvSpPr>
-        <p:spPr>
-          <a:xfrm>
-            <a:off x="1019936" y="1490642"/>
-            <a:ext cx="829073" cy="507831"/>
-          </a:xfrm>
-          <a:prstGeom prst="rect">
-            <a:avLst/>
-          </a:prstGeom>
-          <a:noFill/>
-        </p:spPr>
-        <p:txBody>
-          <a:bodyPr wrap="none" rtlCol="0">
-            <a:spAutoFit/>
-          </a:bodyPr>
-          <a:lstStyle/>
-          <a:p>
-            <a:pPr algn="ctr"/>
-            <a:r>
-              <a:rPr lang="en-CA" sz="900" dirty="0"/>
-              <a:t>Load test</a:t>
-            </a:r>
-          </a:p>
-          <a:p>
-            <a:pPr algn="ctr"/>
-            <a:r>
-              <a:rPr lang="en-CA" sz="900" dirty="0"/>
-              <a:t>/</a:t>
-            </a:r>
-          </a:p>
-          <a:p>
-            <a:pPr algn="ctr"/>
-            <a:r>
-              <a:rPr lang="en-CA" sz="900" dirty="0"/>
-              <a:t>Coverage test</a:t>
-            </a:r>
-          </a:p>
-        </p:txBody>
-      </p:sp>
     </p:spTree>
     <p:extLst>
       <p:ext uri="{BB962C8B-B14F-4D97-AF65-F5344CB8AC3E}">
-        <p14:creationId xmlns:p14="http://schemas.microsoft.com/office/powerpoint/2010/main" val="2111673689"/>
+        <p14:creationId xmlns:p14="http://schemas.microsoft.com/office/powerpoint/2010/main" val="3389688816"/>
       </p:ext>
     </p:extLst>
   </p:cSld>

</xml_diff>

<commit_message>
Update Architecture diagram in documentation
</commit_message>
<xml_diff>
--- a/docs/diagrams/Architecture.pptx
+++ b/docs/diagrams/Architecture.pptx
@@ -5,7 +5,7 @@
     <p:sldMasterId id="2147483648" r:id="rId1"/>
   </p:sldMasterIdLst>
   <p:sldIdLst>
-    <p:sldId id="261" r:id="rId2"/>
+    <p:sldId id="262" r:id="rId2"/>
   </p:sldIdLst>
   <p:sldSz cx="12192000" cy="6858000"/>
   <p:notesSz cx="6858000" cy="9144000"/>
@@ -273,7 +273,7 @@
           <a:p>
             <a:fld id="{5218AD6D-F957-46F1-971B-3863E78F7EC4}" type="datetimeFigureOut">
               <a:rPr lang="en-CA" smtClean="0"/>
-              <a:t>2020-12-07</a:t>
+              <a:t>2020-12-08</a:t>
             </a:fld>
             <a:endParaRPr lang="en-CA" dirty="0"/>
           </a:p>
@@ -473,7 +473,7 @@
           <a:p>
             <a:fld id="{5218AD6D-F957-46F1-971B-3863E78F7EC4}" type="datetimeFigureOut">
               <a:rPr lang="en-CA" smtClean="0"/>
-              <a:t>2020-12-07</a:t>
+              <a:t>2020-12-08</a:t>
             </a:fld>
             <a:endParaRPr lang="en-CA" dirty="0"/>
           </a:p>
@@ -683,7 +683,7 @@
           <a:p>
             <a:fld id="{5218AD6D-F957-46F1-971B-3863E78F7EC4}" type="datetimeFigureOut">
               <a:rPr lang="en-CA" smtClean="0"/>
-              <a:t>2020-12-07</a:t>
+              <a:t>2020-12-08</a:t>
             </a:fld>
             <a:endParaRPr lang="en-CA" dirty="0"/>
           </a:p>
@@ -883,7 +883,7 @@
           <a:p>
             <a:fld id="{5218AD6D-F957-46F1-971B-3863E78F7EC4}" type="datetimeFigureOut">
               <a:rPr lang="en-CA" smtClean="0"/>
-              <a:t>2020-12-07</a:t>
+              <a:t>2020-12-08</a:t>
             </a:fld>
             <a:endParaRPr lang="en-CA" dirty="0"/>
           </a:p>
@@ -1159,7 +1159,7 @@
           <a:p>
             <a:fld id="{5218AD6D-F957-46F1-971B-3863E78F7EC4}" type="datetimeFigureOut">
               <a:rPr lang="en-CA" smtClean="0"/>
-              <a:t>2020-12-07</a:t>
+              <a:t>2020-12-08</a:t>
             </a:fld>
             <a:endParaRPr lang="en-CA" dirty="0"/>
           </a:p>
@@ -1427,7 +1427,7 @@
           <a:p>
             <a:fld id="{5218AD6D-F957-46F1-971B-3863E78F7EC4}" type="datetimeFigureOut">
               <a:rPr lang="en-CA" smtClean="0"/>
-              <a:t>2020-12-07</a:t>
+              <a:t>2020-12-08</a:t>
             </a:fld>
             <a:endParaRPr lang="en-CA" dirty="0"/>
           </a:p>
@@ -1842,7 +1842,7 @@
           <a:p>
             <a:fld id="{5218AD6D-F957-46F1-971B-3863E78F7EC4}" type="datetimeFigureOut">
               <a:rPr lang="en-CA" smtClean="0"/>
-              <a:t>2020-12-07</a:t>
+              <a:t>2020-12-08</a:t>
             </a:fld>
             <a:endParaRPr lang="en-CA" dirty="0"/>
           </a:p>
@@ -1984,7 +1984,7 @@
           <a:p>
             <a:fld id="{5218AD6D-F957-46F1-971B-3863E78F7EC4}" type="datetimeFigureOut">
               <a:rPr lang="en-CA" smtClean="0"/>
-              <a:t>2020-12-07</a:t>
+              <a:t>2020-12-08</a:t>
             </a:fld>
             <a:endParaRPr lang="en-CA" dirty="0"/>
           </a:p>
@@ -2097,7 +2097,7 @@
           <a:p>
             <a:fld id="{5218AD6D-F957-46F1-971B-3863E78F7EC4}" type="datetimeFigureOut">
               <a:rPr lang="en-CA" smtClean="0"/>
-              <a:t>2020-12-07</a:t>
+              <a:t>2020-12-08</a:t>
             </a:fld>
             <a:endParaRPr lang="en-CA" dirty="0"/>
           </a:p>
@@ -2410,7 +2410,7 @@
           <a:p>
             <a:fld id="{5218AD6D-F957-46F1-971B-3863E78F7EC4}" type="datetimeFigureOut">
               <a:rPr lang="en-CA" smtClean="0"/>
-              <a:t>2020-12-07</a:t>
+              <a:t>2020-12-08</a:t>
             </a:fld>
             <a:endParaRPr lang="en-CA" dirty="0"/>
           </a:p>
@@ -2699,7 +2699,7 @@
           <a:p>
             <a:fld id="{5218AD6D-F957-46F1-971B-3863E78F7EC4}" type="datetimeFigureOut">
               <a:rPr lang="en-CA" smtClean="0"/>
-              <a:t>2020-12-07</a:t>
+              <a:t>2020-12-08</a:t>
             </a:fld>
             <a:endParaRPr lang="en-CA" dirty="0"/>
           </a:p>
@@ -2942,7 +2942,7 @@
           <a:p>
             <a:fld id="{5218AD6D-F957-46F1-971B-3863E78F7EC4}" type="datetimeFigureOut">
               <a:rPr lang="en-CA" smtClean="0"/>
-              <a:t>2020-12-07</a:t>
+              <a:t>2020-12-08</a:t>
             </a:fld>
             <a:endParaRPr lang="en-CA" dirty="0"/>
           </a:p>
@@ -3373,8 +3373,8 @@
         </p:nvSpPr>
         <p:spPr>
           <a:xfrm>
-            <a:off x="5024570" y="334440"/>
-            <a:ext cx="6652254" cy="3796165"/>
+            <a:off x="5024570" y="499242"/>
+            <a:ext cx="6652254" cy="3631363"/>
           </a:xfrm>
           <a:prstGeom prst="rect">
             <a:avLst/>
@@ -3516,8 +3516,8 @@
         </p:nvSpPr>
         <p:spPr>
           <a:xfrm>
-            <a:off x="3510279" y="2377816"/>
-            <a:ext cx="924965" cy="820456"/>
+            <a:off x="2232362" y="2331406"/>
+            <a:ext cx="924965" cy="552841"/>
           </a:xfrm>
           <a:prstGeom prst="rect">
             <a:avLst/>
@@ -3561,16 +3561,13 @@
                   <a:schemeClr val="tx1"/>
                 </a:solidFill>
               </a:rPr>
-              <a:t>Docker Container </a:t>
-            </a:r>
-            <a:r>
-              <a:rPr lang="en-CA" sz="1200" b="1" dirty="0">
-                <a:solidFill>
-                  <a:schemeClr val="tx1"/>
-                </a:solidFill>
-              </a:rPr>
-              <a:t>Registry</a:t>
-            </a:r>
+              <a:t>Docker Hub</a:t>
+            </a:r>
+            <a:endParaRPr lang="en-CA" sz="1200" b="1" dirty="0">
+              <a:solidFill>
+                <a:schemeClr val="tx1"/>
+              </a:solidFill>
+            </a:endParaRPr>
           </a:p>
         </p:txBody>
       </p:sp>
@@ -3590,9 +3587,9 @@
           <p:nvPr/>
         </p:nvCxnSpPr>
         <p:spPr>
-          <a:xfrm flipH="1">
-            <a:off x="4435244" y="2788044"/>
-            <a:ext cx="989278" cy="0"/>
+          <a:xfrm flipH="1" flipV="1">
+            <a:off x="3157327" y="2607827"/>
+            <a:ext cx="2267193" cy="9453"/>
           </a:xfrm>
           <a:prstGeom prst="straightConnector1">
             <a:avLst/>
@@ -3618,10 +3615,10 @@
       </p:cxnSp>
       <p:sp>
         <p:nvSpPr>
-          <p:cNvPr id="14" name="Rectangle 13">
-            <a:extLst>
-              <a:ext uri="{FF2B5EF4-FFF2-40B4-BE49-F238E27FC236}">
-                <a16:creationId xmlns:a16="http://schemas.microsoft.com/office/drawing/2014/main" id="{5F52098A-6A03-434A-988E-41B933C4155A}"/>
+          <p:cNvPr id="16" name="Rectangle 15">
+            <a:extLst>
+              <a:ext uri="{FF2B5EF4-FFF2-40B4-BE49-F238E27FC236}">
+                <a16:creationId xmlns:a16="http://schemas.microsoft.com/office/drawing/2014/main" id="{6A1E8AF7-C64D-4419-8A25-AD2E3602CC3C}"/>
               </a:ext>
             </a:extLst>
           </p:cNvPr>
@@ -3630,278 +3627,8 @@
         </p:nvSpPr>
         <p:spPr>
           <a:xfrm>
-            <a:off x="1995989" y="295020"/>
-            <a:ext cx="746349" cy="390894"/>
-          </a:xfrm>
-          <a:prstGeom prst="rect">
-            <a:avLst/>
-          </a:prstGeom>
-          <a:noFill/>
-          <a:ln>
-            <a:solidFill>
-              <a:schemeClr val="tx1"/>
-            </a:solidFill>
-          </a:ln>
-        </p:spPr>
-        <p:style>
-          <a:lnRef idx="2">
-            <a:schemeClr val="accent1">
-              <a:shade val="50000"/>
-            </a:schemeClr>
-          </a:lnRef>
-          <a:fillRef idx="1">
-            <a:schemeClr val="accent1"/>
-          </a:fillRef>
-          <a:effectRef idx="0">
-            <a:schemeClr val="accent1"/>
-          </a:effectRef>
-          <a:fontRef idx="minor">
-            <a:schemeClr val="lt1"/>
-          </a:fontRef>
-        </p:style>
-        <p:txBody>
-          <a:bodyPr rot="0" spcFirstLastPara="0" vertOverflow="overflow" horzOverflow="overflow" vert="horz" wrap="square" lIns="91440" tIns="45720" rIns="91440" bIns="45720" numCol="1" spcCol="0" rtlCol="0" fromWordArt="0" anchor="ctr" anchorCtr="0" forceAA="0" compatLnSpc="1">
-            <a:prstTxWarp prst="textNoShape">
-              <a:avLst/>
-            </a:prstTxWarp>
-            <a:noAutofit/>
-          </a:bodyPr>
-          <a:lstStyle/>
-          <a:p>
-            <a:pPr algn="ctr"/>
-            <a:r>
-              <a:rPr lang="es-CO" sz="1200" b="1" dirty="0">
-                <a:solidFill>
-                  <a:schemeClr val="tx1"/>
-                </a:solidFill>
-              </a:rPr>
-              <a:t>Postman</a:t>
-            </a:r>
-            <a:endParaRPr lang="en-CA" sz="1200" b="1" dirty="0">
-              <a:solidFill>
-                <a:schemeClr val="tx1"/>
-              </a:solidFill>
-            </a:endParaRPr>
-          </a:p>
-        </p:txBody>
-      </p:sp>
-      <p:sp>
-        <p:nvSpPr>
-          <p:cNvPr id="15" name="Rectangle 14">
-            <a:extLst>
-              <a:ext uri="{FF2B5EF4-FFF2-40B4-BE49-F238E27FC236}">
-                <a16:creationId xmlns:a16="http://schemas.microsoft.com/office/drawing/2014/main" id="{CA27A166-852D-4818-BAB1-B4F0EAD8A83B}"/>
-              </a:ext>
-            </a:extLst>
-          </p:cNvPr>
-          <p:cNvSpPr/>
-          <p:nvPr/>
-        </p:nvSpPr>
-        <p:spPr>
-          <a:xfrm>
-            <a:off x="5736157" y="3084657"/>
-            <a:ext cx="943463" cy="740978"/>
-          </a:xfrm>
-          <a:prstGeom prst="rect">
-            <a:avLst/>
-          </a:prstGeom>
-          <a:noFill/>
-          <a:ln>
-            <a:solidFill>
-              <a:schemeClr val="tx1"/>
-            </a:solidFill>
-          </a:ln>
-        </p:spPr>
-        <p:style>
-          <a:lnRef idx="2">
-            <a:schemeClr val="accent1">
-              <a:shade val="50000"/>
-            </a:schemeClr>
-          </a:lnRef>
-          <a:fillRef idx="1">
-            <a:schemeClr val="accent1"/>
-          </a:fillRef>
-          <a:effectRef idx="0">
-            <a:schemeClr val="accent1"/>
-          </a:effectRef>
-          <a:fontRef idx="minor">
-            <a:schemeClr val="lt1"/>
-          </a:fontRef>
-        </p:style>
-        <p:txBody>
-          <a:bodyPr rot="0" spcFirstLastPara="0" vertOverflow="overflow" horzOverflow="overflow" vert="horz" wrap="square" lIns="91440" tIns="45720" rIns="91440" bIns="45720" numCol="1" spcCol="0" rtlCol="0" fromWordArt="0" anchor="ctr" anchorCtr="0" forceAA="0" compatLnSpc="1">
-            <a:prstTxWarp prst="textNoShape">
-              <a:avLst/>
-            </a:prstTxWarp>
-            <a:noAutofit/>
-          </a:bodyPr>
-          <a:lstStyle/>
-          <a:p>
-            <a:pPr algn="ctr"/>
-            <a:r>
-              <a:rPr lang="es-CO" sz="1200" b="1" dirty="0">
-                <a:solidFill>
-                  <a:schemeClr val="tx1"/>
-                </a:solidFill>
-              </a:rPr>
-              <a:t>Kubernetes Control Plane</a:t>
-            </a:r>
-            <a:endParaRPr lang="en-CA" sz="1200" b="1" dirty="0">
-              <a:solidFill>
-                <a:schemeClr val="tx1"/>
-              </a:solidFill>
-            </a:endParaRPr>
-          </a:p>
-        </p:txBody>
-      </p:sp>
-      <p:sp>
-        <p:nvSpPr>
-          <p:cNvPr id="16" name="Rectangle 15">
-            <a:extLst>
-              <a:ext uri="{FF2B5EF4-FFF2-40B4-BE49-F238E27FC236}">
-                <a16:creationId xmlns:a16="http://schemas.microsoft.com/office/drawing/2014/main" id="{6A1E8AF7-C64D-4419-8A25-AD2E3602CC3C}"/>
-              </a:ext>
-            </a:extLst>
-          </p:cNvPr>
-          <p:cNvSpPr/>
-          <p:nvPr/>
-        </p:nvSpPr>
-        <p:spPr>
-          <a:xfrm>
-            <a:off x="7325010" y="1211819"/>
-            <a:ext cx="3706778" cy="1103542"/>
-          </a:xfrm>
-          <a:prstGeom prst="rect">
-            <a:avLst/>
-          </a:prstGeom>
-          <a:noFill/>
-          <a:ln>
-            <a:solidFill>
-              <a:schemeClr val="tx1"/>
-            </a:solidFill>
-          </a:ln>
-        </p:spPr>
-        <p:style>
-          <a:lnRef idx="2">
-            <a:schemeClr val="accent1">
-              <a:shade val="50000"/>
-            </a:schemeClr>
-          </a:lnRef>
-          <a:fillRef idx="1">
-            <a:schemeClr val="accent1"/>
-          </a:fillRef>
-          <a:effectRef idx="0">
-            <a:schemeClr val="accent1"/>
-          </a:effectRef>
-          <a:fontRef idx="minor">
-            <a:schemeClr val="lt1"/>
-          </a:fontRef>
-        </p:style>
-        <p:txBody>
-          <a:bodyPr rtlCol="0" anchor="t" anchorCtr="0"/>
-          <a:lstStyle/>
-          <a:p>
-            <a:r>
-              <a:rPr lang="es-CO" sz="1200" u="sng" dirty="0">
-                <a:solidFill>
-                  <a:schemeClr val="tx1"/>
-                </a:solidFill>
-              </a:rPr>
-              <a:t>NODE 1</a:t>
-            </a:r>
-            <a:endParaRPr lang="en-CA" sz="1200" u="sng" dirty="0">
-              <a:solidFill>
-                <a:schemeClr val="tx1"/>
-              </a:solidFill>
-            </a:endParaRPr>
-          </a:p>
-        </p:txBody>
-      </p:sp>
-      <p:sp>
-        <p:nvSpPr>
-          <p:cNvPr id="31" name="Rectangle 30">
-            <a:extLst>
-              <a:ext uri="{FF2B5EF4-FFF2-40B4-BE49-F238E27FC236}">
-                <a16:creationId xmlns:a16="http://schemas.microsoft.com/office/drawing/2014/main" id="{1435143F-CE20-4FE1-9C4E-12D99F1BC812}"/>
-              </a:ext>
-            </a:extLst>
-          </p:cNvPr>
-          <p:cNvSpPr/>
-          <p:nvPr/>
-        </p:nvSpPr>
-        <p:spPr>
-          <a:xfrm>
-            <a:off x="1995990" y="1216925"/>
-            <a:ext cx="746349" cy="850090"/>
-          </a:xfrm>
-          <a:prstGeom prst="rect">
-            <a:avLst/>
-          </a:prstGeom>
-          <a:noFill/>
-          <a:ln>
-            <a:solidFill>
-              <a:schemeClr val="tx1"/>
-            </a:solidFill>
-          </a:ln>
-        </p:spPr>
-        <p:style>
-          <a:lnRef idx="2">
-            <a:schemeClr val="accent1">
-              <a:shade val="50000"/>
-            </a:schemeClr>
-          </a:lnRef>
-          <a:fillRef idx="1">
-            <a:schemeClr val="accent1"/>
-          </a:fillRef>
-          <a:effectRef idx="0">
-            <a:schemeClr val="accent1"/>
-          </a:effectRef>
-          <a:fontRef idx="minor">
-            <a:schemeClr val="lt1"/>
-          </a:fontRef>
-        </p:style>
-        <p:txBody>
-          <a:bodyPr rot="0" spcFirstLastPara="0" vertOverflow="overflow" horzOverflow="overflow" vert="horz" wrap="square" lIns="91440" tIns="45720" rIns="91440" bIns="45720" numCol="1" spcCol="0" rtlCol="0" fromWordArt="0" anchor="ctr" anchorCtr="0" forceAA="0" compatLnSpc="1">
-            <a:prstTxWarp prst="textNoShape">
-              <a:avLst/>
-            </a:prstTxWarp>
-            <a:noAutofit/>
-          </a:bodyPr>
-          <a:lstStyle/>
-          <a:p>
-            <a:pPr algn="ctr"/>
-            <a:r>
-              <a:rPr lang="es-CO" sz="1200" b="1" dirty="0">
-                <a:solidFill>
-                  <a:schemeClr val="tx1"/>
-                </a:solidFill>
-              </a:rPr>
-              <a:t>Gatling</a:t>
-            </a:r>
-            <a:endParaRPr lang="en-CA" sz="1200" b="1" dirty="0">
-              <a:solidFill>
-                <a:schemeClr val="tx1"/>
-              </a:solidFill>
-            </a:endParaRPr>
-          </a:p>
-        </p:txBody>
-      </p:sp>
-      <p:sp>
-        <p:nvSpPr>
-          <p:cNvPr id="32" name="Rectangle 31">
-            <a:extLst>
-              <a:ext uri="{FF2B5EF4-FFF2-40B4-BE49-F238E27FC236}">
-                <a16:creationId xmlns:a16="http://schemas.microsoft.com/office/drawing/2014/main" id="{3DD6C9D7-CDE2-432F-97B8-E6FA6D6B112B}"/>
-              </a:ext>
-            </a:extLst>
-          </p:cNvPr>
-          <p:cNvSpPr/>
-          <p:nvPr/>
-        </p:nvSpPr>
-        <p:spPr>
-          <a:xfrm>
-            <a:off x="7073383" y="5430532"/>
-            <a:ext cx="2579503" cy="1278294"/>
+            <a:off x="5512379" y="1359017"/>
+            <a:ext cx="5787591" cy="972389"/>
           </a:xfrm>
           <a:prstGeom prst="rect">
             <a:avLst/>
@@ -3935,14 +3662,14 @@
           <a:lstStyle/>
           <a:p>
             <a:r>
-              <a:rPr lang="en-CA" sz="1050" b="1" dirty="0">
+              <a:rPr lang="es-CO" sz="1200" u="sng" dirty="0">
                 <a:solidFill>
                   <a:schemeClr val="tx1"/>
                 </a:solidFill>
               </a:rPr>
-              <a:t>Amazon Elastic Kubernetes Service (EKS)</a:t>
-            </a:r>
-            <a:endParaRPr lang="en-CA" sz="800" b="1" dirty="0">
+              <a:t>NODE 1</a:t>
+            </a:r>
+            <a:endParaRPr lang="en-CA" sz="1200" u="sng" dirty="0">
               <a:solidFill>
                 <a:schemeClr val="tx1"/>
               </a:solidFill>
@@ -3952,10 +3679,10 @@
       </p:sp>
       <p:sp>
         <p:nvSpPr>
-          <p:cNvPr id="45" name="Rectangle 44">
-            <a:extLst>
-              <a:ext uri="{FF2B5EF4-FFF2-40B4-BE49-F238E27FC236}">
-                <a16:creationId xmlns:a16="http://schemas.microsoft.com/office/drawing/2014/main" id="{AE1EC2B1-F1A3-4D41-B7E4-8D558CDA218E}"/>
+          <p:cNvPr id="31" name="Rectangle 30">
+            <a:extLst>
+              <a:ext uri="{FF2B5EF4-FFF2-40B4-BE49-F238E27FC236}">
+                <a16:creationId xmlns:a16="http://schemas.microsoft.com/office/drawing/2014/main" id="{1435143F-CE20-4FE1-9C4E-12D99F1BC812}"/>
               </a:ext>
             </a:extLst>
           </p:cNvPr>
@@ -3964,8 +3691,8 @@
         </p:nvSpPr>
         <p:spPr>
           <a:xfrm>
-            <a:off x="7426818" y="2823049"/>
-            <a:ext cx="767940" cy="326675"/>
+            <a:off x="2230897" y="1647121"/>
+            <a:ext cx="907598" cy="552842"/>
           </a:xfrm>
           <a:prstGeom prst="rect">
             <a:avLst/>
@@ -3994,30 +3721,88 @@
           </a:fontRef>
         </p:style>
         <p:txBody>
-          <a:bodyPr rtlCol="0" anchor="ctr" anchorCtr="0"/>
+          <a:bodyPr rot="0" spcFirstLastPara="0" vertOverflow="overflow" horzOverflow="overflow" vert="horz" wrap="square" lIns="91440" tIns="45720" rIns="91440" bIns="45720" numCol="1" spcCol="0" rtlCol="0" fromWordArt="0" anchor="ctr" anchorCtr="0" forceAA="0" compatLnSpc="1">
+            <a:prstTxWarp prst="textNoShape">
+              <a:avLst/>
+            </a:prstTxWarp>
+            <a:noAutofit/>
+          </a:bodyPr>
           <a:lstStyle/>
           <a:p>
             <a:pPr algn="ctr"/>
             <a:r>
-              <a:rPr lang="es-CO" sz="1000" b="1" dirty="0">
+              <a:rPr lang="es-CO" sz="1200" b="1" dirty="0">
                 <a:solidFill>
                   <a:schemeClr val="tx1"/>
                 </a:solidFill>
               </a:rPr>
-              <a:t>Bill </a:t>
-            </a:r>
-          </a:p>
-          <a:p>
-            <a:pPr algn="ctr"/>
-            <a:r>
-              <a:rPr lang="es-CO" sz="1000" b="1" dirty="0">
+              <a:t>Gatling</a:t>
+            </a:r>
+            <a:endParaRPr lang="en-CA" sz="1200" b="1" dirty="0">
+              <a:solidFill>
+                <a:schemeClr val="tx1"/>
+              </a:solidFill>
+            </a:endParaRPr>
+          </a:p>
+        </p:txBody>
+      </p:sp>
+      <p:sp>
+        <p:nvSpPr>
+          <p:cNvPr id="32" name="Rectangle 31">
+            <a:extLst>
+              <a:ext uri="{FF2B5EF4-FFF2-40B4-BE49-F238E27FC236}">
+                <a16:creationId xmlns:a16="http://schemas.microsoft.com/office/drawing/2014/main" id="{3DD6C9D7-CDE2-432F-97B8-E6FA6D6B112B}"/>
+              </a:ext>
+            </a:extLst>
+          </p:cNvPr>
+          <p:cNvSpPr/>
+          <p:nvPr/>
+        </p:nvSpPr>
+        <p:spPr>
+          <a:xfrm>
+            <a:off x="7064052" y="4805379"/>
+            <a:ext cx="2579503" cy="1278294"/>
+          </a:xfrm>
+          <a:prstGeom prst="rect">
+            <a:avLst/>
+          </a:prstGeom>
+          <a:noFill/>
+          <a:ln>
+            <a:solidFill>
+              <a:schemeClr val="tx1"/>
+            </a:solidFill>
+            <a:prstDash val="dash"/>
+          </a:ln>
+        </p:spPr>
+        <p:style>
+          <a:lnRef idx="2">
+            <a:schemeClr val="accent1">
+              <a:shade val="50000"/>
+            </a:schemeClr>
+          </a:lnRef>
+          <a:fillRef idx="1">
+            <a:schemeClr val="accent1"/>
+          </a:fillRef>
+          <a:effectRef idx="0">
+            <a:schemeClr val="accent1"/>
+          </a:effectRef>
+          <a:fontRef idx="minor">
+            <a:schemeClr val="lt1"/>
+          </a:fontRef>
+        </p:style>
+        <p:txBody>
+          <a:bodyPr rtlCol="0" anchor="t" anchorCtr="0"/>
+          <a:lstStyle/>
+          <a:p>
+            <a:r>
+              <a:rPr lang="en-CA" sz="1050" b="1" dirty="0">
                 <a:solidFill>
                   <a:schemeClr val="tx1"/>
                 </a:solidFill>
               </a:rPr>
-              <a:t>container</a:t>
-            </a:r>
-            <a:endParaRPr lang="en-CA" sz="1000" b="1" dirty="0">
+              <a:t>AWS</a:t>
+            </a:r>
+            <a:endParaRPr lang="en-CA" sz="800" b="1" dirty="0">
               <a:solidFill>
                 <a:schemeClr val="tx1"/>
               </a:solidFill>
@@ -4027,10 +3812,10 @@
       </p:sp>
       <p:sp>
         <p:nvSpPr>
-          <p:cNvPr id="50" name="Rectangle 49">
-            <a:extLst>
-              <a:ext uri="{FF2B5EF4-FFF2-40B4-BE49-F238E27FC236}">
-                <a16:creationId xmlns:a16="http://schemas.microsoft.com/office/drawing/2014/main" id="{5F0E55F2-184F-4C92-8A53-4706B8D80F80}"/>
+          <p:cNvPr id="39" name="Rectangle 38">
+            <a:extLst>
+              <a:ext uri="{FF2B5EF4-FFF2-40B4-BE49-F238E27FC236}">
+                <a16:creationId xmlns:a16="http://schemas.microsoft.com/office/drawing/2014/main" id="{45BB9BAA-DD67-43D1-919C-07F7D2F7128A}"/>
               </a:ext>
             </a:extLst>
           </p:cNvPr>
@@ -4039,8 +3824,8 @@
         </p:nvSpPr>
         <p:spPr>
           <a:xfrm>
-            <a:off x="1995991" y="3080965"/>
-            <a:ext cx="746349" cy="629583"/>
+            <a:off x="5647500" y="1628437"/>
+            <a:ext cx="1251731" cy="565008"/>
           </a:xfrm>
           <a:prstGeom prst="rect">
             <a:avLst/>
@@ -4084,7 +3869,7 @@
                   <a:schemeClr val="tx1"/>
                 </a:solidFill>
               </a:rPr>
-              <a:t>GitHub</a:t>
+              <a:t>Istio Gateway</a:t>
             </a:r>
             <a:endParaRPr lang="en-CA" sz="1200" b="1" dirty="0">
               <a:solidFill>
@@ -4096,23 +3881,210 @@
       </p:sp>
       <p:cxnSp>
         <p:nvCxnSpPr>
-          <p:cNvPr id="52" name="Straight Arrow Connector 51">
-            <a:extLst>
-              <a:ext uri="{FF2B5EF4-FFF2-40B4-BE49-F238E27FC236}">
-                <a16:creationId xmlns:a16="http://schemas.microsoft.com/office/drawing/2014/main" id="{A6603160-DCEC-4A46-8681-85944A71F7F9}"/>
+          <p:cNvPr id="57" name="Straight Arrow Connector 56">
+            <a:extLst>
+              <a:ext uri="{FF2B5EF4-FFF2-40B4-BE49-F238E27FC236}">
+                <a16:creationId xmlns:a16="http://schemas.microsoft.com/office/drawing/2014/main" id="{36DE3E0F-4AD9-455D-8435-0805A6CEE7BE}"/>
               </a:ext>
             </a:extLst>
           </p:cNvPr>
           <p:cNvCxnSpPr>
             <a:cxnSpLocks/>
-            <a:stCxn id="50" idx="3"/>
+            <a:stCxn id="31" idx="3"/>
+            <a:endCxn id="39" idx="1"/>
           </p:cNvCxnSpPr>
           <p:nvPr/>
         </p:nvCxnSpPr>
         <p:spPr>
-          <a:xfrm>
-            <a:off x="2742340" y="3395757"/>
-            <a:ext cx="2669293" cy="0"/>
+          <a:xfrm flipV="1">
+            <a:off x="3138495" y="1910941"/>
+            <a:ext cx="2509005" cy="12601"/>
+          </a:xfrm>
+          <a:prstGeom prst="straightConnector1">
+            <a:avLst/>
+          </a:prstGeom>
+          <a:ln>
+            <a:headEnd type="triangle"/>
+            <a:tailEnd type="triangle"/>
+          </a:ln>
+        </p:spPr>
+        <p:style>
+          <a:lnRef idx="1">
+            <a:schemeClr val="accent1"/>
+          </a:lnRef>
+          <a:fillRef idx="0">
+            <a:schemeClr val="accent1"/>
+          </a:fillRef>
+          <a:effectRef idx="0">
+            <a:schemeClr val="accent1"/>
+          </a:effectRef>
+          <a:fontRef idx="minor">
+            <a:schemeClr val="tx1"/>
+          </a:fontRef>
+        </p:style>
+      </p:cxnSp>
+      <p:cxnSp>
+        <p:nvCxnSpPr>
+          <p:cNvPr id="60" name="Straight Arrow Connector 59">
+            <a:extLst>
+              <a:ext uri="{FF2B5EF4-FFF2-40B4-BE49-F238E27FC236}">
+                <a16:creationId xmlns:a16="http://schemas.microsoft.com/office/drawing/2014/main" id="{5AA90253-E355-42FB-A14D-AB421E874D21}"/>
+              </a:ext>
+            </a:extLst>
+          </p:cNvPr>
+          <p:cNvCxnSpPr>
+            <a:cxnSpLocks/>
+            <a:stCxn id="4" idx="2"/>
+            <a:endCxn id="32" idx="0"/>
+          </p:cNvCxnSpPr>
+          <p:nvPr/>
+        </p:nvCxnSpPr>
+        <p:spPr>
+          <a:xfrm>
+            <a:off x="8350697" y="4130605"/>
+            <a:ext cx="3107" cy="674774"/>
+          </a:xfrm>
+          <a:prstGeom prst="straightConnector1">
+            <a:avLst/>
+          </a:prstGeom>
+          <a:ln>
+            <a:headEnd type="triangle"/>
+            <a:tailEnd type="triangle"/>
+          </a:ln>
+        </p:spPr>
+        <p:style>
+          <a:lnRef idx="1">
+            <a:schemeClr val="accent1"/>
+          </a:lnRef>
+          <a:fillRef idx="0">
+            <a:schemeClr val="accent1"/>
+          </a:fillRef>
+          <a:effectRef idx="0">
+            <a:schemeClr val="accent1"/>
+          </a:effectRef>
+          <a:fontRef idx="minor">
+            <a:schemeClr val="tx1"/>
+          </a:fontRef>
+        </p:style>
+      </p:cxnSp>
+      <p:sp>
+        <p:nvSpPr>
+          <p:cNvPr id="121" name="Flowchart: Magnetic Disk 120">
+            <a:extLst>
+              <a:ext uri="{FF2B5EF4-FFF2-40B4-BE49-F238E27FC236}">
+                <a16:creationId xmlns:a16="http://schemas.microsoft.com/office/drawing/2014/main" id="{41FF734B-146B-4B68-BA9E-6EA34601A827}"/>
+              </a:ext>
+            </a:extLst>
+          </p:cNvPr>
+          <p:cNvSpPr/>
+          <p:nvPr/>
+        </p:nvSpPr>
+        <p:spPr>
+          <a:xfrm>
+            <a:off x="7801457" y="5132180"/>
+            <a:ext cx="1050990" cy="766227"/>
+          </a:xfrm>
+          <a:prstGeom prst="flowChartMagneticDisk">
+            <a:avLst/>
+          </a:prstGeom>
+          <a:noFill/>
+          <a:ln>
+            <a:solidFill>
+              <a:schemeClr val="tx1"/>
+            </a:solidFill>
+          </a:ln>
+        </p:spPr>
+        <p:style>
+          <a:lnRef idx="2">
+            <a:schemeClr val="accent1">
+              <a:shade val="50000"/>
+            </a:schemeClr>
+          </a:lnRef>
+          <a:fillRef idx="1">
+            <a:schemeClr val="accent1"/>
+          </a:fillRef>
+          <a:effectRef idx="0">
+            <a:schemeClr val="accent1"/>
+          </a:effectRef>
+          <a:fontRef idx="minor">
+            <a:schemeClr val="lt1"/>
+          </a:fontRef>
+        </p:style>
+        <p:txBody>
+          <a:bodyPr rtlCol="0" anchor="ctr"/>
+          <a:lstStyle/>
+          <a:p>
+            <a:pPr algn="ctr"/>
+            <a:r>
+              <a:rPr lang="en-CA" sz="1400" dirty="0">
+                <a:solidFill>
+                  <a:schemeClr val="tx1"/>
+                </a:solidFill>
+              </a:rPr>
+              <a:t>DynamoDB</a:t>
+            </a:r>
+          </a:p>
+        </p:txBody>
+      </p:sp>
+      <p:pic>
+        <p:nvPicPr>
+          <p:cNvPr id="123" name="Graphic 122" descr="Users">
+            <a:extLst>
+              <a:ext uri="{FF2B5EF4-FFF2-40B4-BE49-F238E27FC236}">
+                <a16:creationId xmlns:a16="http://schemas.microsoft.com/office/drawing/2014/main" id="{1756A35F-981D-4229-B646-7747D1D186AB}"/>
+              </a:ext>
+            </a:extLst>
+          </p:cNvPr>
+          <p:cNvPicPr>
+            <a:picLocks noChangeAspect="1"/>
+          </p:cNvPicPr>
+          <p:nvPr/>
+        </p:nvPicPr>
+        <p:blipFill>
+          <a:blip r:embed="rId2">
+            <a:extLst>
+              <a:ext uri="{28A0092B-C50C-407E-A947-70E740481C1C}">
+                <a14:useLocalDpi xmlns:a14="http://schemas.microsoft.com/office/drawing/2010/main" val="0"/>
+              </a:ext>
+              <a:ext uri="{96DAC541-7B7A-43D3-8B79-37D633B846F1}">
+                <asvg:svgBlip xmlns:asvg="http://schemas.microsoft.com/office/drawing/2016/SVG/main" r:embed="rId3"/>
+              </a:ext>
+            </a:extLst>
+          </a:blip>
+          <a:stretch>
+            <a:fillRect/>
+          </a:stretch>
+        </p:blipFill>
+        <p:spPr>
+          <a:xfrm>
+            <a:off x="288105" y="2220178"/>
+            <a:ext cx="914400" cy="770874"/>
+          </a:xfrm>
+          <a:prstGeom prst="rect">
+            <a:avLst/>
+          </a:prstGeom>
+        </p:spPr>
+      </p:pic>
+      <p:cxnSp>
+        <p:nvCxnSpPr>
+          <p:cNvPr id="125" name="Straight Arrow Connector 124">
+            <a:extLst>
+              <a:ext uri="{FF2B5EF4-FFF2-40B4-BE49-F238E27FC236}">
+                <a16:creationId xmlns:a16="http://schemas.microsoft.com/office/drawing/2014/main" id="{18D22E3C-7BDE-4D04-AEF3-6F1274AAED87}"/>
+              </a:ext>
+            </a:extLst>
+          </p:cNvPr>
+          <p:cNvCxnSpPr>
+            <a:cxnSpLocks/>
+            <a:stCxn id="123" idx="3"/>
+            <a:endCxn id="6" idx="1"/>
+          </p:cNvCxnSpPr>
+          <p:nvPr/>
+        </p:nvCxnSpPr>
+        <p:spPr>
+          <a:xfrm>
+            <a:off x="1202505" y="2605615"/>
+            <a:ext cx="1029857" cy="2212"/>
           </a:xfrm>
           <a:prstGeom prst="straightConnector1">
             <a:avLst/>
@@ -4136,12 +4108,214 @@
           </a:fontRef>
         </p:style>
       </p:cxnSp>
-      <p:sp>
-        <p:nvSpPr>
-          <p:cNvPr id="39" name="Rectangle 38">
-            <a:extLst>
-              <a:ext uri="{FF2B5EF4-FFF2-40B4-BE49-F238E27FC236}">
-                <a16:creationId xmlns:a16="http://schemas.microsoft.com/office/drawing/2014/main" id="{45BB9BAA-DD67-43D1-919C-07F7D2F7128A}"/>
+      <p:cxnSp>
+        <p:nvCxnSpPr>
+          <p:cNvPr id="162" name="Straight Arrow Connector 161">
+            <a:extLst>
+              <a:ext uri="{FF2B5EF4-FFF2-40B4-BE49-F238E27FC236}">
+                <a16:creationId xmlns:a16="http://schemas.microsoft.com/office/drawing/2014/main" id="{E8CF5385-BEF0-4C42-983C-EDE3DEC90CB9}"/>
+              </a:ext>
+            </a:extLst>
+          </p:cNvPr>
+          <p:cNvCxnSpPr>
+            <a:cxnSpLocks/>
+            <a:stCxn id="123" idx="3"/>
+            <a:endCxn id="31" idx="1"/>
+          </p:cNvCxnSpPr>
+          <p:nvPr/>
+        </p:nvCxnSpPr>
+        <p:spPr>
+          <a:xfrm flipV="1">
+            <a:off x="1202505" y="1923542"/>
+            <a:ext cx="1028392" cy="682073"/>
+          </a:xfrm>
+          <a:prstGeom prst="straightConnector1">
+            <a:avLst/>
+          </a:prstGeom>
+          <a:ln>
+            <a:tailEnd type="triangle"/>
+          </a:ln>
+        </p:spPr>
+        <p:style>
+          <a:lnRef idx="1">
+            <a:schemeClr val="accent1"/>
+          </a:lnRef>
+          <a:fillRef idx="0">
+            <a:schemeClr val="accent1"/>
+          </a:fillRef>
+          <a:effectRef idx="0">
+            <a:schemeClr val="accent1"/>
+          </a:effectRef>
+          <a:fontRef idx="minor">
+            <a:schemeClr val="tx1"/>
+          </a:fontRef>
+        </p:style>
+      </p:cxnSp>
+      <p:sp>
+        <p:nvSpPr>
+          <p:cNvPr id="195" name="TextBox 194">
+            <a:extLst>
+              <a:ext uri="{FF2B5EF4-FFF2-40B4-BE49-F238E27FC236}">
+                <a16:creationId xmlns:a16="http://schemas.microsoft.com/office/drawing/2014/main" id="{7DF6215B-1ECD-45F0-A34F-7B63F3576D2F}"/>
+              </a:ext>
+            </a:extLst>
+          </p:cNvPr>
+          <p:cNvSpPr txBox="1"/>
+          <p:nvPr/>
+        </p:nvSpPr>
+        <p:spPr>
+          <a:xfrm>
+            <a:off x="1382576" y="2386448"/>
+            <a:ext cx="768159" cy="230832"/>
+          </a:xfrm>
+          <a:prstGeom prst="rect">
+            <a:avLst/>
+          </a:prstGeom>
+          <a:noFill/>
+        </p:spPr>
+        <p:txBody>
+          <a:bodyPr wrap="none" rtlCol="0">
+            <a:spAutoFit/>
+          </a:bodyPr>
+          <a:lstStyle/>
+          <a:p>
+            <a:r>
+              <a:rPr lang="en-CA" sz="900" dirty="0"/>
+              <a:t>Docker push</a:t>
+            </a:r>
+          </a:p>
+        </p:txBody>
+      </p:sp>
+      <p:sp>
+        <p:nvSpPr>
+          <p:cNvPr id="196" name="TextBox 195">
+            <a:extLst>
+              <a:ext uri="{FF2B5EF4-FFF2-40B4-BE49-F238E27FC236}">
+                <a16:creationId xmlns:a16="http://schemas.microsoft.com/office/drawing/2014/main" id="{6F03F7E0-D395-45A1-9BC2-2F86B701012A}"/>
+              </a:ext>
+            </a:extLst>
+          </p:cNvPr>
+          <p:cNvSpPr txBox="1"/>
+          <p:nvPr/>
+        </p:nvSpPr>
+        <p:spPr>
+          <a:xfrm>
+            <a:off x="3745079" y="2340788"/>
+            <a:ext cx="716863" cy="230832"/>
+          </a:xfrm>
+          <a:prstGeom prst="rect">
+            <a:avLst/>
+          </a:prstGeom>
+          <a:solidFill>
+            <a:schemeClr val="bg1"/>
+          </a:solidFill>
+        </p:spPr>
+        <p:txBody>
+          <a:bodyPr wrap="none" rtlCol="0">
+            <a:spAutoFit/>
+          </a:bodyPr>
+          <a:lstStyle/>
+          <a:p>
+            <a:r>
+              <a:rPr lang="en-CA" sz="900" dirty="0"/>
+              <a:t>Docker pull</a:t>
+            </a:r>
+          </a:p>
+        </p:txBody>
+      </p:sp>
+      <p:sp>
+        <p:nvSpPr>
+          <p:cNvPr id="199" name="TextBox 198">
+            <a:extLst>
+              <a:ext uri="{FF2B5EF4-FFF2-40B4-BE49-F238E27FC236}">
+                <a16:creationId xmlns:a16="http://schemas.microsoft.com/office/drawing/2014/main" id="{AE6CC085-83D5-4BB1-B9F3-E1A5F84DA80E}"/>
+              </a:ext>
+            </a:extLst>
+          </p:cNvPr>
+          <p:cNvSpPr txBox="1"/>
+          <p:nvPr/>
+        </p:nvSpPr>
+        <p:spPr>
+          <a:xfrm>
+            <a:off x="3879943" y="1671991"/>
+            <a:ext cx="428322" cy="230832"/>
+          </a:xfrm>
+          <a:prstGeom prst="rect">
+            <a:avLst/>
+          </a:prstGeom>
+          <a:solidFill>
+            <a:schemeClr val="bg1"/>
+          </a:solidFill>
+        </p:spPr>
+        <p:txBody>
+          <a:bodyPr wrap="none" rtlCol="0">
+            <a:spAutoFit/>
+          </a:bodyPr>
+          <a:lstStyle/>
+          <a:p>
+            <a:r>
+              <a:rPr lang="en-CA" sz="900" dirty="0"/>
+              <a:t>HTTP</a:t>
+            </a:r>
+          </a:p>
+        </p:txBody>
+      </p:sp>
+      <p:sp>
+        <p:nvSpPr>
+          <p:cNvPr id="201" name="TextBox 200">
+            <a:extLst>
+              <a:ext uri="{FF2B5EF4-FFF2-40B4-BE49-F238E27FC236}">
+                <a16:creationId xmlns:a16="http://schemas.microsoft.com/office/drawing/2014/main" id="{4103E5F5-A896-4729-BC0C-0822808DC57A}"/>
+              </a:ext>
+            </a:extLst>
+          </p:cNvPr>
+          <p:cNvSpPr txBox="1"/>
+          <p:nvPr/>
+        </p:nvSpPr>
+        <p:spPr>
+          <a:xfrm>
+            <a:off x="1074838" y="1550246"/>
+            <a:ext cx="829073" cy="507831"/>
+          </a:xfrm>
+          <a:prstGeom prst="rect">
+            <a:avLst/>
+          </a:prstGeom>
+          <a:noFill/>
+        </p:spPr>
+        <p:txBody>
+          <a:bodyPr wrap="none" rtlCol="0">
+            <a:spAutoFit/>
+          </a:bodyPr>
+          <a:lstStyle/>
+          <a:p>
+            <a:pPr algn="ctr"/>
+            <a:r>
+              <a:rPr lang="en-CA" sz="900" dirty="0"/>
+              <a:t>Load test</a:t>
+            </a:r>
+          </a:p>
+          <a:p>
+            <a:pPr algn="ctr"/>
+            <a:r>
+              <a:rPr lang="en-CA" sz="900" dirty="0"/>
+              <a:t>/</a:t>
+            </a:r>
+          </a:p>
+          <a:p>
+            <a:pPr algn="ctr"/>
+            <a:r>
+              <a:rPr lang="en-CA" sz="900" dirty="0"/>
+              <a:t>Coverage test</a:t>
+            </a:r>
+          </a:p>
+        </p:txBody>
+      </p:sp>
+      <p:sp>
+        <p:nvSpPr>
+          <p:cNvPr id="43" name="Rectangle 42">
+            <a:extLst>
+              <a:ext uri="{FF2B5EF4-FFF2-40B4-BE49-F238E27FC236}">
+                <a16:creationId xmlns:a16="http://schemas.microsoft.com/office/drawing/2014/main" id="{8D810F9C-1904-45F9-8846-BFD890FB3242}"/>
               </a:ext>
             </a:extLst>
           </p:cNvPr>
@@ -4150,8 +4324,72 @@
         </p:nvSpPr>
         <p:spPr>
           <a:xfrm>
-            <a:off x="5731391" y="1364885"/>
-            <a:ext cx="948230" cy="551723"/>
+            <a:off x="7325010" y="2671439"/>
+            <a:ext cx="3974960" cy="1095217"/>
+          </a:xfrm>
+          <a:prstGeom prst="rect">
+            <a:avLst/>
+          </a:prstGeom>
+          <a:noFill/>
+          <a:ln>
+            <a:solidFill>
+              <a:schemeClr val="tx1"/>
+            </a:solidFill>
+            <a:prstDash val="dash"/>
+          </a:ln>
+        </p:spPr>
+        <p:style>
+          <a:lnRef idx="2">
+            <a:schemeClr val="accent1">
+              <a:shade val="50000"/>
+            </a:schemeClr>
+          </a:lnRef>
+          <a:fillRef idx="1">
+            <a:schemeClr val="accent1"/>
+          </a:fillRef>
+          <a:effectRef idx="0">
+            <a:schemeClr val="accent1"/>
+          </a:effectRef>
+          <a:fontRef idx="minor">
+            <a:schemeClr val="lt1"/>
+          </a:fontRef>
+        </p:style>
+        <p:txBody>
+          <a:bodyPr rtlCol="0" anchor="t" anchorCtr="0"/>
+          <a:lstStyle/>
+          <a:p>
+            <a:r>
+              <a:rPr lang="es-CO" sz="1200" u="sng" dirty="0">
+                <a:solidFill>
+                  <a:schemeClr val="tx1"/>
+                </a:solidFill>
+              </a:rPr>
+              <a:t>NODE 2</a:t>
+            </a:r>
+            <a:endParaRPr lang="en-CA" sz="1200" u="sng" dirty="0">
+              <a:solidFill>
+                <a:schemeClr val="tx1"/>
+              </a:solidFill>
+            </a:endParaRPr>
+          </a:p>
+        </p:txBody>
+      </p:sp>
+      <p:sp>
+        <p:nvSpPr>
+          <p:cNvPr id="76" name="Rectangle 75">
+            <a:extLst>
+              <a:ext uri="{FF2B5EF4-FFF2-40B4-BE49-F238E27FC236}">
+                <a16:creationId xmlns:a16="http://schemas.microsoft.com/office/drawing/2014/main" id="{6E9F0B61-B86E-46DB-9737-78E3B42C2C98}"/>
+              </a:ext>
+            </a:extLst>
+          </p:cNvPr>
+          <p:cNvSpPr/>
+          <p:nvPr/>
+        </p:nvSpPr>
+        <p:spPr>
+          <a:xfrm>
+            <a:off x="7476157" y="1809013"/>
+            <a:ext cx="767940" cy="326675"/>
           </a:xfrm>
           <a:prstGeom prst="rect">
             <a:avLst/>
@@ -4180,24 +4418,30 @@
           </a:fontRef>
         </p:style>
         <p:txBody>
-          <a:bodyPr rot="0" spcFirstLastPara="0" vertOverflow="overflow" horzOverflow="overflow" vert="horz" wrap="square" lIns="91440" tIns="45720" rIns="91440" bIns="45720" numCol="1" spcCol="0" rtlCol="0" fromWordArt="0" anchor="ctr" anchorCtr="0" forceAA="0" compatLnSpc="1">
-            <a:prstTxWarp prst="textNoShape">
-              <a:avLst/>
-            </a:prstTxWarp>
-            <a:noAutofit/>
-          </a:bodyPr>
+          <a:bodyPr rtlCol="0" anchor="ctr" anchorCtr="0"/>
           <a:lstStyle/>
           <a:p>
             <a:pPr algn="ctr"/>
             <a:r>
-              <a:rPr lang="es-CO" sz="1200" b="1" dirty="0">
+              <a:rPr lang="es-CO" sz="1000" b="1" dirty="0">
                 <a:solidFill>
                   <a:schemeClr val="tx1"/>
                 </a:solidFill>
               </a:rPr>
-              <a:t>Istio Gateway</a:t>
-            </a:r>
-            <a:endParaRPr lang="en-CA" sz="1200" b="1" dirty="0">
+              <a:t>Bill </a:t>
+            </a:r>
+          </a:p>
+          <a:p>
+            <a:pPr algn="ctr"/>
+            <a:r>
+              <a:rPr lang="es-CO" sz="1000" b="1" dirty="0">
+                <a:solidFill>
+                  <a:schemeClr val="tx1"/>
+                </a:solidFill>
+              </a:rPr>
+              <a:t>container</a:t>
+            </a:r>
+            <a:endParaRPr lang="en-CA" sz="1000" b="1" dirty="0">
               <a:solidFill>
                 <a:schemeClr val="tx1"/>
               </a:solidFill>
@@ -4205,12 +4449,91 @@
           </a:p>
         </p:txBody>
       </p:sp>
-      <p:sp>
-        <p:nvSpPr>
-          <p:cNvPr id="40" name="Rectangle 39">
-            <a:extLst>
-              <a:ext uri="{FF2B5EF4-FFF2-40B4-BE49-F238E27FC236}">
-                <a16:creationId xmlns:a16="http://schemas.microsoft.com/office/drawing/2014/main" id="{D00C6B2B-A62F-4181-A24B-BF19E88A0A3E}"/>
+      <p:cxnSp>
+        <p:nvCxnSpPr>
+          <p:cNvPr id="36" name="Straight Arrow Connector 35">
+            <a:extLst>
+              <a:ext uri="{FF2B5EF4-FFF2-40B4-BE49-F238E27FC236}">
+                <a16:creationId xmlns:a16="http://schemas.microsoft.com/office/drawing/2014/main" id="{D3F559AE-B3E7-4F25-A19E-CBEC21F3A893}"/>
+              </a:ext>
+            </a:extLst>
+          </p:cNvPr>
+          <p:cNvCxnSpPr>
+            <a:cxnSpLocks/>
+            <a:stCxn id="89" idx="3"/>
+          </p:cNvCxnSpPr>
+          <p:nvPr/>
+        </p:nvCxnSpPr>
+        <p:spPr>
+          <a:xfrm>
+            <a:off x="3151285" y="3275677"/>
+            <a:ext cx="2234637" cy="0"/>
+          </a:xfrm>
+          <a:prstGeom prst="straightConnector1">
+            <a:avLst/>
+          </a:prstGeom>
+          <a:ln>
+            <a:tailEnd type="triangle"/>
+          </a:ln>
+        </p:spPr>
+        <p:style>
+          <a:lnRef idx="1">
+            <a:schemeClr val="accent1"/>
+          </a:lnRef>
+          <a:fillRef idx="0">
+            <a:schemeClr val="accent1"/>
+          </a:fillRef>
+          <a:effectRef idx="0">
+            <a:schemeClr val="accent1"/>
+          </a:effectRef>
+          <a:fontRef idx="minor">
+            <a:schemeClr val="tx1"/>
+          </a:fontRef>
+        </p:style>
+      </p:cxnSp>
+      <p:sp>
+        <p:nvSpPr>
+          <p:cNvPr id="88" name="TextBox 87">
+            <a:extLst>
+              <a:ext uri="{FF2B5EF4-FFF2-40B4-BE49-F238E27FC236}">
+                <a16:creationId xmlns:a16="http://schemas.microsoft.com/office/drawing/2014/main" id="{93F47A47-6960-4F33-9382-1540CED82E1E}"/>
+              </a:ext>
+            </a:extLst>
+          </p:cNvPr>
+          <p:cNvSpPr txBox="1"/>
+          <p:nvPr/>
+        </p:nvSpPr>
+        <p:spPr>
+          <a:xfrm>
+            <a:off x="3551235" y="3007010"/>
+            <a:ext cx="1188146" cy="230832"/>
+          </a:xfrm>
+          <a:prstGeom prst="rect">
+            <a:avLst/>
+          </a:prstGeom>
+          <a:solidFill>
+            <a:schemeClr val="bg1"/>
+          </a:solidFill>
+        </p:spPr>
+        <p:txBody>
+          <a:bodyPr wrap="none" rtlCol="0">
+            <a:spAutoFit/>
+          </a:bodyPr>
+          <a:lstStyle/>
+          <a:p>
+            <a:r>
+              <a:rPr lang="en-CA" sz="900" dirty="0"/>
+              <a:t>YAML / Manifest files</a:t>
+            </a:r>
+          </a:p>
+        </p:txBody>
+      </p:sp>
+      <p:sp>
+        <p:nvSpPr>
+          <p:cNvPr id="89" name="Rectangle 88">
+            <a:extLst>
+              <a:ext uri="{FF2B5EF4-FFF2-40B4-BE49-F238E27FC236}">
+                <a16:creationId xmlns:a16="http://schemas.microsoft.com/office/drawing/2014/main" id="{9B364787-891A-472D-BB1D-6624EAF49B03}"/>
               </a:ext>
             </a:extLst>
           </p:cNvPr>
@@ -4219,8 +4542,8 @@
         </p:nvSpPr>
         <p:spPr>
           <a:xfrm>
-            <a:off x="5736160" y="2207441"/>
-            <a:ext cx="943462" cy="551723"/>
+            <a:off x="2226320" y="3009714"/>
+            <a:ext cx="924965" cy="531926"/>
           </a:xfrm>
           <a:prstGeom prst="rect">
             <a:avLst/>
@@ -4264,18 +4587,7 @@
                   <a:schemeClr val="tx1"/>
                 </a:solidFill>
               </a:rPr>
-              <a:t>Istio </a:t>
-            </a:r>
-          </a:p>
-          <a:p>
-            <a:pPr algn="ctr"/>
-            <a:r>
-              <a:rPr lang="es-CO" sz="1200" b="1" dirty="0">
-                <a:solidFill>
-                  <a:schemeClr val="tx1"/>
-                </a:solidFill>
-              </a:rPr>
-              <a:t>Control Plane</a:t>
+              <a:t>Kubectl</a:t>
             </a:r>
             <a:endParaRPr lang="en-CA" sz="1200" b="1" dirty="0">
               <a:solidFill>
@@ -4287,30 +4599,29 @@
       </p:sp>
       <p:cxnSp>
         <p:nvCxnSpPr>
-          <p:cNvPr id="27" name="Straight Arrow Connector 26">
-            <a:extLst>
-              <a:ext uri="{FF2B5EF4-FFF2-40B4-BE49-F238E27FC236}">
-                <a16:creationId xmlns:a16="http://schemas.microsoft.com/office/drawing/2014/main" id="{DE6C910F-BBE1-4801-BD3F-295E22C4DA23}"/>
+          <p:cNvPr id="49" name="Straight Arrow Connector 48">
+            <a:extLst>
+              <a:ext uri="{FF2B5EF4-FFF2-40B4-BE49-F238E27FC236}">
+                <a16:creationId xmlns:a16="http://schemas.microsoft.com/office/drawing/2014/main" id="{5B1EE2F9-CC2E-41AA-8144-FED3E0F436BA}"/>
               </a:ext>
             </a:extLst>
           </p:cNvPr>
           <p:cNvCxnSpPr>
             <a:cxnSpLocks/>
-            <a:stCxn id="40" idx="2"/>
-            <a:endCxn id="15" idx="0"/>
+            <a:stCxn id="123" idx="3"/>
+            <a:endCxn id="89" idx="1"/>
           </p:cNvCxnSpPr>
           <p:nvPr/>
         </p:nvCxnSpPr>
         <p:spPr>
-          <a:xfrm flipH="1">
-            <a:off x="6207889" y="2759164"/>
-            <a:ext cx="2" cy="325493"/>
+          <a:xfrm>
+            <a:off x="1202505" y="2605615"/>
+            <a:ext cx="1023815" cy="670062"/>
           </a:xfrm>
           <a:prstGeom prst="straightConnector1">
             <a:avLst/>
           </a:prstGeom>
           <a:ln>
-            <a:headEnd type="triangle"/>
             <a:tailEnd type="triangle"/>
           </a:ln>
         </p:spPr>
@@ -4329,143 +4640,90 @@
           </a:fontRef>
         </p:style>
       </p:cxnSp>
-      <p:cxnSp>
-        <p:nvCxnSpPr>
-          <p:cNvPr id="42" name="Straight Arrow Connector 41">
-            <a:extLst>
-              <a:ext uri="{FF2B5EF4-FFF2-40B4-BE49-F238E27FC236}">
-                <a16:creationId xmlns:a16="http://schemas.microsoft.com/office/drawing/2014/main" id="{D41A7A57-7AF9-4656-BAD2-A2D8A24371EE}"/>
-              </a:ext>
-            </a:extLst>
-          </p:cNvPr>
-          <p:cNvCxnSpPr>
-            <a:cxnSpLocks/>
-            <a:stCxn id="39" idx="3"/>
-          </p:cNvCxnSpPr>
+      <p:sp>
+        <p:nvSpPr>
+          <p:cNvPr id="90" name="TextBox 89">
+            <a:extLst>
+              <a:ext uri="{FF2B5EF4-FFF2-40B4-BE49-F238E27FC236}">
+                <a16:creationId xmlns:a16="http://schemas.microsoft.com/office/drawing/2014/main" id="{36D12A27-5C89-4327-AE60-7A56B2394699}"/>
+              </a:ext>
+            </a:extLst>
+          </p:cNvPr>
+          <p:cNvSpPr txBox="1"/>
           <p:nvPr/>
-        </p:nvCxnSpPr>
-        <p:spPr>
-          <a:xfrm flipV="1">
-            <a:off x="6679621" y="1640746"/>
-            <a:ext cx="645388" cy="1"/>
-          </a:xfrm>
-          <a:prstGeom prst="straightConnector1">
+        </p:nvSpPr>
+        <p:spPr>
+          <a:xfrm>
+            <a:off x="1444444" y="3024421"/>
+            <a:ext cx="405880" cy="230832"/>
+          </a:xfrm>
+          <a:prstGeom prst="rect">
             <a:avLst/>
           </a:prstGeom>
-          <a:ln>
-            <a:headEnd type="triangle"/>
-            <a:tailEnd type="triangle"/>
-          </a:ln>
-        </p:spPr>
-        <p:style>
-          <a:lnRef idx="1">
-            <a:schemeClr val="accent1"/>
-          </a:lnRef>
-          <a:fillRef idx="0">
-            <a:schemeClr val="accent1"/>
-          </a:fillRef>
-          <a:effectRef idx="0">
-            <a:schemeClr val="accent1"/>
-          </a:effectRef>
-          <a:fontRef idx="minor">
-            <a:schemeClr val="tx1"/>
-          </a:fontRef>
-        </p:style>
-      </p:cxnSp>
-      <p:cxnSp>
-        <p:nvCxnSpPr>
-          <p:cNvPr id="57" name="Straight Arrow Connector 56">
-            <a:extLst>
-              <a:ext uri="{FF2B5EF4-FFF2-40B4-BE49-F238E27FC236}">
-                <a16:creationId xmlns:a16="http://schemas.microsoft.com/office/drawing/2014/main" id="{36DE3E0F-4AD9-455D-8435-0805A6CEE7BE}"/>
-              </a:ext>
-            </a:extLst>
-          </p:cNvPr>
-          <p:cNvCxnSpPr>
-            <a:cxnSpLocks/>
-            <a:stCxn id="31" idx="3"/>
-            <a:endCxn id="39" idx="1"/>
-          </p:cNvCxnSpPr>
+          <a:noFill/>
+        </p:spPr>
+        <p:txBody>
+          <a:bodyPr wrap="none" rtlCol="0">
+            <a:spAutoFit/>
+          </a:bodyPr>
+          <a:lstStyle/>
+          <a:p>
+            <a:r>
+              <a:rPr lang="en-CA" sz="900" dirty="0"/>
+              <a:t>Uses</a:t>
+            </a:r>
+          </a:p>
+        </p:txBody>
+      </p:sp>
+      <p:sp>
+        <p:nvSpPr>
+          <p:cNvPr id="91" name="TextBox 90">
+            <a:extLst>
+              <a:ext uri="{FF2B5EF4-FFF2-40B4-BE49-F238E27FC236}">
+                <a16:creationId xmlns:a16="http://schemas.microsoft.com/office/drawing/2014/main" id="{BD9FB128-4A4C-469C-9159-09B7475AA8DC}"/>
+              </a:ext>
+            </a:extLst>
+          </p:cNvPr>
+          <p:cNvSpPr txBox="1"/>
           <p:nvPr/>
-        </p:nvCxnSpPr>
-        <p:spPr>
-          <a:xfrm flipV="1">
-            <a:off x="2742339" y="1640747"/>
-            <a:ext cx="2989052" cy="1223"/>
-          </a:xfrm>
-          <a:prstGeom prst="straightConnector1">
+        </p:nvSpPr>
+        <p:spPr>
+          <a:xfrm>
+            <a:off x="334816" y="2800085"/>
+            <a:ext cx="886781" cy="369332"/>
+          </a:xfrm>
+          <a:prstGeom prst="rect">
             <a:avLst/>
           </a:prstGeom>
-          <a:ln>
-            <a:headEnd type="triangle"/>
-            <a:tailEnd type="triangle"/>
-          </a:ln>
-        </p:spPr>
-        <p:style>
-          <a:lnRef idx="1">
-            <a:schemeClr val="accent1"/>
-          </a:lnRef>
-          <a:fillRef idx="0">
-            <a:schemeClr val="accent1"/>
-          </a:fillRef>
-          <a:effectRef idx="0">
-            <a:schemeClr val="accent1"/>
-          </a:effectRef>
-          <a:fontRef idx="minor">
-            <a:schemeClr val="tx1"/>
-          </a:fontRef>
-        </p:style>
-      </p:cxnSp>
-      <p:cxnSp>
-        <p:nvCxnSpPr>
-          <p:cNvPr id="60" name="Straight Arrow Connector 59">
-            <a:extLst>
-              <a:ext uri="{FF2B5EF4-FFF2-40B4-BE49-F238E27FC236}">
-                <a16:creationId xmlns:a16="http://schemas.microsoft.com/office/drawing/2014/main" id="{5AA90253-E355-42FB-A14D-AB421E874D21}"/>
-              </a:ext>
-            </a:extLst>
-          </p:cNvPr>
-          <p:cNvCxnSpPr>
-            <a:cxnSpLocks/>
-            <a:stCxn id="4" idx="2"/>
-            <a:endCxn id="32" idx="0"/>
-          </p:cNvCxnSpPr>
-          <p:nvPr/>
-        </p:nvCxnSpPr>
-        <p:spPr>
-          <a:xfrm>
-            <a:off x="8350697" y="4130605"/>
-            <a:ext cx="12438" cy="1299927"/>
-          </a:xfrm>
-          <a:prstGeom prst="straightConnector1">
-            <a:avLst/>
-          </a:prstGeom>
-          <a:ln>
-            <a:headEnd type="triangle"/>
-            <a:tailEnd type="triangle"/>
-          </a:ln>
-        </p:spPr>
-        <p:style>
-          <a:lnRef idx="1">
-            <a:schemeClr val="accent1"/>
-          </a:lnRef>
-          <a:fillRef idx="0">
-            <a:schemeClr val="accent1"/>
-          </a:fillRef>
-          <a:effectRef idx="0">
-            <a:schemeClr val="accent1"/>
-          </a:effectRef>
-          <a:fontRef idx="minor">
-            <a:schemeClr val="tx1"/>
-          </a:fontRef>
-        </p:style>
-      </p:cxnSp>
-      <p:sp>
-        <p:nvSpPr>
-          <p:cNvPr id="108" name="Rectangle 107">
-            <a:extLst>
-              <a:ext uri="{FF2B5EF4-FFF2-40B4-BE49-F238E27FC236}">
-                <a16:creationId xmlns:a16="http://schemas.microsoft.com/office/drawing/2014/main" id="{391447A9-CD71-4262-88AA-585BEE80AA86}"/>
+          <a:noFill/>
+        </p:spPr>
+        <p:txBody>
+          <a:bodyPr wrap="none" rtlCol="0">
+            <a:spAutoFit/>
+          </a:bodyPr>
+          <a:lstStyle/>
+          <a:p>
+            <a:pPr algn="ctr"/>
+            <a:r>
+              <a:rPr lang="en-CA" sz="900" dirty="0"/>
+              <a:t>T4-Wednesday</a:t>
+            </a:r>
+          </a:p>
+          <a:p>
+            <a:pPr algn="ctr"/>
+            <a:r>
+              <a:rPr lang="en-CA" sz="900" dirty="0"/>
+              <a:t>team</a:t>
+            </a:r>
+          </a:p>
+        </p:txBody>
+      </p:sp>
+      <p:sp>
+        <p:nvSpPr>
+          <p:cNvPr id="133" name="Rectangle 132">
+            <a:extLst>
+              <a:ext uri="{FF2B5EF4-FFF2-40B4-BE49-F238E27FC236}">
+                <a16:creationId xmlns:a16="http://schemas.microsoft.com/office/drawing/2014/main" id="{57938246-247B-4103-A19C-931E151834ED}"/>
               </a:ext>
             </a:extLst>
           </p:cNvPr>
@@ -4474,8 +4732,8 @@
         </p:nvSpPr>
         <p:spPr>
           <a:xfrm>
-            <a:off x="7426818" y="3282365"/>
-            <a:ext cx="767940" cy="307756"/>
+            <a:off x="5761682" y="2928364"/>
+            <a:ext cx="943463" cy="740978"/>
           </a:xfrm>
           <a:prstGeom prst="rect">
             <a:avLst/>
@@ -4514,30 +4772,27 @@
           <a:p>
             <a:pPr algn="ctr"/>
             <a:r>
-              <a:rPr lang="es-CO" sz="1000" b="1" dirty="0" err="1">
+              <a:rPr lang="es-CO" sz="1200" b="1" dirty="0">
                 <a:solidFill>
                   <a:schemeClr val="tx1"/>
                 </a:solidFill>
               </a:rPr>
-              <a:t>istio</a:t>
-            </a:r>
-            <a:r>
-              <a:rPr lang="es-CO" sz="1000" b="1" dirty="0">
-                <a:solidFill>
-                  <a:schemeClr val="tx1"/>
-                </a:solidFill>
-              </a:rPr>
-              <a:t>-proxy </a:t>
-            </a:r>
-          </a:p>
-        </p:txBody>
-      </p:sp>
-      <p:sp>
-        <p:nvSpPr>
-          <p:cNvPr id="121" name="Flowchart: Magnetic Disk 120">
-            <a:extLst>
-              <a:ext uri="{FF2B5EF4-FFF2-40B4-BE49-F238E27FC236}">
-                <a16:creationId xmlns:a16="http://schemas.microsoft.com/office/drawing/2014/main" id="{41FF734B-146B-4B68-BA9E-6EA34601A827}"/>
+              <a:t>Kubernetes API Server</a:t>
+            </a:r>
+            <a:endParaRPr lang="en-CA" sz="1200" b="1" dirty="0">
+              <a:solidFill>
+                <a:schemeClr val="tx1"/>
+              </a:solidFill>
+            </a:endParaRPr>
+          </a:p>
+        </p:txBody>
+      </p:sp>
+      <p:sp>
+        <p:nvSpPr>
+          <p:cNvPr id="134" name="Rectangle 133">
+            <a:extLst>
+              <a:ext uri="{FF2B5EF4-FFF2-40B4-BE49-F238E27FC236}">
+                <a16:creationId xmlns:a16="http://schemas.microsoft.com/office/drawing/2014/main" id="{B7CA7BF7-F973-4A3D-B412-55872902ADCB}"/>
               </a:ext>
             </a:extLst>
           </p:cNvPr>
@@ -4546,10 +4801,10 @@
         </p:nvSpPr>
         <p:spPr>
           <a:xfrm>
-            <a:off x="7810788" y="5757333"/>
-            <a:ext cx="1050990" cy="766227"/>
-          </a:xfrm>
-          <a:prstGeom prst="flowChartMagneticDisk">
+            <a:off x="5512119" y="2654724"/>
+            <a:ext cx="1387104" cy="1103542"/>
+          </a:xfrm>
+          <a:prstGeom prst="rect">
             <a:avLst/>
           </a:prstGeom>
           <a:noFill/>
@@ -4557,6 +4812,7 @@
             <a:solidFill>
               <a:schemeClr val="tx1"/>
             </a:solidFill>
+            <a:prstDash val="dash"/>
           </a:ln>
         </p:spPr>
         <p:style>
@@ -4576,512 +4832,98 @@
           </a:fontRef>
         </p:style>
         <p:txBody>
-          <a:bodyPr rtlCol="0" anchor="ctr"/>
-          <a:lstStyle/>
-          <a:p>
-            <a:pPr algn="ctr"/>
-            <a:r>
-              <a:rPr lang="en-CA" sz="1400" dirty="0">
+          <a:bodyPr rtlCol="0" anchor="t" anchorCtr="0"/>
+          <a:lstStyle/>
+          <a:p>
+            <a:r>
+              <a:rPr lang="es-CO" sz="1200" u="sng" dirty="0">
                 <a:solidFill>
                   <a:schemeClr val="tx1"/>
                 </a:solidFill>
               </a:rPr>
-              <a:t>DynamoDB</a:t>
-            </a:r>
-          </a:p>
-        </p:txBody>
-      </p:sp>
-      <p:pic>
-        <p:nvPicPr>
-          <p:cNvPr id="123" name="Graphic 122" descr="Users">
-            <a:extLst>
-              <a:ext uri="{FF2B5EF4-FFF2-40B4-BE49-F238E27FC236}">
-                <a16:creationId xmlns:a16="http://schemas.microsoft.com/office/drawing/2014/main" id="{1756A35F-981D-4229-B646-7747D1D186AB}"/>
-              </a:ext>
-            </a:extLst>
-          </p:cNvPr>
-          <p:cNvPicPr>
-            <a:picLocks noChangeAspect="1"/>
-          </p:cNvPicPr>
+              <a:t>Master </a:t>
+            </a:r>
+            <a:r>
+              <a:rPr lang="en-CA" sz="1200" u="sng" dirty="0">
+                <a:solidFill>
+                  <a:schemeClr val="tx1"/>
+                </a:solidFill>
+              </a:rPr>
+              <a:t>Node</a:t>
+            </a:r>
+          </a:p>
+        </p:txBody>
+      </p:sp>
+      <p:sp>
+        <p:nvSpPr>
+          <p:cNvPr id="139" name="Rectangle 138">
+            <a:extLst>
+              <a:ext uri="{FF2B5EF4-FFF2-40B4-BE49-F238E27FC236}">
+                <a16:creationId xmlns:a16="http://schemas.microsoft.com/office/drawing/2014/main" id="{050FCCEA-0C06-48CC-958C-DB18F29D70C3}"/>
+              </a:ext>
+            </a:extLst>
+          </p:cNvPr>
+          <p:cNvSpPr/>
           <p:nvPr/>
-        </p:nvPicPr>
-        <p:blipFill>
-          <a:blip r:embed="rId2">
-            <a:extLst>
-              <a:ext uri="{28A0092B-C50C-407E-A947-70E740481C1C}">
-                <a14:useLocalDpi xmlns:a14="http://schemas.microsoft.com/office/drawing/2010/main" val="0"/>
-              </a:ext>
-              <a:ext uri="{96DAC541-7B7A-43D3-8B79-37D633B846F1}">
-                <asvg:svgBlip xmlns:asvg="http://schemas.microsoft.com/office/drawing/2016/SVG/main" r:embed="rId3"/>
-              </a:ext>
-            </a:extLst>
-          </a:blip>
-          <a:stretch>
-            <a:fillRect/>
-          </a:stretch>
-        </p:blipFill>
-        <p:spPr>
-          <a:xfrm>
-            <a:off x="313651" y="2094454"/>
-            <a:ext cx="914400" cy="914400"/>
-          </a:xfrm>
-          <a:prstGeom prst="rect">
-            <a:avLst/>
-          </a:prstGeom>
-        </p:spPr>
-      </p:pic>
-      <p:cxnSp>
-        <p:nvCxnSpPr>
-          <p:cNvPr id="125" name="Straight Arrow Connector 124">
-            <a:extLst>
-              <a:ext uri="{FF2B5EF4-FFF2-40B4-BE49-F238E27FC236}">
-                <a16:creationId xmlns:a16="http://schemas.microsoft.com/office/drawing/2014/main" id="{18D22E3C-7BDE-4D04-AEF3-6F1274AAED87}"/>
-              </a:ext>
-            </a:extLst>
-          </p:cNvPr>
-          <p:cNvCxnSpPr>
-            <a:cxnSpLocks/>
-            <a:stCxn id="123" idx="3"/>
-            <a:endCxn id="50" idx="1"/>
-          </p:cNvCxnSpPr>
-          <p:nvPr/>
-        </p:nvCxnSpPr>
-        <p:spPr>
-          <a:xfrm>
-            <a:off x="1228051" y="2551654"/>
-            <a:ext cx="767940" cy="844103"/>
-          </a:xfrm>
-          <a:prstGeom prst="straightConnector1">
-            <a:avLst/>
-          </a:prstGeom>
-          <a:ln>
-            <a:tailEnd type="triangle"/>
-          </a:ln>
-        </p:spPr>
-        <p:style>
-          <a:lnRef idx="1">
-            <a:schemeClr val="accent1"/>
-          </a:lnRef>
-          <a:fillRef idx="0">
-            <a:schemeClr val="accent1"/>
-          </a:fillRef>
-          <a:effectRef idx="0">
-            <a:schemeClr val="accent1"/>
-          </a:effectRef>
-          <a:fontRef idx="minor">
-            <a:schemeClr val="tx1"/>
-          </a:fontRef>
-        </p:style>
-      </p:cxnSp>
-      <p:cxnSp>
-        <p:nvCxnSpPr>
-          <p:cNvPr id="128" name="Straight Connector 127">
-            <a:extLst>
-              <a:ext uri="{FF2B5EF4-FFF2-40B4-BE49-F238E27FC236}">
-                <a16:creationId xmlns:a16="http://schemas.microsoft.com/office/drawing/2014/main" id="{440B4903-F280-43A8-B046-DDD3ACE3475E}"/>
-              </a:ext>
-            </a:extLst>
-          </p:cNvPr>
-          <p:cNvCxnSpPr>
-            <a:cxnSpLocks/>
-            <a:stCxn id="45" idx="2"/>
-            <a:endCxn id="108" idx="0"/>
-          </p:cNvCxnSpPr>
-          <p:nvPr/>
-        </p:nvCxnSpPr>
-        <p:spPr>
-          <a:xfrm>
-            <a:off x="7810788" y="3149724"/>
-            <a:ext cx="0" cy="132641"/>
-          </a:xfrm>
-          <a:prstGeom prst="line">
-            <a:avLst/>
-          </a:prstGeom>
-          <a:ln>
-            <a:prstDash val="dash"/>
-          </a:ln>
-        </p:spPr>
-        <p:style>
-          <a:lnRef idx="1">
-            <a:schemeClr val="accent1"/>
-          </a:lnRef>
-          <a:fillRef idx="0">
-            <a:schemeClr val="accent1"/>
-          </a:fillRef>
-          <a:effectRef idx="0">
-            <a:schemeClr val="accent1"/>
-          </a:effectRef>
-          <a:fontRef idx="minor">
-            <a:schemeClr val="tx1"/>
-          </a:fontRef>
-        </p:style>
-      </p:cxnSp>
-      <p:cxnSp>
-        <p:nvCxnSpPr>
-          <p:cNvPr id="162" name="Straight Arrow Connector 161">
-            <a:extLst>
-              <a:ext uri="{FF2B5EF4-FFF2-40B4-BE49-F238E27FC236}">
-                <a16:creationId xmlns:a16="http://schemas.microsoft.com/office/drawing/2014/main" id="{E8CF5385-BEF0-4C42-983C-EDE3DEC90CB9}"/>
-              </a:ext>
-            </a:extLst>
-          </p:cNvPr>
-          <p:cNvCxnSpPr>
-            <a:stCxn id="123" idx="3"/>
-            <a:endCxn id="31" idx="1"/>
-          </p:cNvCxnSpPr>
-          <p:nvPr/>
-        </p:nvCxnSpPr>
-        <p:spPr>
-          <a:xfrm flipV="1">
-            <a:off x="1228051" y="1641970"/>
-            <a:ext cx="767939" cy="909684"/>
-          </a:xfrm>
-          <a:prstGeom prst="straightConnector1">
-            <a:avLst/>
-          </a:prstGeom>
-          <a:ln>
-            <a:tailEnd type="triangle"/>
-          </a:ln>
-        </p:spPr>
-        <p:style>
-          <a:lnRef idx="1">
-            <a:schemeClr val="accent1"/>
-          </a:lnRef>
-          <a:fillRef idx="0">
-            <a:schemeClr val="accent1"/>
-          </a:fillRef>
-          <a:effectRef idx="0">
-            <a:schemeClr val="accent1"/>
-          </a:effectRef>
-          <a:fontRef idx="minor">
-            <a:schemeClr val="tx1"/>
-          </a:fontRef>
-        </p:style>
-      </p:cxnSp>
-      <p:cxnSp>
-        <p:nvCxnSpPr>
-          <p:cNvPr id="165" name="Connector: Elbow 164">
-            <a:extLst>
-              <a:ext uri="{FF2B5EF4-FFF2-40B4-BE49-F238E27FC236}">
-                <a16:creationId xmlns:a16="http://schemas.microsoft.com/office/drawing/2014/main" id="{6073BC5C-633A-481D-AFB0-3510071F587C}"/>
-              </a:ext>
-            </a:extLst>
-          </p:cNvPr>
-          <p:cNvCxnSpPr>
-            <a:cxnSpLocks/>
-            <a:stCxn id="50" idx="0"/>
-            <a:endCxn id="6" idx="1"/>
-          </p:cNvCxnSpPr>
-          <p:nvPr/>
-        </p:nvCxnSpPr>
-        <p:spPr>
-          <a:xfrm rot="5400000" flipH="1" flipV="1">
-            <a:off x="2793262" y="2363949"/>
-            <a:ext cx="292921" cy="1141113"/>
-          </a:xfrm>
-          <a:prstGeom prst="bentConnector2">
-            <a:avLst/>
-          </a:prstGeom>
-          <a:ln>
-            <a:tailEnd type="triangle"/>
-          </a:ln>
-        </p:spPr>
-        <p:style>
-          <a:lnRef idx="1">
-            <a:schemeClr val="accent1"/>
-          </a:lnRef>
-          <a:fillRef idx="0">
-            <a:schemeClr val="accent1"/>
-          </a:fillRef>
-          <a:effectRef idx="0">
-            <a:schemeClr val="accent1"/>
-          </a:effectRef>
-          <a:fontRef idx="minor">
-            <a:schemeClr val="tx1"/>
-          </a:fontRef>
-        </p:style>
-      </p:cxnSp>
-      <p:sp>
-        <p:nvSpPr>
-          <p:cNvPr id="195" name="TextBox 194">
-            <a:extLst>
-              <a:ext uri="{FF2B5EF4-FFF2-40B4-BE49-F238E27FC236}">
-                <a16:creationId xmlns:a16="http://schemas.microsoft.com/office/drawing/2014/main" id="{7DF6215B-1ECD-45F0-A34F-7B63F3576D2F}"/>
-              </a:ext>
-            </a:extLst>
-          </p:cNvPr>
-          <p:cNvSpPr txBox="1"/>
-          <p:nvPr/>
-        </p:nvSpPr>
-        <p:spPr>
-          <a:xfrm>
-            <a:off x="2606265" y="2582414"/>
-            <a:ext cx="768159" cy="230832"/>
+        </p:nvSpPr>
+        <p:spPr>
+          <a:xfrm>
+            <a:off x="7421459" y="1580493"/>
+            <a:ext cx="877064" cy="607922"/>
           </a:xfrm>
           <a:prstGeom prst="rect">
             <a:avLst/>
           </a:prstGeom>
           <a:noFill/>
-        </p:spPr>
-        <p:txBody>
-          <a:bodyPr wrap="none" rtlCol="0">
-            <a:spAutoFit/>
-          </a:bodyPr>
-          <a:lstStyle/>
-          <a:p>
-            <a:r>
-              <a:rPr lang="en-CA" sz="900" dirty="0"/>
-              <a:t>Docker push</a:t>
-            </a:r>
-          </a:p>
-        </p:txBody>
-      </p:sp>
-      <p:sp>
-        <p:nvSpPr>
-          <p:cNvPr id="196" name="TextBox 195">
-            <a:extLst>
-              <a:ext uri="{FF2B5EF4-FFF2-40B4-BE49-F238E27FC236}">
-                <a16:creationId xmlns:a16="http://schemas.microsoft.com/office/drawing/2014/main" id="{6F03F7E0-D395-45A1-9BC2-2F86B701012A}"/>
-              </a:ext>
-            </a:extLst>
-          </p:cNvPr>
-          <p:cNvSpPr txBox="1"/>
-          <p:nvPr/>
-        </p:nvSpPr>
-        <p:spPr>
-          <a:xfrm>
-            <a:off x="4594357" y="2539336"/>
-            <a:ext cx="716863" cy="230832"/>
-          </a:xfrm>
-          <a:prstGeom prst="rect">
-            <a:avLst/>
-          </a:prstGeom>
-          <a:solidFill>
-            <a:schemeClr val="bg1"/>
-          </a:solidFill>
-        </p:spPr>
-        <p:txBody>
-          <a:bodyPr wrap="none" rtlCol="0">
-            <a:spAutoFit/>
-          </a:bodyPr>
-          <a:lstStyle/>
-          <a:p>
-            <a:r>
-              <a:rPr lang="en-CA" sz="900" dirty="0"/>
-              <a:t>Docker pull</a:t>
-            </a:r>
-          </a:p>
-        </p:txBody>
-      </p:sp>
-      <p:sp>
-        <p:nvSpPr>
-          <p:cNvPr id="199" name="TextBox 198">
-            <a:extLst>
-              <a:ext uri="{FF2B5EF4-FFF2-40B4-BE49-F238E27FC236}">
-                <a16:creationId xmlns:a16="http://schemas.microsoft.com/office/drawing/2014/main" id="{AE6CC085-83D5-4BB1-B9F3-E1A5F84DA80E}"/>
-              </a:ext>
-            </a:extLst>
-          </p:cNvPr>
-          <p:cNvSpPr txBox="1"/>
-          <p:nvPr/>
-        </p:nvSpPr>
-        <p:spPr>
-          <a:xfrm>
-            <a:off x="3691410" y="1390043"/>
-            <a:ext cx="428322" cy="230832"/>
-          </a:xfrm>
-          <a:prstGeom prst="rect">
-            <a:avLst/>
-          </a:prstGeom>
-          <a:solidFill>
-            <a:schemeClr val="bg1"/>
-          </a:solidFill>
-        </p:spPr>
-        <p:txBody>
-          <a:bodyPr wrap="none" rtlCol="0">
-            <a:spAutoFit/>
-          </a:bodyPr>
-          <a:lstStyle/>
-          <a:p>
-            <a:r>
-              <a:rPr lang="en-CA" sz="900" dirty="0"/>
-              <a:t>HTTP</a:t>
-            </a:r>
-          </a:p>
-        </p:txBody>
-      </p:sp>
-      <p:sp>
-        <p:nvSpPr>
-          <p:cNvPr id="200" name="TextBox 199">
-            <a:extLst>
-              <a:ext uri="{FF2B5EF4-FFF2-40B4-BE49-F238E27FC236}">
-                <a16:creationId xmlns:a16="http://schemas.microsoft.com/office/drawing/2014/main" id="{0D354B8D-4B83-4231-A901-2E2D1BD14F18}"/>
-              </a:ext>
-            </a:extLst>
-          </p:cNvPr>
-          <p:cNvSpPr txBox="1"/>
-          <p:nvPr/>
-        </p:nvSpPr>
-        <p:spPr>
-          <a:xfrm>
-            <a:off x="3758600" y="3454727"/>
-            <a:ext cx="569387" cy="230832"/>
-          </a:xfrm>
-          <a:prstGeom prst="rect">
-            <a:avLst/>
-          </a:prstGeom>
-          <a:solidFill>
-            <a:schemeClr val="bg1"/>
-          </a:solidFill>
-        </p:spPr>
-        <p:txBody>
-          <a:bodyPr wrap="none" rtlCol="0">
-            <a:spAutoFit/>
-          </a:bodyPr>
-          <a:lstStyle/>
-          <a:p>
-            <a:r>
-              <a:rPr lang="en-CA" sz="900" dirty="0"/>
-              <a:t>Push src</a:t>
-            </a:r>
-          </a:p>
-        </p:txBody>
-      </p:sp>
-      <p:sp>
-        <p:nvSpPr>
-          <p:cNvPr id="201" name="TextBox 200">
-            <a:extLst>
-              <a:ext uri="{FF2B5EF4-FFF2-40B4-BE49-F238E27FC236}">
-                <a16:creationId xmlns:a16="http://schemas.microsoft.com/office/drawing/2014/main" id="{4103E5F5-A896-4729-BC0C-0822808DC57A}"/>
-              </a:ext>
-            </a:extLst>
-          </p:cNvPr>
-          <p:cNvSpPr txBox="1"/>
-          <p:nvPr/>
-        </p:nvSpPr>
-        <p:spPr>
-          <a:xfrm>
-            <a:off x="1019936" y="1490642"/>
-            <a:ext cx="829073" cy="507831"/>
-          </a:xfrm>
-          <a:prstGeom prst="rect">
-            <a:avLst/>
-          </a:prstGeom>
-          <a:noFill/>
-        </p:spPr>
-        <p:txBody>
-          <a:bodyPr wrap="none" rtlCol="0">
-            <a:spAutoFit/>
-          </a:bodyPr>
-          <a:lstStyle/>
-          <a:p>
-            <a:pPr algn="ctr"/>
-            <a:r>
-              <a:rPr lang="en-CA" sz="900" dirty="0"/>
-              <a:t>Load test</a:t>
-            </a:r>
-          </a:p>
-          <a:p>
-            <a:pPr algn="ctr"/>
-            <a:r>
-              <a:rPr lang="en-CA" sz="900" dirty="0"/>
-              <a:t>/</a:t>
-            </a:r>
-          </a:p>
-          <a:p>
-            <a:pPr algn="ctr"/>
-            <a:r>
-              <a:rPr lang="en-CA" sz="900" dirty="0"/>
-              <a:t>Coverage test</a:t>
-            </a:r>
-          </a:p>
-        </p:txBody>
-      </p:sp>
-      <p:cxnSp>
-        <p:nvCxnSpPr>
-          <p:cNvPr id="12" name="Straight Arrow Connector 11">
-            <a:extLst>
-              <a:ext uri="{FF2B5EF4-FFF2-40B4-BE49-F238E27FC236}">
-                <a16:creationId xmlns:a16="http://schemas.microsoft.com/office/drawing/2014/main" id="{2E91B355-991C-4E1D-B391-BAD68E7F6A53}"/>
-              </a:ext>
-            </a:extLst>
-          </p:cNvPr>
-          <p:cNvCxnSpPr>
-            <a:stCxn id="31" idx="0"/>
-            <a:endCxn id="14" idx="2"/>
-          </p:cNvCxnSpPr>
-          <p:nvPr/>
-        </p:nvCxnSpPr>
-        <p:spPr>
-          <a:xfrm flipH="1" flipV="1">
-            <a:off x="2369164" y="685914"/>
-            <a:ext cx="1" cy="531011"/>
-          </a:xfrm>
-          <a:prstGeom prst="straightConnector1">
-            <a:avLst/>
-          </a:prstGeom>
           <a:ln>
-            <a:tailEnd type="triangle"/>
+            <a:solidFill>
+              <a:schemeClr val="tx1"/>
+            </a:solidFill>
+            <a:prstDash val="solid"/>
           </a:ln>
         </p:spPr>
         <p:style>
-          <a:lnRef idx="1">
-            <a:schemeClr val="accent1"/>
+          <a:lnRef idx="2">
+            <a:schemeClr val="accent1">
+              <a:shade val="50000"/>
+            </a:schemeClr>
           </a:lnRef>
-          <a:fillRef idx="0">
+          <a:fillRef idx="1">
             <a:schemeClr val="accent1"/>
           </a:fillRef>
           <a:effectRef idx="0">
             <a:schemeClr val="accent1"/>
           </a:effectRef>
           <a:fontRef idx="minor">
-            <a:schemeClr val="tx1"/>
+            <a:schemeClr val="lt1"/>
           </a:fontRef>
         </p:style>
-      </p:cxnSp>
-      <p:sp>
-        <p:nvSpPr>
-          <p:cNvPr id="49" name="TextBox 48">
-            <a:extLst>
-              <a:ext uri="{FF2B5EF4-FFF2-40B4-BE49-F238E27FC236}">
-                <a16:creationId xmlns:a16="http://schemas.microsoft.com/office/drawing/2014/main" id="{115BB779-781C-4E35-884C-9A8275A2AAF2}"/>
-              </a:ext>
-            </a:extLst>
-          </p:cNvPr>
-          <p:cNvSpPr txBox="1"/>
-          <p:nvPr/>
-        </p:nvSpPr>
-        <p:spPr>
-          <a:xfrm>
-            <a:off x="2392104" y="886986"/>
-            <a:ext cx="405880" cy="230832"/>
-          </a:xfrm>
-          <a:prstGeom prst="rect">
-            <a:avLst/>
-          </a:prstGeom>
-          <a:solidFill>
-            <a:schemeClr val="bg1"/>
-          </a:solidFill>
-        </p:spPr>
-        <p:txBody>
-          <a:bodyPr wrap="none" rtlCol="0">
-            <a:spAutoFit/>
-          </a:bodyPr>
-          <a:lstStyle/>
-          <a:p>
-            <a:r>
-              <a:rPr lang="en-CA" sz="900" dirty="0"/>
-              <a:t>Uses</a:t>
-            </a:r>
-          </a:p>
-        </p:txBody>
-      </p:sp>
-      <p:sp>
-        <p:nvSpPr>
-          <p:cNvPr id="43" name="Rectangle 42">
-            <a:extLst>
-              <a:ext uri="{FF2B5EF4-FFF2-40B4-BE49-F238E27FC236}">
-                <a16:creationId xmlns:a16="http://schemas.microsoft.com/office/drawing/2014/main" id="{8D810F9C-1904-45F9-8846-BFD890FB3242}"/>
+        <p:txBody>
+          <a:bodyPr rtlCol="0" anchor="t" anchorCtr="0"/>
+          <a:lstStyle/>
+          <a:p>
+            <a:r>
+              <a:rPr lang="es-CO" sz="1050" u="sng" dirty="0">
+                <a:solidFill>
+                  <a:schemeClr val="tx1"/>
+                </a:solidFill>
+              </a:rPr>
+              <a:t>Pod</a:t>
+            </a:r>
+            <a:endParaRPr lang="en-CA" sz="1050" u="sng" dirty="0">
+              <a:solidFill>
+                <a:schemeClr val="tx1"/>
+              </a:solidFill>
+            </a:endParaRPr>
+          </a:p>
+        </p:txBody>
+      </p:sp>
+      <p:sp>
+        <p:nvSpPr>
+          <p:cNvPr id="140" name="Rectangle 139">
+            <a:extLst>
+              <a:ext uri="{FF2B5EF4-FFF2-40B4-BE49-F238E27FC236}">
+                <a16:creationId xmlns:a16="http://schemas.microsoft.com/office/drawing/2014/main" id="{02EE472E-B2AB-4D1F-A669-4B28540A2CD7}"/>
               </a:ext>
             </a:extLst>
           </p:cNvPr>
@@ -5090,8 +4932,8 @@
         </p:nvSpPr>
         <p:spPr>
           <a:xfrm>
-            <a:off x="7325010" y="2529194"/>
-            <a:ext cx="3706778" cy="1103542"/>
+            <a:off x="8469555" y="1810956"/>
+            <a:ext cx="767940" cy="326675"/>
           </a:xfrm>
           <a:prstGeom prst="rect">
             <a:avLst/>
@@ -5120,18 +4962,30 @@
           </a:fontRef>
         </p:style>
         <p:txBody>
-          <a:bodyPr rtlCol="0" anchor="t" anchorCtr="0"/>
-          <a:lstStyle/>
-          <a:p>
-            <a:r>
-              <a:rPr lang="es-CO" sz="1200" u="sng" dirty="0">
+          <a:bodyPr rtlCol="0" anchor="ctr" anchorCtr="0"/>
+          <a:lstStyle/>
+          <a:p>
+            <a:pPr algn="ctr"/>
+            <a:r>
+              <a:rPr lang="es-CO" sz="1000" b="1" dirty="0">
                 <a:solidFill>
                   <a:schemeClr val="tx1"/>
                 </a:solidFill>
               </a:rPr>
-              <a:t>NODE 2</a:t>
-            </a:r>
-            <a:endParaRPr lang="en-CA" sz="1200" u="sng" dirty="0">
+              <a:t>Biller</a:t>
+            </a:r>
+          </a:p>
+          <a:p>
+            <a:pPr algn="ctr"/>
+            <a:r>
+              <a:rPr lang="es-CO" sz="1000" b="1" dirty="0">
+                <a:solidFill>
+                  <a:schemeClr val="tx1"/>
+                </a:solidFill>
+              </a:rPr>
+              <a:t>container</a:t>
+            </a:r>
+            <a:endParaRPr lang="en-CA" sz="1000" b="1" dirty="0">
               <a:solidFill>
                 <a:schemeClr val="tx1"/>
               </a:solidFill>
@@ -5141,10 +4995,10 @@
       </p:sp>
       <p:sp>
         <p:nvSpPr>
-          <p:cNvPr id="67" name="Rectangle 66">
-            <a:extLst>
-              <a:ext uri="{FF2B5EF4-FFF2-40B4-BE49-F238E27FC236}">
-                <a16:creationId xmlns:a16="http://schemas.microsoft.com/office/drawing/2014/main" id="{82AB7A12-2D1E-43B4-B152-F90C39FB7162}"/>
+          <p:cNvPr id="141" name="Rectangle 140">
+            <a:extLst>
+              <a:ext uri="{FF2B5EF4-FFF2-40B4-BE49-F238E27FC236}">
+                <a16:creationId xmlns:a16="http://schemas.microsoft.com/office/drawing/2014/main" id="{E413BE9A-5BA3-4CAE-A7FB-B59BE1442AFE}"/>
               </a:ext>
             </a:extLst>
           </p:cNvPr>
@@ -5153,7 +5007,71 @@
         </p:nvSpPr>
         <p:spPr>
           <a:xfrm>
-            <a:off x="8363135" y="2813246"/>
+            <a:off x="8418218" y="1582436"/>
+            <a:ext cx="877063" cy="623869"/>
+          </a:xfrm>
+          <a:prstGeom prst="rect">
+            <a:avLst/>
+          </a:prstGeom>
+          <a:noFill/>
+          <a:ln>
+            <a:solidFill>
+              <a:schemeClr val="tx1"/>
+            </a:solidFill>
+            <a:prstDash val="solid"/>
+          </a:ln>
+        </p:spPr>
+        <p:style>
+          <a:lnRef idx="2">
+            <a:schemeClr val="accent1">
+              <a:shade val="50000"/>
+            </a:schemeClr>
+          </a:lnRef>
+          <a:fillRef idx="1">
+            <a:schemeClr val="accent1"/>
+          </a:fillRef>
+          <a:effectRef idx="0">
+            <a:schemeClr val="accent1"/>
+          </a:effectRef>
+          <a:fontRef idx="minor">
+            <a:schemeClr val="lt1"/>
+          </a:fontRef>
+        </p:style>
+        <p:txBody>
+          <a:bodyPr rtlCol="0" anchor="t" anchorCtr="0"/>
+          <a:lstStyle/>
+          <a:p>
+            <a:r>
+              <a:rPr lang="es-CO" sz="1050" u="sng" dirty="0">
+                <a:solidFill>
+                  <a:schemeClr val="tx1"/>
+                </a:solidFill>
+              </a:rPr>
+              <a:t>Pod</a:t>
+            </a:r>
+            <a:endParaRPr lang="en-CA" sz="1050" u="sng" dirty="0">
+              <a:solidFill>
+                <a:schemeClr val="tx1"/>
+              </a:solidFill>
+            </a:endParaRPr>
+          </a:p>
+        </p:txBody>
+      </p:sp>
+      <p:sp>
+        <p:nvSpPr>
+          <p:cNvPr id="142" name="Rectangle 141">
+            <a:extLst>
+              <a:ext uri="{FF2B5EF4-FFF2-40B4-BE49-F238E27FC236}">
+                <a16:creationId xmlns:a16="http://schemas.microsoft.com/office/drawing/2014/main" id="{A9957357-6998-41C2-B7ED-561D5BFE8F2A}"/>
+              </a:ext>
+            </a:extLst>
+          </p:cNvPr>
+          <p:cNvSpPr/>
+          <p:nvPr/>
+        </p:nvSpPr>
+        <p:spPr>
+          <a:xfrm>
+            <a:off x="9435883" y="1818514"/>
             <a:ext cx="767940" cy="326675"/>
           </a:xfrm>
           <a:prstGeom prst="rect">
@@ -5188,18 +5106,13 @@
           <a:p>
             <a:pPr algn="ctr"/>
             <a:r>
-              <a:rPr lang="es-CO" sz="1000" b="1" dirty="0" err="1">
+              <a:rPr lang="es-CO" sz="1000" b="1" dirty="0">
                 <a:solidFill>
                   <a:schemeClr val="tx1"/>
                 </a:solidFill>
               </a:rPr>
-              <a:t>Biller</a:t>
-            </a:r>
-            <a:endParaRPr lang="es-CO" sz="1000" b="1" dirty="0">
-              <a:solidFill>
-                <a:schemeClr val="tx1"/>
-              </a:solidFill>
-            </a:endParaRPr>
+              <a:t>User</a:t>
+            </a:r>
           </a:p>
           <a:p>
             <a:pPr algn="ctr"/>
@@ -5221,10 +5134,10 @@
       </p:sp>
       <p:sp>
         <p:nvSpPr>
-          <p:cNvPr id="68" name="Rectangle 67">
-            <a:extLst>
-              <a:ext uri="{FF2B5EF4-FFF2-40B4-BE49-F238E27FC236}">
-                <a16:creationId xmlns:a16="http://schemas.microsoft.com/office/drawing/2014/main" id="{F96F24B0-9FD5-4260-907B-F212C7F054B1}"/>
+          <p:cNvPr id="143" name="Rectangle 142">
+            <a:extLst>
+              <a:ext uri="{FF2B5EF4-FFF2-40B4-BE49-F238E27FC236}">
+                <a16:creationId xmlns:a16="http://schemas.microsoft.com/office/drawing/2014/main" id="{4CD79C29-0068-4C1F-AC8A-9344311FFBDE}"/>
               </a:ext>
             </a:extLst>
           </p:cNvPr>
@@ -5233,8 +5146,72 @@
         </p:nvSpPr>
         <p:spPr>
           <a:xfrm>
-            <a:off x="8363135" y="3272562"/>
-            <a:ext cx="767940" cy="307756"/>
+            <a:off x="9385821" y="1589994"/>
+            <a:ext cx="877063" cy="611840"/>
+          </a:xfrm>
+          <a:prstGeom prst="rect">
+            <a:avLst/>
+          </a:prstGeom>
+          <a:noFill/>
+          <a:ln>
+            <a:solidFill>
+              <a:schemeClr val="tx1"/>
+            </a:solidFill>
+            <a:prstDash val="solid"/>
+          </a:ln>
+        </p:spPr>
+        <p:style>
+          <a:lnRef idx="2">
+            <a:schemeClr val="accent1">
+              <a:shade val="50000"/>
+            </a:schemeClr>
+          </a:lnRef>
+          <a:fillRef idx="1">
+            <a:schemeClr val="accent1"/>
+          </a:fillRef>
+          <a:effectRef idx="0">
+            <a:schemeClr val="accent1"/>
+          </a:effectRef>
+          <a:fontRef idx="minor">
+            <a:schemeClr val="lt1"/>
+          </a:fontRef>
+        </p:style>
+        <p:txBody>
+          <a:bodyPr rtlCol="0" anchor="t" anchorCtr="0"/>
+          <a:lstStyle/>
+          <a:p>
+            <a:r>
+              <a:rPr lang="es-CO" sz="1050" u="sng" dirty="0">
+                <a:solidFill>
+                  <a:schemeClr val="tx1"/>
+                </a:solidFill>
+              </a:rPr>
+              <a:t>Pod</a:t>
+            </a:r>
+            <a:endParaRPr lang="en-CA" sz="1050" u="sng" dirty="0">
+              <a:solidFill>
+                <a:schemeClr val="tx1"/>
+              </a:solidFill>
+            </a:endParaRPr>
+          </a:p>
+        </p:txBody>
+      </p:sp>
+      <p:sp>
+        <p:nvSpPr>
+          <p:cNvPr id="144" name="Rectangle 143">
+            <a:extLst>
+              <a:ext uri="{FF2B5EF4-FFF2-40B4-BE49-F238E27FC236}">
+                <a16:creationId xmlns:a16="http://schemas.microsoft.com/office/drawing/2014/main" id="{D798D9AD-9F95-4B2C-A0BD-00D639149790}"/>
+              </a:ext>
+            </a:extLst>
+          </p:cNvPr>
+          <p:cNvSpPr/>
+          <p:nvPr/>
+        </p:nvSpPr>
+        <p:spPr>
+          <a:xfrm>
+            <a:off x="10398503" y="1818514"/>
+            <a:ext cx="767940" cy="326675"/>
           </a:xfrm>
           <a:prstGeom prst="rect">
             <a:avLst/>
@@ -5263,83 +5240,107 @@
           </a:fontRef>
         </p:style>
         <p:txBody>
-          <a:bodyPr rot="0" spcFirstLastPara="0" vertOverflow="overflow" horzOverflow="overflow" vert="horz" wrap="square" lIns="91440" tIns="45720" rIns="91440" bIns="45720" numCol="1" spcCol="0" rtlCol="0" fromWordArt="0" anchor="ctr" anchorCtr="0" forceAA="0" compatLnSpc="1">
-            <a:prstTxWarp prst="textNoShape">
-              <a:avLst/>
-            </a:prstTxWarp>
-            <a:noAutofit/>
-          </a:bodyPr>
+          <a:bodyPr rtlCol="0" anchor="ctr" anchorCtr="0"/>
           <a:lstStyle/>
           <a:p>
             <a:pPr algn="ctr"/>
-            <a:r>
-              <a:rPr lang="es-CO" sz="1000" b="1" dirty="0" err="1">
-                <a:solidFill>
-                  <a:schemeClr val="tx1"/>
-                </a:solidFill>
-              </a:rPr>
-              <a:t>istio</a:t>
-            </a:r>
             <a:r>
               <a:rPr lang="es-CO" sz="1000" b="1" dirty="0">
                 <a:solidFill>
                   <a:schemeClr val="tx1"/>
                 </a:solidFill>
               </a:rPr>
-              <a:t>-proxy </a:t>
-            </a:r>
-          </a:p>
-        </p:txBody>
-      </p:sp>
-      <p:cxnSp>
-        <p:nvCxnSpPr>
-          <p:cNvPr id="69" name="Straight Connector 68">
-            <a:extLst>
-              <a:ext uri="{FF2B5EF4-FFF2-40B4-BE49-F238E27FC236}">
-                <a16:creationId xmlns:a16="http://schemas.microsoft.com/office/drawing/2014/main" id="{D99DB0F2-6A33-4059-A523-0F0E362D3432}"/>
-              </a:ext>
-            </a:extLst>
-          </p:cNvPr>
-          <p:cNvCxnSpPr>
-            <a:cxnSpLocks/>
-            <a:stCxn id="67" idx="2"/>
-            <a:endCxn id="68" idx="0"/>
-          </p:cNvCxnSpPr>
+              <a:t>DB </a:t>
+            </a:r>
+          </a:p>
+          <a:p>
+            <a:pPr algn="ctr"/>
+            <a:r>
+              <a:rPr lang="es-CO" sz="1000" b="1" dirty="0">
+                <a:solidFill>
+                  <a:schemeClr val="tx1"/>
+                </a:solidFill>
+              </a:rPr>
+              <a:t>container</a:t>
+            </a:r>
+            <a:endParaRPr lang="en-CA" sz="1000" b="1" dirty="0">
+              <a:solidFill>
+                <a:schemeClr val="tx1"/>
+              </a:solidFill>
+            </a:endParaRPr>
+          </a:p>
+        </p:txBody>
+      </p:sp>
+      <p:sp>
+        <p:nvSpPr>
+          <p:cNvPr id="145" name="Rectangle 144">
+            <a:extLst>
+              <a:ext uri="{FF2B5EF4-FFF2-40B4-BE49-F238E27FC236}">
+                <a16:creationId xmlns:a16="http://schemas.microsoft.com/office/drawing/2014/main" id="{71412423-842A-4A06-9D9A-1869646C89B6}"/>
+              </a:ext>
+            </a:extLst>
+          </p:cNvPr>
+          <p:cNvSpPr/>
           <p:nvPr/>
-        </p:nvCxnSpPr>
-        <p:spPr>
-          <a:xfrm>
-            <a:off x="8747105" y="3139921"/>
-            <a:ext cx="0" cy="132641"/>
-          </a:xfrm>
-          <a:prstGeom prst="line">
+        </p:nvSpPr>
+        <p:spPr>
+          <a:xfrm>
+            <a:off x="10349134" y="1589994"/>
+            <a:ext cx="877063" cy="611840"/>
+          </a:xfrm>
+          <a:prstGeom prst="rect">
             <a:avLst/>
           </a:prstGeom>
+          <a:noFill/>
           <a:ln>
-            <a:prstDash val="dash"/>
+            <a:solidFill>
+              <a:schemeClr val="tx1"/>
+            </a:solidFill>
+            <a:prstDash val="solid"/>
           </a:ln>
         </p:spPr>
         <p:style>
-          <a:lnRef idx="1">
-            <a:schemeClr val="accent1"/>
+          <a:lnRef idx="2">
+            <a:schemeClr val="accent1">
+              <a:shade val="50000"/>
+            </a:schemeClr>
           </a:lnRef>
-          <a:fillRef idx="0">
+          <a:fillRef idx="1">
             <a:schemeClr val="accent1"/>
           </a:fillRef>
           <a:effectRef idx="0">
             <a:schemeClr val="accent1"/>
           </a:effectRef>
           <a:fontRef idx="minor">
-            <a:schemeClr val="tx1"/>
+            <a:schemeClr val="lt1"/>
           </a:fontRef>
         </p:style>
-      </p:cxnSp>
-      <p:sp>
-        <p:nvSpPr>
-          <p:cNvPr id="70" name="Rectangle 69">
-            <a:extLst>
-              <a:ext uri="{FF2B5EF4-FFF2-40B4-BE49-F238E27FC236}">
-                <a16:creationId xmlns:a16="http://schemas.microsoft.com/office/drawing/2014/main" id="{BFC1072A-34B0-42EA-88CB-8E0BBBA84CEB}"/>
+        <p:txBody>
+          <a:bodyPr rtlCol="0" anchor="t" anchorCtr="0"/>
+          <a:lstStyle/>
+          <a:p>
+            <a:r>
+              <a:rPr lang="es-CO" sz="1050" u="sng" dirty="0">
+                <a:solidFill>
+                  <a:schemeClr val="tx1"/>
+                </a:solidFill>
+              </a:rPr>
+              <a:t>Pod</a:t>
+            </a:r>
+            <a:endParaRPr lang="en-CA" sz="1050" u="sng" dirty="0">
+              <a:solidFill>
+                <a:schemeClr val="tx1"/>
+              </a:solidFill>
+            </a:endParaRPr>
+          </a:p>
+        </p:txBody>
+      </p:sp>
+      <p:sp>
+        <p:nvSpPr>
+          <p:cNvPr id="147" name="Rectangle 146">
+            <a:extLst>
+              <a:ext uri="{FF2B5EF4-FFF2-40B4-BE49-F238E27FC236}">
+                <a16:creationId xmlns:a16="http://schemas.microsoft.com/office/drawing/2014/main" id="{4F19DF9D-F48F-4158-BF36-0570F0B76CC5}"/>
               </a:ext>
             </a:extLst>
           </p:cNvPr>
@@ -5348,7 +5349,7 @@
         </p:nvSpPr>
         <p:spPr>
           <a:xfrm>
-            <a:off x="9294274" y="2813246"/>
+            <a:off x="7476157" y="3237842"/>
             <a:ext cx="767940" cy="326675"/>
           </a:xfrm>
           <a:prstGeom prst="rect">
@@ -5383,18 +5384,13 @@
           <a:p>
             <a:pPr algn="ctr"/>
             <a:r>
-              <a:rPr lang="es-CO" sz="1000" b="1" dirty="0" err="1">
+              <a:rPr lang="es-CO" sz="1000" b="1" dirty="0">
                 <a:solidFill>
                   <a:schemeClr val="tx1"/>
                 </a:solidFill>
               </a:rPr>
-              <a:t>User</a:t>
-            </a:r>
-            <a:endParaRPr lang="es-CO" sz="1000" b="1" dirty="0">
-              <a:solidFill>
-                <a:schemeClr val="tx1"/>
-              </a:solidFill>
-            </a:endParaRPr>
+              <a:t>Bill </a:t>
+            </a:r>
           </a:p>
           <a:p>
             <a:pPr algn="ctr"/>
@@ -5416,10 +5412,10 @@
       </p:sp>
       <p:sp>
         <p:nvSpPr>
-          <p:cNvPr id="71" name="Rectangle 70">
-            <a:extLst>
-              <a:ext uri="{FF2B5EF4-FFF2-40B4-BE49-F238E27FC236}">
-                <a16:creationId xmlns:a16="http://schemas.microsoft.com/office/drawing/2014/main" id="{E7FF7030-1CB4-4951-B89B-EA4520E2C289}"/>
+          <p:cNvPr id="148" name="Rectangle 147">
+            <a:extLst>
+              <a:ext uri="{FF2B5EF4-FFF2-40B4-BE49-F238E27FC236}">
+                <a16:creationId xmlns:a16="http://schemas.microsoft.com/office/drawing/2014/main" id="{7866A214-0C8A-44E7-A5AD-9C4D4856C673}"/>
               </a:ext>
             </a:extLst>
           </p:cNvPr>
@@ -5428,8 +5424,72 @@
         </p:nvSpPr>
         <p:spPr>
           <a:xfrm>
-            <a:off x="9294274" y="3272562"/>
-            <a:ext cx="767940" cy="307756"/>
+            <a:off x="7421459" y="3009322"/>
+            <a:ext cx="877064" cy="607922"/>
+          </a:xfrm>
+          <a:prstGeom prst="rect">
+            <a:avLst/>
+          </a:prstGeom>
+          <a:noFill/>
+          <a:ln>
+            <a:solidFill>
+              <a:schemeClr val="tx1"/>
+            </a:solidFill>
+            <a:prstDash val="solid"/>
+          </a:ln>
+        </p:spPr>
+        <p:style>
+          <a:lnRef idx="2">
+            <a:schemeClr val="accent1">
+              <a:shade val="50000"/>
+            </a:schemeClr>
+          </a:lnRef>
+          <a:fillRef idx="1">
+            <a:schemeClr val="accent1"/>
+          </a:fillRef>
+          <a:effectRef idx="0">
+            <a:schemeClr val="accent1"/>
+          </a:effectRef>
+          <a:fontRef idx="minor">
+            <a:schemeClr val="lt1"/>
+          </a:fontRef>
+        </p:style>
+        <p:txBody>
+          <a:bodyPr rtlCol="0" anchor="t" anchorCtr="0"/>
+          <a:lstStyle/>
+          <a:p>
+            <a:r>
+              <a:rPr lang="es-CO" sz="1050" u="sng" dirty="0">
+                <a:solidFill>
+                  <a:schemeClr val="tx1"/>
+                </a:solidFill>
+              </a:rPr>
+              <a:t>Pod</a:t>
+            </a:r>
+            <a:endParaRPr lang="en-CA" sz="1050" u="sng" dirty="0">
+              <a:solidFill>
+                <a:schemeClr val="tx1"/>
+              </a:solidFill>
+            </a:endParaRPr>
+          </a:p>
+        </p:txBody>
+      </p:sp>
+      <p:sp>
+        <p:nvSpPr>
+          <p:cNvPr id="149" name="Rectangle 148">
+            <a:extLst>
+              <a:ext uri="{FF2B5EF4-FFF2-40B4-BE49-F238E27FC236}">
+                <a16:creationId xmlns:a16="http://schemas.microsoft.com/office/drawing/2014/main" id="{8066C494-D02E-4ED0-888F-1FF1735771A3}"/>
+              </a:ext>
+            </a:extLst>
+          </p:cNvPr>
+          <p:cNvSpPr/>
+          <p:nvPr/>
+        </p:nvSpPr>
+        <p:spPr>
+          <a:xfrm>
+            <a:off x="8473956" y="3237842"/>
+            <a:ext cx="767940" cy="326675"/>
           </a:xfrm>
           <a:prstGeom prst="rect">
             <a:avLst/>
@@ -5458,83 +5518,107 @@
           </a:fontRef>
         </p:style>
         <p:txBody>
-          <a:bodyPr rot="0" spcFirstLastPara="0" vertOverflow="overflow" horzOverflow="overflow" vert="horz" wrap="square" lIns="91440" tIns="45720" rIns="91440" bIns="45720" numCol="1" spcCol="0" rtlCol="0" fromWordArt="0" anchor="ctr" anchorCtr="0" forceAA="0" compatLnSpc="1">
-            <a:prstTxWarp prst="textNoShape">
-              <a:avLst/>
-            </a:prstTxWarp>
-            <a:noAutofit/>
-          </a:bodyPr>
+          <a:bodyPr rtlCol="0" anchor="ctr" anchorCtr="0"/>
           <a:lstStyle/>
           <a:p>
             <a:pPr algn="ctr"/>
-            <a:r>
-              <a:rPr lang="es-CO" sz="1000" b="1" dirty="0" err="1">
-                <a:solidFill>
-                  <a:schemeClr val="tx1"/>
-                </a:solidFill>
-              </a:rPr>
-              <a:t>istio</a:t>
-            </a:r>
             <a:r>
               <a:rPr lang="es-CO" sz="1000" b="1" dirty="0">
                 <a:solidFill>
                   <a:schemeClr val="tx1"/>
                 </a:solidFill>
               </a:rPr>
-              <a:t>-proxy </a:t>
-            </a:r>
-          </a:p>
-        </p:txBody>
-      </p:sp>
-      <p:cxnSp>
-        <p:nvCxnSpPr>
-          <p:cNvPr id="72" name="Straight Connector 71">
-            <a:extLst>
-              <a:ext uri="{FF2B5EF4-FFF2-40B4-BE49-F238E27FC236}">
-                <a16:creationId xmlns:a16="http://schemas.microsoft.com/office/drawing/2014/main" id="{69631590-2DA4-421B-BC65-1B1BBC13EA6B}"/>
-              </a:ext>
-            </a:extLst>
-          </p:cNvPr>
-          <p:cNvCxnSpPr>
-            <a:cxnSpLocks/>
-            <a:stCxn id="70" idx="2"/>
-            <a:endCxn id="71" idx="0"/>
-          </p:cNvCxnSpPr>
+              <a:t>Biller</a:t>
+            </a:r>
+          </a:p>
+          <a:p>
+            <a:pPr algn="ctr"/>
+            <a:r>
+              <a:rPr lang="es-CO" sz="1000" b="1" dirty="0">
+                <a:solidFill>
+                  <a:schemeClr val="tx1"/>
+                </a:solidFill>
+              </a:rPr>
+              <a:t>container</a:t>
+            </a:r>
+            <a:endParaRPr lang="en-CA" sz="1000" b="1" dirty="0">
+              <a:solidFill>
+                <a:schemeClr val="tx1"/>
+              </a:solidFill>
+            </a:endParaRPr>
+          </a:p>
+        </p:txBody>
+      </p:sp>
+      <p:sp>
+        <p:nvSpPr>
+          <p:cNvPr id="150" name="Rectangle 149">
+            <a:extLst>
+              <a:ext uri="{FF2B5EF4-FFF2-40B4-BE49-F238E27FC236}">
+                <a16:creationId xmlns:a16="http://schemas.microsoft.com/office/drawing/2014/main" id="{CBBB71F1-9FD9-4BB6-B2A3-BF8624038B57}"/>
+              </a:ext>
+            </a:extLst>
+          </p:cNvPr>
+          <p:cNvSpPr/>
           <p:nvPr/>
-        </p:nvCxnSpPr>
-        <p:spPr>
-          <a:xfrm>
-            <a:off x="9678244" y="3139921"/>
-            <a:ext cx="0" cy="132641"/>
-          </a:xfrm>
-          <a:prstGeom prst="line">
+        </p:nvSpPr>
+        <p:spPr>
+          <a:xfrm>
+            <a:off x="8422619" y="3009322"/>
+            <a:ext cx="877063" cy="623869"/>
+          </a:xfrm>
+          <a:prstGeom prst="rect">
             <a:avLst/>
           </a:prstGeom>
+          <a:noFill/>
           <a:ln>
-            <a:prstDash val="dash"/>
+            <a:solidFill>
+              <a:schemeClr val="tx1"/>
+            </a:solidFill>
+            <a:prstDash val="solid"/>
           </a:ln>
         </p:spPr>
         <p:style>
-          <a:lnRef idx="1">
-            <a:schemeClr val="accent1"/>
+          <a:lnRef idx="2">
+            <a:schemeClr val="accent1">
+              <a:shade val="50000"/>
+            </a:schemeClr>
           </a:lnRef>
-          <a:fillRef idx="0">
+          <a:fillRef idx="1">
             <a:schemeClr val="accent1"/>
           </a:fillRef>
           <a:effectRef idx="0">
             <a:schemeClr val="accent1"/>
           </a:effectRef>
           <a:fontRef idx="minor">
-            <a:schemeClr val="tx1"/>
+            <a:schemeClr val="lt1"/>
           </a:fontRef>
         </p:style>
-      </p:cxnSp>
-      <p:sp>
-        <p:nvSpPr>
-          <p:cNvPr id="73" name="Rectangle 72">
-            <a:extLst>
-              <a:ext uri="{FF2B5EF4-FFF2-40B4-BE49-F238E27FC236}">
-                <a16:creationId xmlns:a16="http://schemas.microsoft.com/office/drawing/2014/main" id="{62970A1B-36FE-4CA1-95FD-C6C664576FCA}"/>
+        <p:txBody>
+          <a:bodyPr rtlCol="0" anchor="t" anchorCtr="0"/>
+          <a:lstStyle/>
+          <a:p>
+            <a:r>
+              <a:rPr lang="es-CO" sz="1050" u="sng" dirty="0">
+                <a:solidFill>
+                  <a:schemeClr val="tx1"/>
+                </a:solidFill>
+              </a:rPr>
+              <a:t>Pod</a:t>
+            </a:r>
+            <a:endParaRPr lang="en-CA" sz="1050" u="sng" dirty="0">
+              <a:solidFill>
+                <a:schemeClr val="tx1"/>
+              </a:solidFill>
+            </a:endParaRPr>
+          </a:p>
+        </p:txBody>
+      </p:sp>
+      <p:sp>
+        <p:nvSpPr>
+          <p:cNvPr id="151" name="Rectangle 150">
+            <a:extLst>
+              <a:ext uri="{FF2B5EF4-FFF2-40B4-BE49-F238E27FC236}">
+                <a16:creationId xmlns:a16="http://schemas.microsoft.com/office/drawing/2014/main" id="{17AC18EB-D7F8-4103-8C79-32ABFE3348E9}"/>
               </a:ext>
             </a:extLst>
           </p:cNvPr>
@@ -5543,7 +5627,7 @@
         </p:nvSpPr>
         <p:spPr>
           <a:xfrm>
-            <a:off x="10175514" y="2813246"/>
+            <a:off x="9437343" y="3249871"/>
             <a:ext cx="767940" cy="326675"/>
           </a:xfrm>
           <a:prstGeom prst="rect">
@@ -5583,7 +5667,7 @@
                   <a:schemeClr val="tx1"/>
                 </a:solidFill>
               </a:rPr>
-              <a:t>DB </a:t>
+              <a:t>User</a:t>
             </a:r>
           </a:p>
           <a:p>
@@ -5606,10 +5690,10 @@
       </p:sp>
       <p:sp>
         <p:nvSpPr>
-          <p:cNvPr id="74" name="Rectangle 73">
-            <a:extLst>
-              <a:ext uri="{FF2B5EF4-FFF2-40B4-BE49-F238E27FC236}">
-                <a16:creationId xmlns:a16="http://schemas.microsoft.com/office/drawing/2014/main" id="{077D8E34-C5C2-455F-8184-E1AA72D6797F}"/>
+          <p:cNvPr id="152" name="Rectangle 151">
+            <a:extLst>
+              <a:ext uri="{FF2B5EF4-FFF2-40B4-BE49-F238E27FC236}">
+                <a16:creationId xmlns:a16="http://schemas.microsoft.com/office/drawing/2014/main" id="{7B455C0C-ED82-4188-A39B-5824ACFAA676}"/>
               </a:ext>
             </a:extLst>
           </p:cNvPr>
@@ -5618,8 +5702,72 @@
         </p:nvSpPr>
         <p:spPr>
           <a:xfrm>
-            <a:off x="10175514" y="3272562"/>
-            <a:ext cx="767940" cy="307756"/>
+            <a:off x="9387281" y="3021351"/>
+            <a:ext cx="877063" cy="611840"/>
+          </a:xfrm>
+          <a:prstGeom prst="rect">
+            <a:avLst/>
+          </a:prstGeom>
+          <a:noFill/>
+          <a:ln>
+            <a:solidFill>
+              <a:schemeClr val="tx1"/>
+            </a:solidFill>
+            <a:prstDash val="solid"/>
+          </a:ln>
+        </p:spPr>
+        <p:style>
+          <a:lnRef idx="2">
+            <a:schemeClr val="accent1">
+              <a:shade val="50000"/>
+            </a:schemeClr>
+          </a:lnRef>
+          <a:fillRef idx="1">
+            <a:schemeClr val="accent1"/>
+          </a:fillRef>
+          <a:effectRef idx="0">
+            <a:schemeClr val="accent1"/>
+          </a:effectRef>
+          <a:fontRef idx="minor">
+            <a:schemeClr val="lt1"/>
+          </a:fontRef>
+        </p:style>
+        <p:txBody>
+          <a:bodyPr rtlCol="0" anchor="t" anchorCtr="0"/>
+          <a:lstStyle/>
+          <a:p>
+            <a:r>
+              <a:rPr lang="es-CO" sz="1050" u="sng" dirty="0">
+                <a:solidFill>
+                  <a:schemeClr val="tx1"/>
+                </a:solidFill>
+              </a:rPr>
+              <a:t>Pod</a:t>
+            </a:r>
+            <a:endParaRPr lang="en-CA" sz="1050" u="sng" dirty="0">
+              <a:solidFill>
+                <a:schemeClr val="tx1"/>
+              </a:solidFill>
+            </a:endParaRPr>
+          </a:p>
+        </p:txBody>
+      </p:sp>
+      <p:sp>
+        <p:nvSpPr>
+          <p:cNvPr id="153" name="Rectangle 152">
+            <a:extLst>
+              <a:ext uri="{FF2B5EF4-FFF2-40B4-BE49-F238E27FC236}">
+                <a16:creationId xmlns:a16="http://schemas.microsoft.com/office/drawing/2014/main" id="{9CEAED30-2D0D-4BB4-954D-2A6D3C63D288}"/>
+              </a:ext>
+            </a:extLst>
+          </p:cNvPr>
+          <p:cNvSpPr/>
+          <p:nvPr/>
+        </p:nvSpPr>
+        <p:spPr>
+          <a:xfrm>
+            <a:off x="10403039" y="3243715"/>
+            <a:ext cx="767940" cy="326675"/>
           </a:xfrm>
           <a:prstGeom prst="rect">
             <a:avLst/>
@@ -5648,83 +5796,43 @@
           </a:fontRef>
         </p:style>
         <p:txBody>
-          <a:bodyPr rot="0" spcFirstLastPara="0" vertOverflow="overflow" horzOverflow="overflow" vert="horz" wrap="square" lIns="91440" tIns="45720" rIns="91440" bIns="45720" numCol="1" spcCol="0" rtlCol="0" fromWordArt="0" anchor="ctr" anchorCtr="0" forceAA="0" compatLnSpc="1">
-            <a:prstTxWarp prst="textNoShape">
-              <a:avLst/>
-            </a:prstTxWarp>
-            <a:noAutofit/>
-          </a:bodyPr>
+          <a:bodyPr rtlCol="0" anchor="ctr" anchorCtr="0"/>
           <a:lstStyle/>
           <a:p>
             <a:pPr algn="ctr"/>
-            <a:r>
-              <a:rPr lang="es-CO" sz="1000" b="1" dirty="0" err="1">
-                <a:solidFill>
-                  <a:schemeClr val="tx1"/>
-                </a:solidFill>
-              </a:rPr>
-              <a:t>istio</a:t>
-            </a:r>
             <a:r>
               <a:rPr lang="es-CO" sz="1000" b="1" dirty="0">
                 <a:solidFill>
                   <a:schemeClr val="tx1"/>
                 </a:solidFill>
               </a:rPr>
-              <a:t>-proxy </a:t>
-            </a:r>
-          </a:p>
-        </p:txBody>
-      </p:sp>
-      <p:cxnSp>
-        <p:nvCxnSpPr>
-          <p:cNvPr id="75" name="Straight Connector 74">
-            <a:extLst>
-              <a:ext uri="{FF2B5EF4-FFF2-40B4-BE49-F238E27FC236}">
-                <a16:creationId xmlns:a16="http://schemas.microsoft.com/office/drawing/2014/main" id="{61C1983B-6315-482B-8969-7503FEF94CFB}"/>
-              </a:ext>
-            </a:extLst>
-          </p:cNvPr>
-          <p:cNvCxnSpPr>
-            <a:cxnSpLocks/>
-            <a:stCxn id="73" idx="2"/>
-            <a:endCxn id="74" idx="0"/>
-          </p:cNvCxnSpPr>
-          <p:nvPr/>
-        </p:nvCxnSpPr>
-        <p:spPr>
-          <a:xfrm>
-            <a:off x="10559484" y="3139921"/>
-            <a:ext cx="0" cy="132641"/>
-          </a:xfrm>
-          <a:prstGeom prst="line">
-            <a:avLst/>
-          </a:prstGeom>
-          <a:ln>
-            <a:prstDash val="dash"/>
-          </a:ln>
-        </p:spPr>
-        <p:style>
-          <a:lnRef idx="1">
-            <a:schemeClr val="accent1"/>
-          </a:lnRef>
-          <a:fillRef idx="0">
-            <a:schemeClr val="accent1"/>
-          </a:fillRef>
-          <a:effectRef idx="0">
-            <a:schemeClr val="accent1"/>
-          </a:effectRef>
-          <a:fontRef idx="minor">
-            <a:schemeClr val="tx1"/>
-          </a:fontRef>
-        </p:style>
-      </p:cxnSp>
-      <p:sp>
-        <p:nvSpPr>
-          <p:cNvPr id="76" name="Rectangle 75">
-            <a:extLst>
-              <a:ext uri="{FF2B5EF4-FFF2-40B4-BE49-F238E27FC236}">
-                <a16:creationId xmlns:a16="http://schemas.microsoft.com/office/drawing/2014/main" id="{6E9F0B61-B86E-46DB-9737-78E3B42C2C98}"/>
+              <a:t>DB </a:t>
+            </a:r>
+          </a:p>
+          <a:p>
+            <a:pPr algn="ctr"/>
+            <a:r>
+              <a:rPr lang="es-CO" sz="1000" b="1" dirty="0">
+                <a:solidFill>
+                  <a:schemeClr val="tx1"/>
+                </a:solidFill>
+              </a:rPr>
+              <a:t>container</a:t>
+            </a:r>
+            <a:endParaRPr lang="en-CA" sz="1000" b="1" dirty="0">
+              <a:solidFill>
+                <a:schemeClr val="tx1"/>
+              </a:solidFill>
+            </a:endParaRPr>
+          </a:p>
+        </p:txBody>
+      </p:sp>
+      <p:sp>
+        <p:nvSpPr>
+          <p:cNvPr id="154" name="Rectangle 153">
+            <a:extLst>
+              <a:ext uri="{FF2B5EF4-FFF2-40B4-BE49-F238E27FC236}">
+                <a16:creationId xmlns:a16="http://schemas.microsoft.com/office/drawing/2014/main" id="{DB28DD8A-30CB-4BA0-A8C8-41C6460DB04B}"/>
               </a:ext>
             </a:extLst>
           </p:cNvPr>
@@ -5733,8 +5841,8 @@
         </p:nvSpPr>
         <p:spPr>
           <a:xfrm>
-            <a:off x="7421069" y="1500445"/>
-            <a:ext cx="767940" cy="326675"/>
+            <a:off x="10353670" y="3015195"/>
+            <a:ext cx="877063" cy="611840"/>
           </a:xfrm>
           <a:prstGeom prst="rect">
             <a:avLst/>
@@ -5744,6 +5852,7 @@
             <a:solidFill>
               <a:schemeClr val="tx1"/>
             </a:solidFill>
+            <a:prstDash val="solid"/>
           </a:ln>
         </p:spPr>
         <p:style>
@@ -5763,30 +5872,18 @@
           </a:fontRef>
         </p:style>
         <p:txBody>
-          <a:bodyPr rtlCol="0" anchor="ctr" anchorCtr="0"/>
-          <a:lstStyle/>
-          <a:p>
-            <a:pPr algn="ctr"/>
-            <a:r>
-              <a:rPr lang="es-CO" sz="1000" b="1" dirty="0">
+          <a:bodyPr rtlCol="0" anchor="t" anchorCtr="0"/>
+          <a:lstStyle/>
+          <a:p>
+            <a:r>
+              <a:rPr lang="es-CO" sz="1050" u="sng" dirty="0">
                 <a:solidFill>
                   <a:schemeClr val="tx1"/>
                 </a:solidFill>
               </a:rPr>
-              <a:t>Bill </a:t>
-            </a:r>
-          </a:p>
-          <a:p>
-            <a:pPr algn="ctr"/>
-            <a:r>
-              <a:rPr lang="es-CO" sz="1000" b="1" dirty="0">
-                <a:solidFill>
-                  <a:schemeClr val="tx1"/>
-                </a:solidFill>
-              </a:rPr>
-              <a:t>container</a:t>
-            </a:r>
-            <a:endParaRPr lang="en-CA" sz="1000" b="1" dirty="0">
+              <a:t>Pod</a:t>
+            </a:r>
+            <a:endParaRPr lang="en-CA" sz="1050" u="sng" dirty="0">
               <a:solidFill>
                 <a:schemeClr val="tx1"/>
               </a:solidFill>
@@ -5794,684 +5891,32 @@
           </a:p>
         </p:txBody>
       </p:sp>
-      <p:sp>
-        <p:nvSpPr>
-          <p:cNvPr id="77" name="Rectangle 76">
-            <a:extLst>
-              <a:ext uri="{FF2B5EF4-FFF2-40B4-BE49-F238E27FC236}">
-                <a16:creationId xmlns:a16="http://schemas.microsoft.com/office/drawing/2014/main" id="{7D87CCEC-2FAD-40F5-BAFE-896560BD2599}"/>
-              </a:ext>
-            </a:extLst>
-          </p:cNvPr>
-          <p:cNvSpPr/>
-          <p:nvPr/>
-        </p:nvSpPr>
-        <p:spPr>
-          <a:xfrm>
-            <a:off x="7421069" y="1959761"/>
-            <a:ext cx="767940" cy="307756"/>
-          </a:xfrm>
-          <a:prstGeom prst="rect">
-            <a:avLst/>
-          </a:prstGeom>
-          <a:noFill/>
-          <a:ln>
-            <a:solidFill>
-              <a:schemeClr val="tx1"/>
-            </a:solidFill>
-          </a:ln>
-        </p:spPr>
-        <p:style>
-          <a:lnRef idx="2">
-            <a:schemeClr val="accent1">
-              <a:shade val="50000"/>
-            </a:schemeClr>
-          </a:lnRef>
-          <a:fillRef idx="1">
-            <a:schemeClr val="accent1"/>
-          </a:fillRef>
-          <a:effectRef idx="0">
-            <a:schemeClr val="accent1"/>
-          </a:effectRef>
-          <a:fontRef idx="minor">
-            <a:schemeClr val="lt1"/>
-          </a:fontRef>
-        </p:style>
-        <p:txBody>
-          <a:bodyPr rot="0" spcFirstLastPara="0" vertOverflow="overflow" horzOverflow="overflow" vert="horz" wrap="square" lIns="91440" tIns="45720" rIns="91440" bIns="45720" numCol="1" spcCol="0" rtlCol="0" fromWordArt="0" anchor="ctr" anchorCtr="0" forceAA="0" compatLnSpc="1">
-            <a:prstTxWarp prst="textNoShape">
-              <a:avLst/>
-            </a:prstTxWarp>
-            <a:noAutofit/>
-          </a:bodyPr>
-          <a:lstStyle/>
-          <a:p>
-            <a:pPr algn="ctr"/>
-            <a:r>
-              <a:rPr lang="es-CO" sz="1000" b="1" dirty="0" err="1">
-                <a:solidFill>
-                  <a:schemeClr val="tx1"/>
-                </a:solidFill>
-              </a:rPr>
-              <a:t>istio</a:t>
-            </a:r>
-            <a:r>
-              <a:rPr lang="es-CO" sz="1000" b="1" dirty="0">
-                <a:solidFill>
-                  <a:schemeClr val="tx1"/>
-                </a:solidFill>
-              </a:rPr>
-              <a:t>-proxy </a:t>
-            </a:r>
-          </a:p>
-        </p:txBody>
-      </p:sp>
       <p:cxnSp>
         <p:nvCxnSpPr>
-          <p:cNvPr id="78" name="Straight Connector 77">
-            <a:extLst>
-              <a:ext uri="{FF2B5EF4-FFF2-40B4-BE49-F238E27FC236}">
-                <a16:creationId xmlns:a16="http://schemas.microsoft.com/office/drawing/2014/main" id="{BECA2162-A0A5-440D-B195-9DC78AE31EAB}"/>
+          <p:cNvPr id="146" name="Connector: Elbow 145">
+            <a:extLst>
+              <a:ext uri="{FF2B5EF4-FFF2-40B4-BE49-F238E27FC236}">
+                <a16:creationId xmlns:a16="http://schemas.microsoft.com/office/drawing/2014/main" id="{AE178194-8181-45D0-B127-90A489509CF3}"/>
               </a:ext>
             </a:extLst>
           </p:cNvPr>
           <p:cNvCxnSpPr>
             <a:cxnSpLocks/>
-            <a:stCxn id="76" idx="2"/>
-            <a:endCxn id="77" idx="0"/>
+            <a:endCxn id="43" idx="1"/>
           </p:cNvCxnSpPr>
           <p:nvPr/>
         </p:nvCxnSpPr>
         <p:spPr>
-          <a:xfrm>
-            <a:off x="7805039" y="1827120"/>
-            <a:ext cx="0" cy="132641"/>
-          </a:xfrm>
-          <a:prstGeom prst="line">
+          <a:xfrm rot="16200000" flipH="1">
+            <a:off x="6850706" y="2744743"/>
+            <a:ext cx="695039" cy="253570"/>
+          </a:xfrm>
+          <a:prstGeom prst="bentConnector2">
             <a:avLst/>
           </a:prstGeom>
           <a:ln>
-            <a:prstDash val="dash"/>
-          </a:ln>
-        </p:spPr>
-        <p:style>
-          <a:lnRef idx="1">
-            <a:schemeClr val="accent1"/>
-          </a:lnRef>
-          <a:fillRef idx="0">
-            <a:schemeClr val="accent1"/>
-          </a:fillRef>
-          <a:effectRef idx="0">
-            <a:schemeClr val="accent1"/>
-          </a:effectRef>
-          <a:fontRef idx="minor">
-            <a:schemeClr val="tx1"/>
-          </a:fontRef>
-        </p:style>
-      </p:cxnSp>
-      <p:sp>
-        <p:nvSpPr>
-          <p:cNvPr id="79" name="Rectangle 78">
-            <a:extLst>
-              <a:ext uri="{FF2B5EF4-FFF2-40B4-BE49-F238E27FC236}">
-                <a16:creationId xmlns:a16="http://schemas.microsoft.com/office/drawing/2014/main" id="{D59615F5-C238-4FE9-BE66-58E276541CD0}"/>
-              </a:ext>
-            </a:extLst>
-          </p:cNvPr>
-          <p:cNvSpPr/>
-          <p:nvPr/>
-        </p:nvSpPr>
-        <p:spPr>
-          <a:xfrm>
-            <a:off x="8357386" y="1490642"/>
-            <a:ext cx="767940" cy="326675"/>
-          </a:xfrm>
-          <a:prstGeom prst="rect">
-            <a:avLst/>
-          </a:prstGeom>
-          <a:noFill/>
-          <a:ln>
-            <a:solidFill>
-              <a:schemeClr val="tx1"/>
-            </a:solidFill>
-          </a:ln>
-        </p:spPr>
-        <p:style>
-          <a:lnRef idx="2">
-            <a:schemeClr val="accent1">
-              <a:shade val="50000"/>
-            </a:schemeClr>
-          </a:lnRef>
-          <a:fillRef idx="1">
-            <a:schemeClr val="accent1"/>
-          </a:fillRef>
-          <a:effectRef idx="0">
-            <a:schemeClr val="accent1"/>
-          </a:effectRef>
-          <a:fontRef idx="minor">
-            <a:schemeClr val="lt1"/>
-          </a:fontRef>
-        </p:style>
-        <p:txBody>
-          <a:bodyPr rtlCol="0" anchor="ctr" anchorCtr="0"/>
-          <a:lstStyle/>
-          <a:p>
-            <a:pPr algn="ctr"/>
-            <a:r>
-              <a:rPr lang="es-CO" sz="1000" b="1" dirty="0" err="1">
-                <a:solidFill>
-                  <a:schemeClr val="tx1"/>
-                </a:solidFill>
-              </a:rPr>
-              <a:t>Biller</a:t>
-            </a:r>
-            <a:endParaRPr lang="es-CO" sz="1000" b="1" dirty="0">
-              <a:solidFill>
-                <a:schemeClr val="tx1"/>
-              </a:solidFill>
-            </a:endParaRPr>
-          </a:p>
-          <a:p>
-            <a:pPr algn="ctr"/>
-            <a:r>
-              <a:rPr lang="es-CO" sz="1000" b="1" dirty="0">
-                <a:solidFill>
-                  <a:schemeClr val="tx1"/>
-                </a:solidFill>
-              </a:rPr>
-              <a:t>container</a:t>
-            </a:r>
-            <a:endParaRPr lang="en-CA" sz="1000" b="1" dirty="0">
-              <a:solidFill>
-                <a:schemeClr val="tx1"/>
-              </a:solidFill>
-            </a:endParaRPr>
-          </a:p>
-        </p:txBody>
-      </p:sp>
-      <p:sp>
-        <p:nvSpPr>
-          <p:cNvPr id="80" name="Rectangle 79">
-            <a:extLst>
-              <a:ext uri="{FF2B5EF4-FFF2-40B4-BE49-F238E27FC236}">
-                <a16:creationId xmlns:a16="http://schemas.microsoft.com/office/drawing/2014/main" id="{6E45DEB7-9AEC-45F0-860A-B4EC82FE1DB4}"/>
-              </a:ext>
-            </a:extLst>
-          </p:cNvPr>
-          <p:cNvSpPr/>
-          <p:nvPr/>
-        </p:nvSpPr>
-        <p:spPr>
-          <a:xfrm>
-            <a:off x="8357386" y="1949958"/>
-            <a:ext cx="767940" cy="307756"/>
-          </a:xfrm>
-          <a:prstGeom prst="rect">
-            <a:avLst/>
-          </a:prstGeom>
-          <a:noFill/>
-          <a:ln>
-            <a:solidFill>
-              <a:schemeClr val="tx1"/>
-            </a:solidFill>
-          </a:ln>
-        </p:spPr>
-        <p:style>
-          <a:lnRef idx="2">
-            <a:schemeClr val="accent1">
-              <a:shade val="50000"/>
-            </a:schemeClr>
-          </a:lnRef>
-          <a:fillRef idx="1">
-            <a:schemeClr val="accent1"/>
-          </a:fillRef>
-          <a:effectRef idx="0">
-            <a:schemeClr val="accent1"/>
-          </a:effectRef>
-          <a:fontRef idx="minor">
-            <a:schemeClr val="lt1"/>
-          </a:fontRef>
-        </p:style>
-        <p:txBody>
-          <a:bodyPr rot="0" spcFirstLastPara="0" vertOverflow="overflow" horzOverflow="overflow" vert="horz" wrap="square" lIns="91440" tIns="45720" rIns="91440" bIns="45720" numCol="1" spcCol="0" rtlCol="0" fromWordArt="0" anchor="ctr" anchorCtr="0" forceAA="0" compatLnSpc="1">
-            <a:prstTxWarp prst="textNoShape">
-              <a:avLst/>
-            </a:prstTxWarp>
-            <a:noAutofit/>
-          </a:bodyPr>
-          <a:lstStyle/>
-          <a:p>
-            <a:pPr algn="ctr"/>
-            <a:r>
-              <a:rPr lang="es-CO" sz="1000" b="1" dirty="0" err="1">
-                <a:solidFill>
-                  <a:schemeClr val="tx1"/>
-                </a:solidFill>
-              </a:rPr>
-              <a:t>istio</a:t>
-            </a:r>
-            <a:r>
-              <a:rPr lang="es-CO" sz="1000" b="1" dirty="0">
-                <a:solidFill>
-                  <a:schemeClr val="tx1"/>
-                </a:solidFill>
-              </a:rPr>
-              <a:t>-proxy </a:t>
-            </a:r>
-          </a:p>
-        </p:txBody>
-      </p:sp>
-      <p:cxnSp>
-        <p:nvCxnSpPr>
-          <p:cNvPr id="81" name="Straight Connector 80">
-            <a:extLst>
-              <a:ext uri="{FF2B5EF4-FFF2-40B4-BE49-F238E27FC236}">
-                <a16:creationId xmlns:a16="http://schemas.microsoft.com/office/drawing/2014/main" id="{B56FFCCB-545E-4104-86CA-1AE618CABB53}"/>
-              </a:ext>
-            </a:extLst>
-          </p:cNvPr>
-          <p:cNvCxnSpPr>
-            <a:cxnSpLocks/>
-            <a:stCxn id="79" idx="2"/>
-            <a:endCxn id="80" idx="0"/>
-          </p:cNvCxnSpPr>
-          <p:nvPr/>
-        </p:nvCxnSpPr>
-        <p:spPr>
-          <a:xfrm>
-            <a:off x="8741356" y="1817317"/>
-            <a:ext cx="0" cy="132641"/>
-          </a:xfrm>
-          <a:prstGeom prst="line">
-            <a:avLst/>
-          </a:prstGeom>
-          <a:ln>
-            <a:prstDash val="dash"/>
-          </a:ln>
-        </p:spPr>
-        <p:style>
-          <a:lnRef idx="1">
-            <a:schemeClr val="accent1"/>
-          </a:lnRef>
-          <a:fillRef idx="0">
-            <a:schemeClr val="accent1"/>
-          </a:fillRef>
-          <a:effectRef idx="0">
-            <a:schemeClr val="accent1"/>
-          </a:effectRef>
-          <a:fontRef idx="minor">
-            <a:schemeClr val="tx1"/>
-          </a:fontRef>
-        </p:style>
-      </p:cxnSp>
-      <p:sp>
-        <p:nvSpPr>
-          <p:cNvPr id="82" name="Rectangle 81">
-            <a:extLst>
-              <a:ext uri="{FF2B5EF4-FFF2-40B4-BE49-F238E27FC236}">
-                <a16:creationId xmlns:a16="http://schemas.microsoft.com/office/drawing/2014/main" id="{7221EC60-186B-4B37-885B-D4F46F260BB8}"/>
-              </a:ext>
-            </a:extLst>
-          </p:cNvPr>
-          <p:cNvSpPr/>
-          <p:nvPr/>
-        </p:nvSpPr>
-        <p:spPr>
-          <a:xfrm>
-            <a:off x="9288525" y="1490642"/>
-            <a:ext cx="767940" cy="326675"/>
-          </a:xfrm>
-          <a:prstGeom prst="rect">
-            <a:avLst/>
-          </a:prstGeom>
-          <a:noFill/>
-          <a:ln>
-            <a:solidFill>
-              <a:schemeClr val="tx1"/>
-            </a:solidFill>
-          </a:ln>
-        </p:spPr>
-        <p:style>
-          <a:lnRef idx="2">
-            <a:schemeClr val="accent1">
-              <a:shade val="50000"/>
-            </a:schemeClr>
-          </a:lnRef>
-          <a:fillRef idx="1">
-            <a:schemeClr val="accent1"/>
-          </a:fillRef>
-          <a:effectRef idx="0">
-            <a:schemeClr val="accent1"/>
-          </a:effectRef>
-          <a:fontRef idx="minor">
-            <a:schemeClr val="lt1"/>
-          </a:fontRef>
-        </p:style>
-        <p:txBody>
-          <a:bodyPr rtlCol="0" anchor="ctr" anchorCtr="0"/>
-          <a:lstStyle/>
-          <a:p>
-            <a:pPr algn="ctr"/>
-            <a:r>
-              <a:rPr lang="es-CO" sz="1000" b="1" dirty="0" err="1">
-                <a:solidFill>
-                  <a:schemeClr val="tx1"/>
-                </a:solidFill>
-              </a:rPr>
-              <a:t>User</a:t>
-            </a:r>
-            <a:endParaRPr lang="es-CO" sz="1000" b="1" dirty="0">
-              <a:solidFill>
-                <a:schemeClr val="tx1"/>
-              </a:solidFill>
-            </a:endParaRPr>
-          </a:p>
-          <a:p>
-            <a:pPr algn="ctr"/>
-            <a:r>
-              <a:rPr lang="es-CO" sz="1000" b="1" dirty="0">
-                <a:solidFill>
-                  <a:schemeClr val="tx1"/>
-                </a:solidFill>
-              </a:rPr>
-              <a:t>container</a:t>
-            </a:r>
-            <a:endParaRPr lang="en-CA" sz="1000" b="1" dirty="0">
-              <a:solidFill>
-                <a:schemeClr val="tx1"/>
-              </a:solidFill>
-            </a:endParaRPr>
-          </a:p>
-        </p:txBody>
-      </p:sp>
-      <p:sp>
-        <p:nvSpPr>
-          <p:cNvPr id="83" name="Rectangle 82">
-            <a:extLst>
-              <a:ext uri="{FF2B5EF4-FFF2-40B4-BE49-F238E27FC236}">
-                <a16:creationId xmlns:a16="http://schemas.microsoft.com/office/drawing/2014/main" id="{FF565496-EF3A-4BC7-85CA-C6BA82BBA229}"/>
-              </a:ext>
-            </a:extLst>
-          </p:cNvPr>
-          <p:cNvSpPr/>
-          <p:nvPr/>
-        </p:nvSpPr>
-        <p:spPr>
-          <a:xfrm>
-            <a:off x="9288525" y="1949958"/>
-            <a:ext cx="767940" cy="307756"/>
-          </a:xfrm>
-          <a:prstGeom prst="rect">
-            <a:avLst/>
-          </a:prstGeom>
-          <a:noFill/>
-          <a:ln>
-            <a:solidFill>
-              <a:schemeClr val="tx1"/>
-            </a:solidFill>
-          </a:ln>
-        </p:spPr>
-        <p:style>
-          <a:lnRef idx="2">
-            <a:schemeClr val="accent1">
-              <a:shade val="50000"/>
-            </a:schemeClr>
-          </a:lnRef>
-          <a:fillRef idx="1">
-            <a:schemeClr val="accent1"/>
-          </a:fillRef>
-          <a:effectRef idx="0">
-            <a:schemeClr val="accent1"/>
-          </a:effectRef>
-          <a:fontRef idx="minor">
-            <a:schemeClr val="lt1"/>
-          </a:fontRef>
-        </p:style>
-        <p:txBody>
-          <a:bodyPr rot="0" spcFirstLastPara="0" vertOverflow="overflow" horzOverflow="overflow" vert="horz" wrap="square" lIns="91440" tIns="45720" rIns="91440" bIns="45720" numCol="1" spcCol="0" rtlCol="0" fromWordArt="0" anchor="ctr" anchorCtr="0" forceAA="0" compatLnSpc="1">
-            <a:prstTxWarp prst="textNoShape">
-              <a:avLst/>
-            </a:prstTxWarp>
-            <a:noAutofit/>
-          </a:bodyPr>
-          <a:lstStyle/>
-          <a:p>
-            <a:pPr algn="ctr"/>
-            <a:r>
-              <a:rPr lang="es-CO" sz="1000" b="1" dirty="0" err="1">
-                <a:solidFill>
-                  <a:schemeClr val="tx1"/>
-                </a:solidFill>
-              </a:rPr>
-              <a:t>istio</a:t>
-            </a:r>
-            <a:r>
-              <a:rPr lang="es-CO" sz="1000" b="1" dirty="0">
-                <a:solidFill>
-                  <a:schemeClr val="tx1"/>
-                </a:solidFill>
-              </a:rPr>
-              <a:t>-proxy </a:t>
-            </a:r>
-          </a:p>
-        </p:txBody>
-      </p:sp>
-      <p:cxnSp>
-        <p:nvCxnSpPr>
-          <p:cNvPr id="84" name="Straight Connector 83">
-            <a:extLst>
-              <a:ext uri="{FF2B5EF4-FFF2-40B4-BE49-F238E27FC236}">
-                <a16:creationId xmlns:a16="http://schemas.microsoft.com/office/drawing/2014/main" id="{5FEE30E0-503A-4FEE-B881-FDD32D8CEB8F}"/>
-              </a:ext>
-            </a:extLst>
-          </p:cNvPr>
-          <p:cNvCxnSpPr>
-            <a:cxnSpLocks/>
-            <a:stCxn id="82" idx="2"/>
-            <a:endCxn id="83" idx="0"/>
-          </p:cNvCxnSpPr>
-          <p:nvPr/>
-        </p:nvCxnSpPr>
-        <p:spPr>
-          <a:xfrm>
-            <a:off x="9672495" y="1817317"/>
-            <a:ext cx="0" cy="132641"/>
-          </a:xfrm>
-          <a:prstGeom prst="line">
-            <a:avLst/>
-          </a:prstGeom>
-          <a:ln>
-            <a:prstDash val="dash"/>
-          </a:ln>
-        </p:spPr>
-        <p:style>
-          <a:lnRef idx="1">
-            <a:schemeClr val="accent1"/>
-          </a:lnRef>
-          <a:fillRef idx="0">
-            <a:schemeClr val="accent1"/>
-          </a:fillRef>
-          <a:effectRef idx="0">
-            <a:schemeClr val="accent1"/>
-          </a:effectRef>
-          <a:fontRef idx="minor">
-            <a:schemeClr val="tx1"/>
-          </a:fontRef>
-        </p:style>
-      </p:cxnSp>
-      <p:sp>
-        <p:nvSpPr>
-          <p:cNvPr id="85" name="Rectangle 84">
-            <a:extLst>
-              <a:ext uri="{FF2B5EF4-FFF2-40B4-BE49-F238E27FC236}">
-                <a16:creationId xmlns:a16="http://schemas.microsoft.com/office/drawing/2014/main" id="{96B1DF93-4F7A-4742-AFA8-B5BB237621AA}"/>
-              </a:ext>
-            </a:extLst>
-          </p:cNvPr>
-          <p:cNvSpPr/>
-          <p:nvPr/>
-        </p:nvSpPr>
-        <p:spPr>
-          <a:xfrm>
-            <a:off x="10169765" y="1490642"/>
-            <a:ext cx="767940" cy="326675"/>
-          </a:xfrm>
-          <a:prstGeom prst="rect">
-            <a:avLst/>
-          </a:prstGeom>
-          <a:noFill/>
-          <a:ln>
-            <a:solidFill>
-              <a:schemeClr val="tx1"/>
-            </a:solidFill>
-          </a:ln>
-        </p:spPr>
-        <p:style>
-          <a:lnRef idx="2">
-            <a:schemeClr val="accent1">
-              <a:shade val="50000"/>
-            </a:schemeClr>
-          </a:lnRef>
-          <a:fillRef idx="1">
-            <a:schemeClr val="accent1"/>
-          </a:fillRef>
-          <a:effectRef idx="0">
-            <a:schemeClr val="accent1"/>
-          </a:effectRef>
-          <a:fontRef idx="minor">
-            <a:schemeClr val="lt1"/>
-          </a:fontRef>
-        </p:style>
-        <p:txBody>
-          <a:bodyPr rtlCol="0" anchor="ctr" anchorCtr="0"/>
-          <a:lstStyle/>
-          <a:p>
-            <a:pPr algn="ctr"/>
-            <a:r>
-              <a:rPr lang="es-CO" sz="1000" b="1" dirty="0">
-                <a:solidFill>
-                  <a:schemeClr val="tx1"/>
-                </a:solidFill>
-              </a:rPr>
-              <a:t>DB </a:t>
-            </a:r>
-          </a:p>
-          <a:p>
-            <a:pPr algn="ctr"/>
-            <a:r>
-              <a:rPr lang="es-CO" sz="1000" b="1" dirty="0">
-                <a:solidFill>
-                  <a:schemeClr val="tx1"/>
-                </a:solidFill>
-              </a:rPr>
-              <a:t>container</a:t>
-            </a:r>
-            <a:endParaRPr lang="en-CA" sz="1000" b="1" dirty="0">
-              <a:solidFill>
-                <a:schemeClr val="tx1"/>
-              </a:solidFill>
-            </a:endParaRPr>
-          </a:p>
-        </p:txBody>
-      </p:sp>
-      <p:sp>
-        <p:nvSpPr>
-          <p:cNvPr id="86" name="Rectangle 85">
-            <a:extLst>
-              <a:ext uri="{FF2B5EF4-FFF2-40B4-BE49-F238E27FC236}">
-                <a16:creationId xmlns:a16="http://schemas.microsoft.com/office/drawing/2014/main" id="{F597B869-34A1-4E7D-8CA7-7EC6FE106C37}"/>
-              </a:ext>
-            </a:extLst>
-          </p:cNvPr>
-          <p:cNvSpPr/>
-          <p:nvPr/>
-        </p:nvSpPr>
-        <p:spPr>
-          <a:xfrm>
-            <a:off x="10169765" y="1949958"/>
-            <a:ext cx="767940" cy="307756"/>
-          </a:xfrm>
-          <a:prstGeom prst="rect">
-            <a:avLst/>
-          </a:prstGeom>
-          <a:noFill/>
-          <a:ln>
-            <a:solidFill>
-              <a:schemeClr val="tx1"/>
-            </a:solidFill>
-          </a:ln>
-        </p:spPr>
-        <p:style>
-          <a:lnRef idx="2">
-            <a:schemeClr val="accent1">
-              <a:shade val="50000"/>
-            </a:schemeClr>
-          </a:lnRef>
-          <a:fillRef idx="1">
-            <a:schemeClr val="accent1"/>
-          </a:fillRef>
-          <a:effectRef idx="0">
-            <a:schemeClr val="accent1"/>
-          </a:effectRef>
-          <a:fontRef idx="minor">
-            <a:schemeClr val="lt1"/>
-          </a:fontRef>
-        </p:style>
-        <p:txBody>
-          <a:bodyPr rot="0" spcFirstLastPara="0" vertOverflow="overflow" horzOverflow="overflow" vert="horz" wrap="square" lIns="91440" tIns="45720" rIns="91440" bIns="45720" numCol="1" spcCol="0" rtlCol="0" fromWordArt="0" anchor="ctr" anchorCtr="0" forceAA="0" compatLnSpc="1">
-            <a:prstTxWarp prst="textNoShape">
-              <a:avLst/>
-            </a:prstTxWarp>
-            <a:noAutofit/>
-          </a:bodyPr>
-          <a:lstStyle/>
-          <a:p>
-            <a:pPr algn="ctr"/>
-            <a:r>
-              <a:rPr lang="es-CO" sz="1000" b="1" dirty="0" err="1">
-                <a:solidFill>
-                  <a:schemeClr val="tx1"/>
-                </a:solidFill>
-              </a:rPr>
-              <a:t>istio</a:t>
-            </a:r>
-            <a:r>
-              <a:rPr lang="es-CO" sz="1000" b="1" dirty="0">
-                <a:solidFill>
-                  <a:schemeClr val="tx1"/>
-                </a:solidFill>
-              </a:rPr>
-              <a:t>-proxy </a:t>
-            </a:r>
-          </a:p>
-        </p:txBody>
-      </p:sp>
-      <p:cxnSp>
-        <p:nvCxnSpPr>
-          <p:cNvPr id="87" name="Straight Connector 86">
-            <a:extLst>
-              <a:ext uri="{FF2B5EF4-FFF2-40B4-BE49-F238E27FC236}">
-                <a16:creationId xmlns:a16="http://schemas.microsoft.com/office/drawing/2014/main" id="{176C29AA-E006-4D5D-A973-658C423D3EBA}"/>
-              </a:ext>
-            </a:extLst>
-          </p:cNvPr>
-          <p:cNvCxnSpPr>
-            <a:cxnSpLocks/>
-            <a:stCxn id="85" idx="2"/>
-            <a:endCxn id="86" idx="0"/>
-          </p:cNvCxnSpPr>
-          <p:nvPr/>
-        </p:nvCxnSpPr>
-        <p:spPr>
-          <a:xfrm>
-            <a:off x="10553735" y="1817317"/>
-            <a:ext cx="0" cy="132641"/>
-          </a:xfrm>
-          <a:prstGeom prst="line">
-            <a:avLst/>
-          </a:prstGeom>
-          <a:ln>
-            <a:prstDash val="dash"/>
+            <a:headEnd type="none"/>
+            <a:tailEnd type="triangle"/>
           </a:ln>
         </p:spPr>
         <p:style>
@@ -6491,33 +5936,30 @@
       </p:cxnSp>
       <p:cxnSp>
         <p:nvCxnSpPr>
-          <p:cNvPr id="28" name="Connector: Elbow 27">
-            <a:extLst>
-              <a:ext uri="{FF2B5EF4-FFF2-40B4-BE49-F238E27FC236}">
-                <a16:creationId xmlns:a16="http://schemas.microsoft.com/office/drawing/2014/main" id="{181627F8-4561-4FFB-A430-8F5D9CB4B45D}"/>
+          <p:cNvPr id="171" name="Connector: Elbow 170">
+            <a:extLst>
+              <a:ext uri="{FF2B5EF4-FFF2-40B4-BE49-F238E27FC236}">
+                <a16:creationId xmlns:a16="http://schemas.microsoft.com/office/drawing/2014/main" id="{AB22C959-F11D-4C00-8BC7-C91761C9F6CF}"/>
               </a:ext>
             </a:extLst>
           </p:cNvPr>
           <p:cNvCxnSpPr>
             <a:cxnSpLocks/>
-            <a:stCxn id="39" idx="3"/>
-            <a:endCxn id="43" idx="1"/>
+            <a:stCxn id="39" idx="2"/>
           </p:cNvCxnSpPr>
           <p:nvPr/>
         </p:nvCxnSpPr>
         <p:spPr>
-          <a:xfrm>
-            <a:off x="6679621" y="1640747"/>
-            <a:ext cx="645389" cy="1440218"/>
-          </a:xfrm>
-          <a:prstGeom prst="bentConnector3">
-            <a:avLst>
-              <a:gd name="adj1" fmla="val 50000"/>
-            </a:avLst>
+          <a:xfrm rot="16200000" flipH="1">
+            <a:off x="6507121" y="1959690"/>
+            <a:ext cx="330562" cy="798072"/>
+          </a:xfrm>
+          <a:prstGeom prst="bentConnector2">
+            <a:avLst/>
           </a:prstGeom>
           <a:ln>
             <a:headEnd type="triangle"/>
-            <a:tailEnd type="triangle"/>
+            <a:tailEnd type="none"/>
           </a:ln>
         </p:spPr>
         <p:style>
@@ -6538,7 +5980,7 @@
     </p:spTree>
     <p:extLst>
       <p:ext uri="{BB962C8B-B14F-4D97-AF65-F5344CB8AC3E}">
-        <p14:creationId xmlns:p14="http://schemas.microsoft.com/office/powerpoint/2010/main" val="3389688816"/>
+        <p14:creationId xmlns:p14="http://schemas.microsoft.com/office/powerpoint/2010/main" val="503896920"/>
       </p:ext>
     </p:extLst>
   </p:cSld>

</xml_diff>

<commit_message>
Update Architecture diagram - changed names in worker nodes
</commit_message>
<xml_diff>
--- a/docs/diagrams/Architecture.pptx
+++ b/docs/diagrams/Architecture.pptx
@@ -273,7 +273,7 @@
           <a:p>
             <a:fld id="{5218AD6D-F957-46F1-971B-3863E78F7EC4}" type="datetimeFigureOut">
               <a:rPr lang="en-CA" smtClean="0"/>
-              <a:t>2020-12-08</a:t>
+              <a:t>2020-12-09</a:t>
             </a:fld>
             <a:endParaRPr lang="en-CA" dirty="0"/>
           </a:p>
@@ -473,7 +473,7 @@
           <a:p>
             <a:fld id="{5218AD6D-F957-46F1-971B-3863E78F7EC4}" type="datetimeFigureOut">
               <a:rPr lang="en-CA" smtClean="0"/>
-              <a:t>2020-12-08</a:t>
+              <a:t>2020-12-09</a:t>
             </a:fld>
             <a:endParaRPr lang="en-CA" dirty="0"/>
           </a:p>
@@ -683,7 +683,7 @@
           <a:p>
             <a:fld id="{5218AD6D-F957-46F1-971B-3863E78F7EC4}" type="datetimeFigureOut">
               <a:rPr lang="en-CA" smtClean="0"/>
-              <a:t>2020-12-08</a:t>
+              <a:t>2020-12-09</a:t>
             </a:fld>
             <a:endParaRPr lang="en-CA" dirty="0"/>
           </a:p>
@@ -883,7 +883,7 @@
           <a:p>
             <a:fld id="{5218AD6D-F957-46F1-971B-3863E78F7EC4}" type="datetimeFigureOut">
               <a:rPr lang="en-CA" smtClean="0"/>
-              <a:t>2020-12-08</a:t>
+              <a:t>2020-12-09</a:t>
             </a:fld>
             <a:endParaRPr lang="en-CA" dirty="0"/>
           </a:p>
@@ -1159,7 +1159,7 @@
           <a:p>
             <a:fld id="{5218AD6D-F957-46F1-971B-3863E78F7EC4}" type="datetimeFigureOut">
               <a:rPr lang="en-CA" smtClean="0"/>
-              <a:t>2020-12-08</a:t>
+              <a:t>2020-12-09</a:t>
             </a:fld>
             <a:endParaRPr lang="en-CA" dirty="0"/>
           </a:p>
@@ -1427,7 +1427,7 @@
           <a:p>
             <a:fld id="{5218AD6D-F957-46F1-971B-3863E78F7EC4}" type="datetimeFigureOut">
               <a:rPr lang="en-CA" smtClean="0"/>
-              <a:t>2020-12-08</a:t>
+              <a:t>2020-12-09</a:t>
             </a:fld>
             <a:endParaRPr lang="en-CA" dirty="0"/>
           </a:p>
@@ -1842,7 +1842,7 @@
           <a:p>
             <a:fld id="{5218AD6D-F957-46F1-971B-3863E78F7EC4}" type="datetimeFigureOut">
               <a:rPr lang="en-CA" smtClean="0"/>
-              <a:t>2020-12-08</a:t>
+              <a:t>2020-12-09</a:t>
             </a:fld>
             <a:endParaRPr lang="en-CA" dirty="0"/>
           </a:p>
@@ -1984,7 +1984,7 @@
           <a:p>
             <a:fld id="{5218AD6D-F957-46F1-971B-3863E78F7EC4}" type="datetimeFigureOut">
               <a:rPr lang="en-CA" smtClean="0"/>
-              <a:t>2020-12-08</a:t>
+              <a:t>2020-12-09</a:t>
             </a:fld>
             <a:endParaRPr lang="en-CA" dirty="0"/>
           </a:p>
@@ -2097,7 +2097,7 @@
           <a:p>
             <a:fld id="{5218AD6D-F957-46F1-971B-3863E78F7EC4}" type="datetimeFigureOut">
               <a:rPr lang="en-CA" smtClean="0"/>
-              <a:t>2020-12-08</a:t>
+              <a:t>2020-12-09</a:t>
             </a:fld>
             <a:endParaRPr lang="en-CA" dirty="0"/>
           </a:p>
@@ -2410,7 +2410,7 @@
           <a:p>
             <a:fld id="{5218AD6D-F957-46F1-971B-3863E78F7EC4}" type="datetimeFigureOut">
               <a:rPr lang="en-CA" smtClean="0"/>
-              <a:t>2020-12-08</a:t>
+              <a:t>2020-12-09</a:t>
             </a:fld>
             <a:endParaRPr lang="en-CA" dirty="0"/>
           </a:p>
@@ -2699,7 +2699,7 @@
           <a:p>
             <a:fld id="{5218AD6D-F957-46F1-971B-3863E78F7EC4}" type="datetimeFigureOut">
               <a:rPr lang="en-CA" smtClean="0"/>
-              <a:t>2020-12-08</a:t>
+              <a:t>2020-12-09</a:t>
             </a:fld>
             <a:endParaRPr lang="en-CA" dirty="0"/>
           </a:p>
@@ -2942,7 +2942,7 @@
           <a:p>
             <a:fld id="{5218AD6D-F957-46F1-971B-3863E78F7EC4}" type="datetimeFigureOut">
               <a:rPr lang="en-CA" smtClean="0"/>
-              <a:t>2020-12-08</a:t>
+              <a:t>2020-12-09</a:t>
             </a:fld>
             <a:endParaRPr lang="en-CA" dirty="0"/>
           </a:p>
@@ -3667,7 +3667,7 @@
                   <a:schemeClr val="tx1"/>
                 </a:solidFill>
               </a:rPr>
-              <a:t>NODE 1</a:t>
+              <a:t>Worker Node 1</a:t>
             </a:r>
             <a:endParaRPr lang="en-CA" sz="1200" u="sng" dirty="0">
               <a:solidFill>
@@ -4364,7 +4364,7 @@
                   <a:schemeClr val="tx1"/>
                 </a:solidFill>
               </a:rPr>
-              <a:t>NODE 2</a:t>
+              <a:t>Worker Node 2</a:t>
             </a:r>
             <a:endParaRPr lang="en-CA" sz="1200" u="sng" dirty="0">
               <a:solidFill>
@@ -4732,7 +4732,7 @@
         </p:nvSpPr>
         <p:spPr>
           <a:xfrm>
-            <a:off x="5761682" y="2928364"/>
+            <a:off x="5761682" y="2894808"/>
             <a:ext cx="943463" cy="740978"/>
           </a:xfrm>
           <a:prstGeom prst="rect">
@@ -4801,8 +4801,8 @@
         </p:nvSpPr>
         <p:spPr>
           <a:xfrm>
-            <a:off x="5512119" y="2654724"/>
-            <a:ext cx="1387104" cy="1103542"/>
+            <a:off x="5512119" y="2621167"/>
+            <a:ext cx="1387104" cy="1203767"/>
           </a:xfrm>
           <a:prstGeom prst="rect">
             <a:avLst/>
@@ -5977,6 +5977,41 @@
           </a:fontRef>
         </p:style>
       </p:cxnSp>
+      <p:sp>
+        <p:nvSpPr>
+          <p:cNvPr id="48" name="TextBox 47">
+            <a:extLst>
+              <a:ext uri="{FF2B5EF4-FFF2-40B4-BE49-F238E27FC236}">
+                <a16:creationId xmlns:a16="http://schemas.microsoft.com/office/drawing/2014/main" id="{53C01ABF-BC10-4551-BFCA-35A6159DDD54}"/>
+              </a:ext>
+            </a:extLst>
+          </p:cNvPr>
+          <p:cNvSpPr txBox="1"/>
+          <p:nvPr/>
+        </p:nvSpPr>
+        <p:spPr>
+          <a:xfrm>
+            <a:off x="6021827" y="3481488"/>
+            <a:ext cx="418704" cy="400110"/>
+          </a:xfrm>
+          <a:prstGeom prst="rect">
+            <a:avLst/>
+          </a:prstGeom>
+          <a:noFill/>
+        </p:spPr>
+        <p:txBody>
+          <a:bodyPr wrap="none" rtlCol="0">
+            <a:spAutoFit/>
+          </a:bodyPr>
+          <a:lstStyle/>
+          <a:p>
+            <a:r>
+              <a:rPr lang="en-CA" sz="2000" dirty="0"/>
+              <a:t>… </a:t>
+            </a:r>
+          </a:p>
+        </p:txBody>
+      </p:sp>
     </p:spTree>
     <p:extLst>
       <p:ext uri="{BB962C8B-B14F-4D97-AF65-F5344CB8AC3E}">

</xml_diff>